<commit_message>
Fixed deployment bug for cdk, terraform, updated readme, refined equirectangular_to_perspective script
</commit_message>
<xml_diff>
--- a/assets/Reference Architecture -OS 3D Reconstruction Toolbox GS on AWS.pptx
+++ b/assets/Reference Architecture -OS 3D Reconstruction Toolbox GS on AWS.pptx
@@ -231,7 +231,7 @@
           <a:p>
             <a:fld id="{8963D1AE-04B2-F147-8122-2A32BD7879DD}" type="datetimeFigureOut">
               <a:rPr lang="en-US" smtClean="0"/>
-              <a:t>6/2/2025</a:t>
+              <a:t>7/10/2025</a:t>
             </a:fld>
             <a:endParaRPr lang="en-US"/>
           </a:p>
@@ -1531,7 +1531,7 @@
         <p:spPr>
           <a:xfrm>
             <a:off x="9193242" y="37717"/>
-            <a:ext cx="3011914" cy="4411464"/>
+            <a:ext cx="3011914" cy="5391219"/>
           </a:xfrm>
           <a:prstGeom prst="rect">
             <a:avLst/>
@@ -1603,7 +1603,50 @@
                 <a:ea typeface="Amazon Ember" panose="020B0603020204020204" pitchFamily="34" charset="0"/>
                 <a:cs typeface="Arial" panose="020B0604020202020204" pitchFamily="34" charset="0"/>
               </a:rPr>
-              <a:t>System administrator deploys solution to AWS account and region using AWS Cloud Development Kit or Terraform.</a:t>
+              <a:t>Administrator user deploys guidance to AWS account and Region using </a:t>
+            </a:r>
+            <a:r>
+              <a:rPr lang="en-US" sz="900" b="1" dirty="0">
+                <a:latin typeface="Arial" panose="020B0604020202020204" pitchFamily="34" charset="0"/>
+                <a:ea typeface="Amazon Ember" panose="020B0603020204020204" pitchFamily="34" charset="0"/>
+                <a:cs typeface="Arial" panose="020B0604020202020204" pitchFamily="34" charset="0"/>
+                <a:hlinkClick r:id="rId3"/>
+              </a:rPr>
+              <a:t>AWS Cloud Development Kit (CDK)</a:t>
+            </a:r>
+            <a:r>
+              <a:rPr lang="en-US" sz="900" dirty="0">
+                <a:latin typeface="Arial" panose="020B0604020202020204" pitchFamily="34" charset="0"/>
+                <a:ea typeface="Amazon Ember" panose="020B0603020204020204" pitchFamily="34" charset="0"/>
+                <a:cs typeface="Arial" panose="020B0604020202020204" pitchFamily="34" charset="0"/>
+                <a:hlinkClick r:id="rId3"/>
+              </a:rPr>
+              <a:t> </a:t>
+            </a:r>
+            <a:r>
+              <a:rPr lang="en-US" sz="900" dirty="0">
+                <a:latin typeface="Arial" panose="020B0604020202020204" pitchFamily="34" charset="0"/>
+                <a:ea typeface="Amazon Ember" panose="020B0603020204020204" pitchFamily="34" charset="0"/>
+                <a:cs typeface="Arial" panose="020B0604020202020204" pitchFamily="34" charset="0"/>
+              </a:rPr>
+              <a:t>or </a:t>
+            </a:r>
+            <a:r>
+              <a:rPr lang="en-US" sz="900" b="1" dirty="0">
+                <a:latin typeface="Arial" panose="020B0604020202020204" pitchFamily="34" charset="0"/>
+                <a:ea typeface="Amazon Ember" panose="020B0603020204020204" pitchFamily="34" charset="0"/>
+                <a:cs typeface="Arial" panose="020B0604020202020204" pitchFamily="34" charset="0"/>
+                <a:hlinkClick r:id="rId4"/>
+              </a:rPr>
+              <a:t>Terraform</a:t>
+            </a:r>
+            <a:r>
+              <a:rPr lang="en-US" sz="900" dirty="0">
+                <a:latin typeface="Arial" panose="020B0604020202020204" pitchFamily="34" charset="0"/>
+                <a:ea typeface="Amazon Ember" panose="020B0603020204020204" pitchFamily="34" charset="0"/>
+                <a:cs typeface="Arial" panose="020B0604020202020204" pitchFamily="34" charset="0"/>
+              </a:rPr>
+              <a:t>.</a:t>
             </a:r>
           </a:p>
           <a:p>
@@ -1642,7 +1685,160 @@
                 <a:ea typeface="Amazon Ember" panose="020B0603020204020204" pitchFamily="34" charset="0"/>
                 <a:cs typeface="Arial" panose="020B0604020202020204" pitchFamily="34" charset="0"/>
               </a:rPr>
-              <a:t>The first stack to deploy will create all of the AWS resources needed to host the solution. This includes creating S3 buckets, Lambda functions, a DynamoDB table, IAM permissions, ECR image, resource ARNs in Parameter Store, and an SNS topic is created.</a:t>
+              <a:t>The Base </a:t>
+            </a:r>
+            <a:r>
+              <a:rPr lang="en-US" sz="900" b="1" dirty="0">
+                <a:latin typeface="Arial" panose="020B0604020202020204" pitchFamily="34" charset="0"/>
+                <a:ea typeface="Amazon Ember" panose="020B0603020204020204" pitchFamily="34" charset="0"/>
+                <a:cs typeface="Arial" panose="020B0604020202020204" pitchFamily="34" charset="0"/>
+                <a:hlinkClick r:id="rId5"/>
+              </a:rPr>
+              <a:t>AWS Cloud Formation </a:t>
+            </a:r>
+            <a:r>
+              <a:rPr lang="en-US" sz="900" dirty="0">
+                <a:latin typeface="Arial" panose="020B0604020202020204" pitchFamily="34" charset="0"/>
+                <a:ea typeface="Amazon Ember" panose="020B0603020204020204" pitchFamily="34" charset="0"/>
+                <a:cs typeface="Arial" panose="020B0604020202020204" pitchFamily="34" charset="0"/>
+              </a:rPr>
+              <a:t>stack to deploy will create all of the AWS resources needed to host the guidance. This includes: </a:t>
+            </a:r>
+            <a:r>
+              <a:rPr lang="en-US" sz="900" b="1" dirty="0">
+                <a:latin typeface="Arial" panose="020B0604020202020204" pitchFamily="34" charset="0"/>
+                <a:ea typeface="Amazon Ember" panose="020B0603020204020204" pitchFamily="34" charset="0"/>
+                <a:cs typeface="Arial" panose="020B0604020202020204" pitchFamily="34" charset="0"/>
+                <a:hlinkClick r:id="rId6"/>
+              </a:rPr>
+              <a:t>Amazon Simple Storage Service (S3)</a:t>
+            </a:r>
+            <a:r>
+              <a:rPr lang="en-US" sz="900" dirty="0">
+                <a:latin typeface="Arial" panose="020B0604020202020204" pitchFamily="34" charset="0"/>
+                <a:ea typeface="Amazon Ember" panose="020B0603020204020204" pitchFamily="34" charset="0"/>
+                <a:cs typeface="Arial" panose="020B0604020202020204" pitchFamily="34" charset="0"/>
+              </a:rPr>
+              <a:t> bucket, </a:t>
+            </a:r>
+            <a:r>
+              <a:rPr lang="en-US" sz="900" b="1" dirty="0">
+                <a:latin typeface="Arial" panose="020B0604020202020204" pitchFamily="34" charset="0"/>
+                <a:ea typeface="Amazon Ember" panose="020B0603020204020204" pitchFamily="34" charset="0"/>
+                <a:cs typeface="Arial" panose="020B0604020202020204" pitchFamily="34" charset="0"/>
+                <a:hlinkClick r:id="rId7"/>
+              </a:rPr>
+              <a:t>AWS Lambda</a:t>
+            </a:r>
+            <a:r>
+              <a:rPr lang="en-US" sz="900" dirty="0">
+                <a:latin typeface="Arial" panose="020B0604020202020204" pitchFamily="34" charset="0"/>
+                <a:ea typeface="Amazon Ember" panose="020B0603020204020204" pitchFamily="34" charset="0"/>
+                <a:cs typeface="Arial" panose="020B0604020202020204" pitchFamily="34" charset="0"/>
+              </a:rPr>
+              <a:t> functions, an </a:t>
+            </a:r>
+            <a:r>
+              <a:rPr lang="en-US" sz="900" b="1" dirty="0">
+                <a:latin typeface="Arial" panose="020B0604020202020204" pitchFamily="34" charset="0"/>
+                <a:ea typeface="Amazon Ember" panose="020B0603020204020204" pitchFamily="34" charset="0"/>
+                <a:cs typeface="Arial" panose="020B0604020202020204" pitchFamily="34" charset="0"/>
+                <a:hlinkClick r:id="rId8"/>
+              </a:rPr>
+              <a:t>Amazon DynamoDB</a:t>
+            </a:r>
+            <a:r>
+              <a:rPr lang="en-US" sz="900" dirty="0">
+                <a:latin typeface="Arial" panose="020B0604020202020204" pitchFamily="34" charset="0"/>
+                <a:ea typeface="Amazon Ember" panose="020B0603020204020204" pitchFamily="34" charset="0"/>
+                <a:cs typeface="Arial" panose="020B0604020202020204" pitchFamily="34" charset="0"/>
+              </a:rPr>
+              <a:t> table, necessary </a:t>
+            </a:r>
+            <a:r>
+              <a:rPr lang="en-US" sz="900" b="1" dirty="0">
+                <a:latin typeface="Arial" panose="020B0604020202020204" pitchFamily="34" charset="0"/>
+                <a:ea typeface="Amazon Ember" panose="020B0603020204020204" pitchFamily="34" charset="0"/>
+                <a:cs typeface="Arial" panose="020B0604020202020204" pitchFamily="34" charset="0"/>
+                <a:hlinkClick r:id="rId9"/>
+              </a:rPr>
+              <a:t>AWS Identity and Access Management (IAM)</a:t>
+            </a:r>
+            <a:r>
+              <a:rPr lang="en-US" sz="900" dirty="0">
+                <a:latin typeface="Arial" panose="020B0604020202020204" pitchFamily="34" charset="0"/>
+                <a:ea typeface="Amazon Ember" panose="020B0603020204020204" pitchFamily="34" charset="0"/>
+                <a:cs typeface="Arial" panose="020B0604020202020204" pitchFamily="34" charset="0"/>
+              </a:rPr>
+              <a:t> permissions, </a:t>
+            </a:r>
+            <a:r>
+              <a:rPr lang="en-US" sz="900" b="1" dirty="0">
+                <a:latin typeface="Arial" panose="020B0604020202020204" pitchFamily="34" charset="0"/>
+                <a:ea typeface="Amazon Ember" panose="020B0603020204020204" pitchFamily="34" charset="0"/>
+                <a:cs typeface="Arial" panose="020B0604020202020204" pitchFamily="34" charset="0"/>
+                <a:hlinkClick r:id="rId10"/>
+              </a:rPr>
+              <a:t>Amazon Elastic Container Registry (ECR)</a:t>
+            </a:r>
+            <a:r>
+              <a:rPr lang="en-US" sz="900" dirty="0">
+                <a:latin typeface="Arial" panose="020B0604020202020204" pitchFamily="34" charset="0"/>
+                <a:ea typeface="Amazon Ember" panose="020B0603020204020204" pitchFamily="34" charset="0"/>
+                <a:cs typeface="Arial" panose="020B0604020202020204" pitchFamily="34" charset="0"/>
+              </a:rPr>
+              <a:t> image registry, </a:t>
+            </a:r>
+            <a:r>
+              <a:rPr lang="en-US" sz="900" b="1" dirty="0">
+                <a:latin typeface="Arial" panose="020B0604020202020204" pitchFamily="34" charset="0"/>
+                <a:ea typeface="Amazon Ember" panose="020B0603020204020204" pitchFamily="34" charset="0"/>
+                <a:cs typeface="Arial" panose="020B0604020202020204" pitchFamily="34" charset="0"/>
+                <a:hlinkClick r:id="rId11"/>
+              </a:rPr>
+              <a:t>AWS Step Functions State Machine</a:t>
+            </a:r>
+            <a:r>
+              <a:rPr lang="en-US" sz="900" dirty="0">
+                <a:latin typeface="Arial" panose="020B0604020202020204" pitchFamily="34" charset="0"/>
+                <a:ea typeface="Amazon Ember" panose="020B0603020204020204" pitchFamily="34" charset="0"/>
+                <a:cs typeface="Arial" panose="020B0604020202020204" pitchFamily="34" charset="0"/>
+              </a:rPr>
+              <a:t> resource ID in </a:t>
+            </a:r>
+            <a:r>
+              <a:rPr lang="en-US" sz="900" b="1" dirty="0">
+                <a:latin typeface="Arial" panose="020B0604020202020204" pitchFamily="34" charset="0"/>
+                <a:ea typeface="Amazon Ember" panose="020B0603020204020204" pitchFamily="34" charset="0"/>
+                <a:cs typeface="Arial" panose="020B0604020202020204" pitchFamily="34" charset="0"/>
+                <a:hlinkClick r:id="rId12"/>
+              </a:rPr>
+              <a:t>AWS Systems Manager Parameter Store</a:t>
+            </a:r>
+            <a:r>
+              <a:rPr lang="en-US" sz="900" dirty="0">
+                <a:latin typeface="Arial" panose="020B0604020202020204" pitchFamily="34" charset="0"/>
+                <a:ea typeface="Amazon Ember" panose="020B0603020204020204" pitchFamily="34" charset="0"/>
+                <a:cs typeface="Arial" panose="020B0604020202020204" pitchFamily="34" charset="0"/>
+              </a:rPr>
+              <a:t>, and an </a:t>
+            </a:r>
+            <a:r>
+              <a:rPr lang="en-US" sz="900" b="1" dirty="0">
+                <a:latin typeface="Arial" panose="020B0604020202020204" pitchFamily="34" charset="0"/>
+                <a:ea typeface="Amazon Ember" panose="020B0603020204020204" pitchFamily="34" charset="0"/>
+                <a:cs typeface="Arial" panose="020B0604020202020204" pitchFamily="34" charset="0"/>
+                <a:hlinkClick r:id="rId13"/>
+              </a:rPr>
+              <a:t>Amazon Simple Notification Service (SNS)</a:t>
+            </a:r>
+            <a:r>
+              <a:rPr lang="en-US" sz="900" dirty="0">
+                <a:latin typeface="Arial" panose="020B0604020202020204" pitchFamily="34" charset="0"/>
+                <a:ea typeface="Amazon Ember" panose="020B0603020204020204" pitchFamily="34" charset="0"/>
+                <a:cs typeface="Arial" panose="020B0604020202020204" pitchFamily="34" charset="0"/>
+              </a:rPr>
+              <a:t> topic created.</a:t>
             </a:r>
           </a:p>
           <a:p>
@@ -1675,25 +1871,93 @@
                 <a:spcPts val="1000"/>
               </a:spcAft>
             </a:pPr>
-            <a:endParaRPr lang="en-US" sz="900" dirty="0">
-              <a:latin typeface="Arial" panose="020B0604020202020204" pitchFamily="34" charset="0"/>
-              <a:ea typeface="Amazon Ember" panose="020B0603020204020204" pitchFamily="34" charset="0"/>
-              <a:cs typeface="Arial" panose="020B0604020202020204" pitchFamily="34" charset="0"/>
-            </a:endParaRPr>
-          </a:p>
-          <a:p>
-            <a:pPr>
-              <a:spcAft>
-                <a:spcPts val="1000"/>
-              </a:spcAft>
-            </a:pPr>
             <a:r>
               <a:rPr lang="en-US" sz="900" dirty="0">
                 <a:latin typeface="Arial" panose="020B0604020202020204" pitchFamily="34" charset="0"/>
                 <a:ea typeface="Amazon Ember" panose="020B0603020204020204" pitchFamily="34" charset="0"/>
                 <a:cs typeface="Arial" panose="020B0604020202020204" pitchFamily="34" charset="0"/>
               </a:rPr>
-              <a:t>Once the base stack has been deployed, the post deploy stack should be deployed. This stack will build docker container, push it to ECR, and also build and push the models used during training into S3.</a:t>
+              <a:t>Once the Base </a:t>
+            </a:r>
+            <a:r>
+              <a:rPr lang="en-US" sz="900" b="1" dirty="0">
+                <a:latin typeface="Arial" panose="020B0604020202020204" pitchFamily="34" charset="0"/>
+                <a:ea typeface="Amazon Ember" panose="020B0603020204020204" pitchFamily="34" charset="0"/>
+                <a:cs typeface="Arial" panose="020B0604020202020204" pitchFamily="34" charset="0"/>
+              </a:rPr>
+              <a:t>AWS Cloud Formation </a:t>
+            </a:r>
+            <a:r>
+              <a:rPr lang="en-US" sz="900" dirty="0">
+                <a:latin typeface="Arial" panose="020B0604020202020204" pitchFamily="34" charset="0"/>
+                <a:ea typeface="Amazon Ember" panose="020B0603020204020204" pitchFamily="34" charset="0"/>
+                <a:cs typeface="Arial" panose="020B0604020202020204" pitchFamily="34" charset="0"/>
+              </a:rPr>
+              <a:t>stack has been deployed, the Post Deploy </a:t>
+            </a:r>
+            <a:r>
+              <a:rPr lang="en-US" sz="900" b="1" dirty="0">
+                <a:latin typeface="Arial" panose="020B0604020202020204" pitchFamily="34" charset="0"/>
+                <a:ea typeface="Amazon Ember" panose="020B0603020204020204" pitchFamily="34" charset="0"/>
+                <a:cs typeface="Arial" panose="020B0604020202020204" pitchFamily="34" charset="0"/>
+              </a:rPr>
+              <a:t>AWS Cloud Formation</a:t>
+            </a:r>
+            <a:r>
+              <a:rPr lang="en-US" sz="900" dirty="0">
+                <a:latin typeface="Arial" panose="020B0604020202020204" pitchFamily="34" charset="0"/>
+                <a:ea typeface="Amazon Ember" panose="020B0603020204020204" pitchFamily="34" charset="0"/>
+                <a:cs typeface="Arial" panose="020B0604020202020204" pitchFamily="34" charset="0"/>
+              </a:rPr>
+              <a:t> stack should be deployed. That stack will build Docker container, push it to the </a:t>
+            </a:r>
+            <a:r>
+              <a:rPr lang="en-US" sz="900" b="1" dirty="0">
+                <a:latin typeface="Arial" panose="020B0604020202020204" pitchFamily="34" charset="0"/>
+                <a:ea typeface="Amazon Ember" panose="020B0603020204020204" pitchFamily="34" charset="0"/>
+                <a:cs typeface="Arial" panose="020B0604020202020204" pitchFamily="34" charset="0"/>
+              </a:rPr>
+              <a:t>Amazon ECR</a:t>
+            </a:r>
+            <a:r>
+              <a:rPr lang="en-US" sz="900" dirty="0">
+                <a:latin typeface="Arial" panose="020B0604020202020204" pitchFamily="34" charset="0"/>
+                <a:ea typeface="Amazon Ember" panose="020B0603020204020204" pitchFamily="34" charset="0"/>
+                <a:cs typeface="Arial" panose="020B0604020202020204" pitchFamily="34" charset="0"/>
+              </a:rPr>
+              <a:t> registry, and also build and push the pre-processing models used during training, such as for background removal, into </a:t>
+            </a:r>
+            <a:r>
+              <a:rPr lang="en-US" sz="900" b="1" dirty="0">
+                <a:latin typeface="Arial" panose="020B0604020202020204" pitchFamily="34" charset="0"/>
+                <a:ea typeface="Amazon Ember" panose="020B0603020204020204" pitchFamily="34" charset="0"/>
+                <a:cs typeface="Arial" panose="020B0604020202020204" pitchFamily="34" charset="0"/>
+              </a:rPr>
+              <a:t>Amazon S3 </a:t>
+            </a:r>
+            <a:r>
+              <a:rPr lang="en-US" sz="900" dirty="0">
+                <a:latin typeface="Arial" panose="020B0604020202020204" pitchFamily="34" charset="0"/>
+                <a:ea typeface="Amazon Ember" panose="020B0603020204020204" pitchFamily="34" charset="0"/>
+                <a:cs typeface="Arial" panose="020B0604020202020204" pitchFamily="34" charset="0"/>
+              </a:rPr>
+              <a:t>bucket using </a:t>
+            </a:r>
+            <a:r>
+              <a:rPr lang="en-US" sz="900" b="1" dirty="0">
+                <a:latin typeface="Arial" panose="020B0604020202020204" pitchFamily="34" charset="0"/>
+                <a:ea typeface="Amazon Ember" panose="020B0603020204020204" pitchFamily="34" charset="0"/>
+                <a:cs typeface="Arial" panose="020B0604020202020204" pitchFamily="34" charset="0"/>
+              </a:rPr>
+              <a:t>AWS Lambda</a:t>
+            </a:r>
+            <a:r>
+              <a:rPr lang="en-US" sz="900" dirty="0">
+                <a:latin typeface="Arial" panose="020B0604020202020204" pitchFamily="34" charset="0"/>
+                <a:ea typeface="Amazon Ember" panose="020B0603020204020204" pitchFamily="34" charset="0"/>
+                <a:cs typeface="Arial" panose="020B0604020202020204" pitchFamily="34" charset="0"/>
+              </a:rPr>
+              <a:t>.</a:t>
             </a:r>
           </a:p>
         </p:txBody>
@@ -1714,7 +1978,7 @@
         </p:nvSpPr>
         <p:spPr bwMode="auto">
           <a:xfrm>
-            <a:off x="8925452" y="1218372"/>
+            <a:off x="8924276" y="1178904"/>
             <a:ext cx="274320" cy="274320"/>
           </a:xfrm>
           <a:prstGeom prst="ellipse">
@@ -1785,7 +2049,7 @@
         </p:nvSpPr>
         <p:spPr bwMode="auto">
           <a:xfrm>
-            <a:off x="8917903" y="2413307"/>
+            <a:off x="8924276" y="2245273"/>
             <a:ext cx="274320" cy="274320"/>
           </a:xfrm>
           <a:prstGeom prst="ellipse">
@@ -1856,7 +2120,7 @@
         </p:nvSpPr>
         <p:spPr bwMode="auto">
           <a:xfrm>
-            <a:off x="8925452" y="3948657"/>
+            <a:off x="8924276" y="4377335"/>
             <a:ext cx="274320" cy="274320"/>
           </a:xfrm>
           <a:prstGeom prst="ellipse">
@@ -2030,73 +2294,15 @@
           <a:p>
             <a:pPr algn="ctr"/>
             <a:r>
-              <a:rPr lang="en-US" sz="1200" dirty="0">
+              <a:rPr lang="en-US" sz="1000" dirty="0">
                 <a:solidFill>
                   <a:schemeClr val="tx1"/>
                 </a:solidFill>
                 <a:latin typeface="Arial" panose="020B0604020202020204" pitchFamily="34" charset="0"/>
                 <a:cs typeface="Arial" panose="020B0604020202020204" pitchFamily="34" charset="0"/>
               </a:rPr>
-              <a:t>Solution Deployment</a:t>
-            </a:r>
-          </a:p>
-        </p:txBody>
-      </p:sp>
-      <p:sp>
-        <p:nvSpPr>
-          <p:cNvPr id="780" name="Rectangle 779">
-            <a:extLst>
-              <a:ext uri="{FF2B5EF4-FFF2-40B4-BE49-F238E27FC236}">
-                <a16:creationId xmlns:a16="http://schemas.microsoft.com/office/drawing/2014/main" id="{D61E1E96-0A1C-4158-A048-53015436567F}"/>
-              </a:ext>
-            </a:extLst>
-          </p:cNvPr>
-          <p:cNvSpPr/>
-          <p:nvPr/>
-        </p:nvSpPr>
-        <p:spPr>
-          <a:xfrm>
-            <a:off x="3058115" y="1421694"/>
-            <a:ext cx="396194" cy="379893"/>
-          </a:xfrm>
-          <a:prstGeom prst="rect">
-            <a:avLst/>
-          </a:prstGeom>
-          <a:solidFill>
-            <a:schemeClr val="tx1"/>
-          </a:solidFill>
-          <a:ln>
-            <a:solidFill>
-              <a:schemeClr val="tx1"/>
-            </a:solidFill>
-          </a:ln>
-        </p:spPr>
-        <p:style>
-          <a:lnRef idx="2">
-            <a:schemeClr val="accent1">
-              <a:shade val="50000"/>
-            </a:schemeClr>
-          </a:lnRef>
-          <a:fillRef idx="1">
-            <a:schemeClr val="accent1"/>
-          </a:fillRef>
-          <a:effectRef idx="0">
-            <a:schemeClr val="accent1"/>
-          </a:effectRef>
-          <a:fontRef idx="minor">
-            <a:schemeClr val="lt1"/>
-          </a:fontRef>
-        </p:style>
-        <p:txBody>
-          <a:bodyPr rtlCol="0" anchor="t"/>
-          <a:lstStyle/>
-          <a:p>
-            <a:pPr algn="ctr"/>
-            <a:endParaRPr lang="en-US" sz="1200" dirty="0">
-              <a:solidFill>
-                <a:schemeClr val="tx1"/>
-              </a:solidFill>
-            </a:endParaRPr>
+              <a:t>Guidance Deployment</a:t>
+            </a:r>
           </a:p>
         </p:txBody>
       </p:sp>
@@ -2192,10 +2398,10 @@
           <p:nvPr/>
         </p:nvPicPr>
         <p:blipFill>
-          <a:blip r:embed="rId3">
+          <a:blip r:embed="rId14">
             <a:extLst>
               <a:ext uri="{96DAC541-7B7A-43D3-8B79-37D633B846F1}">
-                <asvg:svgBlip xmlns:asvg="http://schemas.microsoft.com/office/drawing/2016/SVG/main" r:embed="rId4"/>
+                <asvg:svgBlip xmlns:asvg="http://schemas.microsoft.com/office/drawing/2016/SVG/main" r:embed="rId15"/>
               </a:ext>
             </a:extLst>
           </a:blip>
@@ -2205,7 +2411,7 @@
         <p:spPr>
           <a:xfrm>
             <a:off x="3196067" y="1909287"/>
-            <a:ext cx="381000" cy="381000"/>
+            <a:ext cx="274320" cy="274320"/>
           </a:xfrm>
           <a:prstGeom prst="rect">
             <a:avLst/>
@@ -2228,7 +2434,7 @@
         </p:nvSpPr>
         <p:spPr bwMode="auto">
           <a:xfrm>
-            <a:off x="970128" y="2096180"/>
+            <a:off x="759452" y="3254036"/>
             <a:ext cx="274320" cy="274320"/>
           </a:xfrm>
           <a:prstGeom prst="ellipse">
@@ -2283,36 +2489,6 @@
           </a:p>
         </p:txBody>
       </p:sp>
-      <p:pic>
-        <p:nvPicPr>
-          <p:cNvPr id="800" name="Picture 799">
-            <a:extLst>
-              <a:ext uri="{FF2B5EF4-FFF2-40B4-BE49-F238E27FC236}">
-                <a16:creationId xmlns:a16="http://schemas.microsoft.com/office/drawing/2014/main" id="{44C9F08A-BDDB-431B-ABD7-2394A50704DD}"/>
-              </a:ext>
-            </a:extLst>
-          </p:cNvPr>
-          <p:cNvPicPr>
-            <a:picLocks noChangeAspect="1"/>
-          </p:cNvPicPr>
-          <p:nvPr/>
-        </p:nvPicPr>
-        <p:blipFill>
-          <a:blip r:embed="rId5"/>
-          <a:stretch>
-            <a:fillRect/>
-          </a:stretch>
-        </p:blipFill>
-        <p:spPr>
-          <a:xfrm>
-            <a:off x="3064211" y="1467097"/>
-            <a:ext cx="389927" cy="300389"/>
-          </a:xfrm>
-          <a:prstGeom prst="rect">
-            <a:avLst/>
-          </a:prstGeom>
-        </p:spPr>
-      </p:pic>
       <p:sp>
         <p:nvSpPr>
           <p:cNvPr id="802" name="Rectangle 801">
@@ -2327,8 +2503,8 @@
         </p:nvSpPr>
         <p:spPr>
           <a:xfrm>
-            <a:off x="3430367" y="2397988"/>
-            <a:ext cx="4866088" cy="1960990"/>
+            <a:off x="3566319" y="2397988"/>
+            <a:ext cx="4883998" cy="1960990"/>
           </a:xfrm>
           <a:prstGeom prst="rect">
             <a:avLst/>
@@ -2370,58 +2546,11 @@
                 <a:latin typeface="Arial" panose="020B0604020202020204" pitchFamily="34" charset="0"/>
                 <a:cs typeface="Arial" panose="020B0604020202020204" pitchFamily="34" charset="0"/>
               </a:rPr>
-              <a:t>Base Stack (create resources)</a:t>
+              <a:t>Base AWS Cloud Formation Stack</a:t>
             </a:r>
           </a:p>
         </p:txBody>
       </p:sp>
-      <p:cxnSp>
-        <p:nvCxnSpPr>
-          <p:cNvPr id="807" name="Connector: Elbow 806">
-            <a:extLst>
-              <a:ext uri="{FF2B5EF4-FFF2-40B4-BE49-F238E27FC236}">
-                <a16:creationId xmlns:a16="http://schemas.microsoft.com/office/drawing/2014/main" id="{0AFE0042-003E-4F0F-8032-0C1B8D268593}"/>
-              </a:ext>
-            </a:extLst>
-          </p:cNvPr>
-          <p:cNvCxnSpPr>
-            <a:cxnSpLocks/>
-          </p:cNvCxnSpPr>
-          <p:nvPr/>
-        </p:nvCxnSpPr>
-        <p:spPr>
-          <a:xfrm rot="10800000">
-            <a:off x="806000" y="3704419"/>
-            <a:ext cx="312588" cy="1"/>
-          </a:xfrm>
-          <a:prstGeom prst="bentConnector3">
-            <a:avLst>
-              <a:gd name="adj1" fmla="val 50000"/>
-            </a:avLst>
-          </a:prstGeom>
-          <a:ln w="19050">
-            <a:solidFill>
-              <a:schemeClr val="tx1"/>
-            </a:solidFill>
-            <a:headEnd type="triangle" w="med" len="med"/>
-            <a:tailEnd type="none" w="med" len="med"/>
-          </a:ln>
-        </p:spPr>
-        <p:style>
-          <a:lnRef idx="1">
-            <a:schemeClr val="accent1"/>
-          </a:lnRef>
-          <a:fillRef idx="0">
-            <a:schemeClr val="accent1"/>
-          </a:fillRef>
-          <a:effectRef idx="0">
-            <a:schemeClr val="accent1"/>
-          </a:effectRef>
-          <a:fontRef idx="minor">
-            <a:schemeClr val="tx1"/>
-          </a:fontRef>
-        </p:style>
-      </p:cxnSp>
       <p:grpSp>
         <p:nvGrpSpPr>
           <p:cNvPr id="105" name="Group 104">
@@ -2436,10 +2565,10 @@
         </p:nvGrpSpPr>
         <p:grpSpPr>
           <a:xfrm>
-            <a:off x="-3962" y="3262870"/>
-            <a:ext cx="856008" cy="899734"/>
-            <a:chOff x="61480" y="4552805"/>
-            <a:chExt cx="856008" cy="899734"/>
+            <a:off x="6159" y="3389119"/>
+            <a:ext cx="952211" cy="756305"/>
+            <a:chOff x="29425" y="4552805"/>
+            <a:chExt cx="952211" cy="756305"/>
           </a:xfrm>
         </p:grpSpPr>
         <p:sp>
@@ -2458,8 +2587,8 @@
           </p:nvSpPr>
           <p:spPr bwMode="auto">
             <a:xfrm>
-              <a:off x="61480" y="5052429"/>
-              <a:ext cx="856008" cy="400110"/>
+              <a:off x="29425" y="4909000"/>
+              <a:ext cx="952211" cy="400110"/>
             </a:xfrm>
             <a:prstGeom prst="rect">
               <a:avLst/>
@@ -2600,7 +2729,7 @@
                   <a:latin typeface="Arial" panose="020B0604020202020204" pitchFamily="34" charset="0"/>
                   <a:cs typeface="Arial" panose="020B0604020202020204" pitchFamily="34" charset="0"/>
                 </a:rPr>
-                <a:t>Admin</a:t>
+                <a:t>Administrator</a:t>
               </a:r>
             </a:p>
             <a:p>
@@ -2613,7 +2742,7 @@
                   <a:latin typeface="Arial" panose="020B0604020202020204" pitchFamily="34" charset="0"/>
                   <a:cs typeface="Arial" panose="020B0604020202020204" pitchFamily="34" charset="0"/>
                 </a:rPr>
-                <a:t>IAM user</a:t>
+                <a:t>User</a:t>
               </a:r>
             </a:p>
           </p:txBody>
@@ -2628,12 +2757,12 @@
               </a:extLst>
             </p:cNvPr>
             <p:cNvPicPr>
-              <a:picLocks noChangeAspect="1"/>
+              <a:picLocks/>
             </p:cNvPicPr>
             <p:nvPr/>
           </p:nvPicPr>
           <p:blipFill>
-            <a:blip r:embed="rId6" cstate="print">
+            <a:blip r:embed="rId16" cstate="print">
               <a:extLst>
                 <a:ext uri="{28A0092B-C50C-407E-A947-70E740481C1C}">
                   <a14:useLocalDpi xmlns:a14="http://schemas.microsoft.com/office/drawing/2010/main" val="0"/>
@@ -2647,7 +2776,7 @@
           <p:spPr>
             <a:xfrm>
               <a:off x="268047" y="4552805"/>
-              <a:ext cx="562734" cy="539858"/>
+              <a:ext cx="365760" cy="365760"/>
             </a:xfrm>
             <a:prstGeom prst="rect">
               <a:avLst/>
@@ -2669,10 +2798,10 @@
         </p:nvGrpSpPr>
         <p:grpSpPr>
           <a:xfrm>
-            <a:off x="1095735" y="2913564"/>
-            <a:ext cx="1649280" cy="861109"/>
-            <a:chOff x="2061911" y="-3835337"/>
-            <a:chExt cx="1649280" cy="861109"/>
+            <a:off x="1121544" y="2913564"/>
+            <a:ext cx="1649280" cy="775088"/>
+            <a:chOff x="2087720" y="-3835337"/>
+            <a:chExt cx="1649280" cy="775088"/>
           </a:xfrm>
         </p:grpSpPr>
         <p:pic>
@@ -2690,10 +2819,10 @@
             <p:nvPr/>
           </p:nvPicPr>
           <p:blipFill>
-            <a:blip r:embed="rId7">
+            <a:blip r:embed="rId17">
               <a:extLst>
                 <a:ext uri="{96DAC541-7B7A-43D3-8B79-37D633B846F1}">
-                  <asvg:svgBlip xmlns:asvg="http://schemas.microsoft.com/office/drawing/2016/SVG/main" r:embed="rId8"/>
+                  <asvg:svgBlip xmlns:asvg="http://schemas.microsoft.com/office/drawing/2016/SVG/main" r:embed="rId18"/>
                 </a:ext>
               </a:extLst>
             </a:blip>
@@ -2702,8 +2831,8 @@
           </p:blipFill>
           <p:spPr bwMode="auto">
             <a:xfrm>
-              <a:off x="2649840" y="-3835337"/>
-              <a:ext cx="457200" cy="457200"/>
+              <a:off x="2715620" y="-3835337"/>
+              <a:ext cx="365760" cy="365760"/>
             </a:xfrm>
             <a:prstGeom prst="rect">
               <a:avLst/>
@@ -2749,8 +2878,8 @@
           </p:nvSpPr>
           <p:spPr bwMode="auto">
             <a:xfrm>
-              <a:off x="2061911" y="-3374338"/>
-              <a:ext cx="1649280" cy="400110"/>
+              <a:off x="2087720" y="-3429581"/>
+              <a:ext cx="1649280" cy="369332"/>
             </a:xfrm>
             <a:prstGeom prst="rect">
               <a:avLst/>
@@ -2884,7 +3013,7 @@
             <a:p>
               <a:pPr algn="ctr" eaLnBrk="1" hangingPunct="1"/>
               <a:r>
-                <a:rPr lang="en-US" altLang="en-US" sz="1000" dirty="0">
+                <a:rPr lang="en-US" altLang="en-US" sz="900" dirty="0">
                   <a:solidFill>
                     <a:sysClr val="windowText" lastClr="000000"/>
                   </a:solidFill>
@@ -2892,13 +3021,13 @@
                   <a:ea typeface="Amazon Ember" panose="020B0603020204020204" pitchFamily="34" charset="0"/>
                   <a:cs typeface="Arial" panose="020B0604020202020204" pitchFamily="34" charset="0"/>
                 </a:rPr>
-                <a:t>AWS</a:t>
+                <a:t>AWS Cloud </a:t>
               </a:r>
             </a:p>
             <a:p>
               <a:pPr algn="ctr" eaLnBrk="1" hangingPunct="1"/>
               <a:r>
-                <a:rPr lang="en-US" altLang="en-US" sz="1000" dirty="0">
+                <a:rPr lang="en-US" altLang="en-US" sz="900" dirty="0">
                   <a:solidFill>
                     <a:sysClr val="windowText" lastClr="000000"/>
                   </a:solidFill>
@@ -2906,7 +3035,7 @@
                   <a:ea typeface="Amazon Ember" panose="020B0603020204020204" pitchFamily="34" charset="0"/>
                   <a:cs typeface="Arial" panose="020B0604020202020204" pitchFamily="34" charset="0"/>
                 </a:rPr>
-                <a:t>Cloud Development Kit</a:t>
+                <a:t>Development Kit</a:t>
               </a:r>
             </a:p>
           </p:txBody>
@@ -2927,7 +3056,7 @@
           <p:nvPr/>
         </p:nvPicPr>
         <p:blipFill>
-          <a:blip r:embed="rId9" cstate="print">
+          <a:blip r:embed="rId19" cstate="print">
             <a:extLst>
               <a:ext uri="{28A0092B-C50C-407E-A947-70E740481C1C}">
                 <a14:useLocalDpi xmlns:a14="http://schemas.microsoft.com/office/drawing/2010/main" val="0"/>
@@ -2950,41 +3079,6 @@
       </p:pic>
       <p:sp>
         <p:nvSpPr>
-          <p:cNvPr id="115" name="TextBox 114">
-            <a:extLst>
-              <a:ext uri="{FF2B5EF4-FFF2-40B4-BE49-F238E27FC236}">
-                <a16:creationId xmlns:a16="http://schemas.microsoft.com/office/drawing/2014/main" id="{311F3D4C-EF37-4F61-8686-FEBDF46E0FFD}"/>
-              </a:ext>
-            </a:extLst>
-          </p:cNvPr>
-          <p:cNvSpPr txBox="1"/>
-          <p:nvPr/>
-        </p:nvSpPr>
-        <p:spPr>
-          <a:xfrm>
-            <a:off x="1744044" y="3901790"/>
-            <a:ext cx="415498" cy="246221"/>
-          </a:xfrm>
-          <a:prstGeom prst="rect">
-            <a:avLst/>
-          </a:prstGeom>
-          <a:noFill/>
-        </p:spPr>
-        <p:txBody>
-          <a:bodyPr wrap="none" rtlCol="0">
-            <a:spAutoFit/>
-          </a:bodyPr>
-          <a:lstStyle/>
-          <a:p>
-            <a:r>
-              <a:rPr lang="en-US" sz="1000" i="1" dirty="0"/>
-              <a:t>-OR-</a:t>
-            </a:r>
-          </a:p>
-        </p:txBody>
-      </p:sp>
-      <p:sp>
-        <p:nvSpPr>
           <p:cNvPr id="117" name="Rectangle 116">
             <a:extLst>
               <a:ext uri="{FF2B5EF4-FFF2-40B4-BE49-F238E27FC236}">
@@ -2997,8 +3091,8 @@
         </p:nvSpPr>
         <p:spPr>
           <a:xfrm>
-            <a:off x="3430367" y="4447774"/>
-            <a:ext cx="4866088" cy="1078070"/>
+            <a:off x="3566317" y="4447773"/>
+            <a:ext cx="4883998" cy="1175997"/>
           </a:xfrm>
           <a:prstGeom prst="rect">
             <a:avLst/>
@@ -3040,7 +3134,7 @@
                 <a:latin typeface="Arial" panose="020B0604020202020204" pitchFamily="34" charset="0"/>
                 <a:cs typeface="Arial" panose="020B0604020202020204" pitchFamily="34" charset="0"/>
               </a:rPr>
-              <a:t>Post Deploy Stack (build container, push to ECR, upload model to S3)</a:t>
+              <a:t>Post Deploy AWS Cloud Formation Stack</a:t>
             </a:r>
           </a:p>
         </p:txBody>
@@ -3064,14 +3158,14 @@
         <p:spPr>
           <a:xfrm rot="10800000" flipV="1">
             <a:off x="2745015" y="3378483"/>
-            <a:ext cx="685352" cy="335730"/>
+            <a:ext cx="821304" cy="335730"/>
           </a:xfrm>
           <a:prstGeom prst="bentConnector3">
             <a:avLst>
-              <a:gd name="adj1" fmla="val 74552"/>
+              <a:gd name="adj1" fmla="val 50000"/>
             </a:avLst>
           </a:prstGeom>
-          <a:ln w="19050">
+          <a:ln w="15875">
             <a:solidFill>
               <a:schemeClr val="tx1"/>
             </a:solidFill>
@@ -3108,10 +3202,10 @@
         </p:nvGrpSpPr>
         <p:grpSpPr>
           <a:xfrm>
-            <a:off x="4082962" y="4701009"/>
-            <a:ext cx="1552507" cy="796759"/>
-            <a:chOff x="1056651" y="5052721"/>
-            <a:chExt cx="1552507" cy="796759"/>
+            <a:off x="4176654" y="4766789"/>
+            <a:ext cx="1669311" cy="601169"/>
+            <a:chOff x="946425" y="5052721"/>
+            <a:chExt cx="1669311" cy="601169"/>
           </a:xfrm>
         </p:grpSpPr>
         <p:pic>
@@ -3129,10 +3223,10 @@
             <p:nvPr/>
           </p:nvPicPr>
           <p:blipFill>
-            <a:blip r:embed="rId10">
+            <a:blip r:embed="rId20">
               <a:extLst>
                 <a:ext uri="{96DAC541-7B7A-43D3-8B79-37D633B846F1}">
-                  <asvg:svgBlip xmlns:asvg="http://schemas.microsoft.com/office/drawing/2016/SVG/main" r:embed="rId11"/>
+                  <asvg:svgBlip xmlns:asvg="http://schemas.microsoft.com/office/drawing/2016/SVG/main" r:embed="rId21"/>
                 </a:ext>
               </a:extLst>
             </a:blip>
@@ -3142,7 +3236,7 @@
           <p:spPr bwMode="auto">
             <a:xfrm>
               <a:off x="1604446" y="5052721"/>
-              <a:ext cx="411480" cy="411480"/>
+              <a:ext cx="365760" cy="365760"/>
             </a:xfrm>
             <a:prstGeom prst="rect">
               <a:avLst/>
@@ -3188,8 +3282,8 @@
           </p:nvSpPr>
           <p:spPr bwMode="auto">
             <a:xfrm>
-              <a:off x="1056651" y="5449370"/>
-              <a:ext cx="1552507" cy="400110"/>
+              <a:off x="946425" y="5423058"/>
+              <a:ext cx="1669311" cy="230832"/>
             </a:xfrm>
             <a:prstGeom prst="rect">
               <a:avLst/>
@@ -3323,23 +3417,12 @@
             <a:p>
               <a:pPr algn="ctr" eaLnBrk="1" hangingPunct="1"/>
               <a:r>
-                <a:rPr lang="en-US" altLang="en-US" sz="1000" dirty="0">
+                <a:rPr lang="en-US" altLang="en-US" sz="900" dirty="0">
                   <a:latin typeface="Arial" panose="020B0604020202020204" pitchFamily="34" charset="0"/>
                   <a:ea typeface="Amazon Ember" panose="020B0603020204020204" pitchFamily="34" charset="0"/>
                   <a:cs typeface="Arial" panose="020B0604020202020204" pitchFamily="34" charset="0"/>
                 </a:rPr>
-                <a:t>Amazon</a:t>
-              </a:r>
-            </a:p>
-            <a:p>
-              <a:pPr algn="ctr" eaLnBrk="1" hangingPunct="1"/>
-              <a:r>
-                <a:rPr lang="en-US" altLang="en-US" sz="1000" dirty="0">
-                  <a:latin typeface="Arial" panose="020B0604020202020204" pitchFamily="34" charset="0"/>
-                  <a:ea typeface="Amazon Ember" panose="020B0603020204020204" pitchFamily="34" charset="0"/>
-                  <a:cs typeface="Arial" panose="020B0604020202020204" pitchFamily="34" charset="0"/>
-                </a:rPr>
-                <a:t>Simple Storage Service</a:t>
+                <a:t>Amazon S3</a:t>
               </a:r>
             </a:p>
           </p:txBody>
@@ -3359,10 +3442,10 @@
         </p:nvGrpSpPr>
         <p:grpSpPr>
           <a:xfrm>
-            <a:off x="4306378" y="3185456"/>
-            <a:ext cx="1669311" cy="952245"/>
-            <a:chOff x="2621740" y="5117922"/>
-            <a:chExt cx="1669311" cy="952245"/>
+            <a:off x="5083722" y="2718916"/>
+            <a:ext cx="1669311" cy="615923"/>
+            <a:chOff x="2569116" y="5117922"/>
+            <a:chExt cx="1669311" cy="615923"/>
           </a:xfrm>
         </p:grpSpPr>
         <p:pic>
@@ -3380,10 +3463,10 @@
             <p:nvPr/>
           </p:nvPicPr>
           <p:blipFill>
-            <a:blip r:embed="rId12">
+            <a:blip r:embed="rId22">
               <a:extLst>
                 <a:ext uri="{96DAC541-7B7A-43D3-8B79-37D633B846F1}">
-                  <asvg:svgBlip xmlns:asvg="http://schemas.microsoft.com/office/drawing/2016/SVG/main" r:embed="rId13"/>
+                  <asvg:svgBlip xmlns:asvg="http://schemas.microsoft.com/office/drawing/2016/SVG/main" r:embed="rId23"/>
                 </a:ext>
               </a:extLst>
             </a:blip>
@@ -3393,7 +3476,7 @@
           <p:spPr bwMode="auto">
             <a:xfrm>
               <a:off x="3215336" y="5117922"/>
-              <a:ext cx="411480" cy="411480"/>
+              <a:ext cx="365760" cy="365760"/>
             </a:xfrm>
             <a:prstGeom prst="rect">
               <a:avLst/>
@@ -3439,8 +3522,8 @@
           </p:nvSpPr>
           <p:spPr bwMode="auto">
             <a:xfrm>
-              <a:off x="2621740" y="5516169"/>
-              <a:ext cx="1669311" cy="553998"/>
+              <a:off x="2569116" y="5503013"/>
+              <a:ext cx="1669311" cy="230832"/>
             </a:xfrm>
             <a:prstGeom prst="rect">
               <a:avLst/>
@@ -3574,34 +3657,12 @@
             <a:p>
               <a:pPr algn="ctr" eaLnBrk="1" hangingPunct="1"/>
               <a:r>
-                <a:rPr lang="en-US" altLang="en-US" sz="1000" dirty="0">
+                <a:rPr lang="en-US" altLang="en-US" sz="900" dirty="0">
                   <a:latin typeface="Arial" panose="020B0604020202020204" pitchFamily="34" charset="0"/>
                   <a:ea typeface="Amazon Ember" panose="020B0603020204020204" pitchFamily="34" charset="0"/>
                   <a:cs typeface="Arial" panose="020B0604020202020204" pitchFamily="34" charset="0"/>
                 </a:rPr>
-                <a:t>Amazon</a:t>
-              </a:r>
-            </a:p>
-            <a:p>
-              <a:pPr algn="ctr" eaLnBrk="1" hangingPunct="1"/>
-              <a:r>
-                <a:rPr lang="en-US" altLang="en-US" sz="1000" dirty="0">
-                  <a:latin typeface="Arial" panose="020B0604020202020204" pitchFamily="34" charset="0"/>
-                  <a:ea typeface="Amazon Ember" panose="020B0603020204020204" pitchFamily="34" charset="0"/>
-                  <a:cs typeface="Arial" panose="020B0604020202020204" pitchFamily="34" charset="0"/>
-                </a:rPr>
-                <a:t>Elastic Container</a:t>
-              </a:r>
-            </a:p>
-            <a:p>
-              <a:pPr algn="ctr" eaLnBrk="1" hangingPunct="1"/>
-              <a:r>
-                <a:rPr lang="en-US" altLang="en-US" sz="1000" dirty="0">
-                  <a:latin typeface="Arial" panose="020B0604020202020204" pitchFamily="34" charset="0"/>
-                  <a:ea typeface="Amazon Ember" panose="020B0603020204020204" pitchFamily="34" charset="0"/>
-                  <a:cs typeface="Arial" panose="020B0604020202020204" pitchFamily="34" charset="0"/>
-                </a:rPr>
-                <a:t>Registry</a:t>
+                <a:t>Amazon ECR</a:t>
               </a:r>
             </a:p>
           </p:txBody>
@@ -3621,10 +3682,10 @@
         </p:nvGrpSpPr>
         <p:grpSpPr>
           <a:xfrm>
-            <a:off x="3443531" y="3189859"/>
-            <a:ext cx="1062603" cy="967412"/>
-            <a:chOff x="970128" y="5232035"/>
-            <a:chExt cx="1062603" cy="967412"/>
+            <a:off x="3515879" y="3275373"/>
+            <a:ext cx="1062603" cy="623829"/>
+            <a:chOff x="943806" y="5232035"/>
+            <a:chExt cx="1062603" cy="623829"/>
           </a:xfrm>
         </p:grpSpPr>
         <p:pic>
@@ -3642,10 +3703,10 @@
             <p:nvPr/>
           </p:nvPicPr>
           <p:blipFill>
-            <a:blip r:embed="rId10">
+            <a:blip r:embed="rId20">
               <a:extLst>
                 <a:ext uri="{96DAC541-7B7A-43D3-8B79-37D633B846F1}">
-                  <asvg:svgBlip xmlns:asvg="http://schemas.microsoft.com/office/drawing/2016/SVG/main" r:embed="rId11"/>
+                  <asvg:svgBlip xmlns:asvg="http://schemas.microsoft.com/office/drawing/2016/SVG/main" r:embed="rId21"/>
                 </a:ext>
               </a:extLst>
             </a:blip>
@@ -3655,7 +3716,7 @@
           <p:spPr bwMode="auto">
             <a:xfrm>
               <a:off x="1300371" y="5232035"/>
-              <a:ext cx="411480" cy="411480"/>
+              <a:ext cx="365760" cy="365760"/>
             </a:xfrm>
             <a:prstGeom prst="rect">
               <a:avLst/>
@@ -3701,8 +3762,8 @@
           </p:nvSpPr>
           <p:spPr bwMode="auto">
             <a:xfrm>
-              <a:off x="970128" y="5645449"/>
-              <a:ext cx="1062603" cy="553998"/>
+              <a:off x="943806" y="5625032"/>
+              <a:ext cx="1062603" cy="230832"/>
             </a:xfrm>
             <a:prstGeom prst="rect">
               <a:avLst/>
@@ -3836,34 +3897,12 @@
             <a:p>
               <a:pPr algn="ctr" eaLnBrk="1" hangingPunct="1"/>
               <a:r>
-                <a:rPr lang="en-US" altLang="en-US" sz="1000" dirty="0">
+                <a:rPr lang="en-US" altLang="en-US" sz="900" dirty="0">
                   <a:latin typeface="Arial" panose="020B0604020202020204" pitchFamily="34" charset="0"/>
                   <a:ea typeface="Amazon Ember" panose="020B0603020204020204" pitchFamily="34" charset="0"/>
                   <a:cs typeface="Arial" panose="020B0604020202020204" pitchFamily="34" charset="0"/>
                 </a:rPr>
-                <a:t>Amazon</a:t>
-              </a:r>
-            </a:p>
-            <a:p>
-              <a:pPr algn="ctr" eaLnBrk="1" hangingPunct="1"/>
-              <a:r>
-                <a:rPr lang="en-US" altLang="en-US" sz="1000" dirty="0">
-                  <a:latin typeface="Arial" panose="020B0604020202020204" pitchFamily="34" charset="0"/>
-                  <a:ea typeface="Amazon Ember" panose="020B0603020204020204" pitchFamily="34" charset="0"/>
-                  <a:cs typeface="Arial" panose="020B0604020202020204" pitchFamily="34" charset="0"/>
-                </a:rPr>
-                <a:t>Simple Storage</a:t>
-              </a:r>
-            </a:p>
-            <a:p>
-              <a:pPr algn="ctr" eaLnBrk="1" hangingPunct="1"/>
-              <a:r>
-                <a:rPr lang="en-US" altLang="en-US" sz="1000" dirty="0">
-                  <a:latin typeface="Arial" panose="020B0604020202020204" pitchFamily="34" charset="0"/>
-                  <a:ea typeface="Amazon Ember" panose="020B0603020204020204" pitchFamily="34" charset="0"/>
-                  <a:cs typeface="Arial" panose="020B0604020202020204" pitchFamily="34" charset="0"/>
-                </a:rPr>
-                <a:t>Service</a:t>
+                <a:t>Amazon S3</a:t>
               </a:r>
             </a:p>
           </p:txBody>
@@ -3883,10 +3922,10 @@
         </p:nvGrpSpPr>
         <p:grpSpPr>
           <a:xfrm>
-            <a:off x="4211986" y="2685643"/>
-            <a:ext cx="639365" cy="817009"/>
-            <a:chOff x="2302310" y="1546153"/>
-            <a:chExt cx="639365" cy="817009"/>
+            <a:off x="4132434" y="2725111"/>
+            <a:ext cx="1119506" cy="619749"/>
+            <a:chOff x="2045147" y="1546153"/>
+            <a:chExt cx="1119506" cy="619749"/>
           </a:xfrm>
         </p:grpSpPr>
         <p:sp>
@@ -3905,8 +3944,8 @@
           </p:nvSpPr>
           <p:spPr bwMode="auto">
             <a:xfrm>
-              <a:off x="2302310" y="1963052"/>
-              <a:ext cx="639365" cy="400110"/>
+              <a:off x="2045147" y="1935070"/>
+              <a:ext cx="1119506" cy="230832"/>
             </a:xfrm>
             <a:prstGeom prst="rect">
               <a:avLst/>
@@ -4033,21 +4072,11 @@
             <a:p>
               <a:pPr algn="ctr" eaLnBrk="1" hangingPunct="1"/>
               <a:r>
-                <a:rPr lang="en-US" altLang="en-US" sz="1000" dirty="0">
+                <a:rPr lang="en-US" altLang="en-US" sz="900" dirty="0">
                   <a:latin typeface="Arial" panose="020B0604020202020204" pitchFamily="34" charset="0"/>
                   <a:cs typeface="Arial" panose="020B0604020202020204" pitchFamily="34" charset="0"/>
                 </a:rPr>
-                <a:t>AWS</a:t>
-              </a:r>
-            </a:p>
-            <a:p>
-              <a:pPr algn="ctr" eaLnBrk="1" hangingPunct="1"/>
-              <a:r>
-                <a:rPr lang="en-US" altLang="en-US" sz="1000" dirty="0">
-                  <a:latin typeface="Arial" panose="020B0604020202020204" pitchFamily="34" charset="0"/>
-                  <a:cs typeface="Arial" panose="020B0604020202020204" pitchFamily="34" charset="0"/>
-                </a:rPr>
-                <a:t>Lambda</a:t>
+                <a:t>AWS Lambda</a:t>
               </a:r>
             </a:p>
           </p:txBody>
@@ -4067,10 +4096,10 @@
             <p:nvPr/>
           </p:nvPicPr>
           <p:blipFill>
-            <a:blip r:embed="rId14">
+            <a:blip r:embed="rId24">
               <a:extLst>
                 <a:ext uri="{96DAC541-7B7A-43D3-8B79-37D633B846F1}">
-                  <asvg:svgBlip xmlns:asvg="http://schemas.microsoft.com/office/drawing/2016/SVG/main" r:embed="rId15"/>
+                  <asvg:svgBlip xmlns:asvg="http://schemas.microsoft.com/office/drawing/2016/SVG/main" r:embed="rId25"/>
                 </a:ext>
               </a:extLst>
             </a:blip>
@@ -4080,7 +4109,7 @@
           <p:spPr bwMode="auto">
             <a:xfrm>
               <a:off x="2416252" y="1546153"/>
-              <a:ext cx="411480" cy="411480"/>
+              <a:ext cx="365760" cy="365760"/>
             </a:xfrm>
             <a:prstGeom prst="rect">
               <a:avLst/>
@@ -4125,10 +4154,10 @@
         </p:nvGrpSpPr>
         <p:grpSpPr>
           <a:xfrm>
-            <a:off x="5325000" y="2685939"/>
-            <a:ext cx="869778" cy="801895"/>
-            <a:chOff x="3541780" y="1536781"/>
-            <a:chExt cx="869778" cy="801895"/>
+            <a:off x="4649960" y="3284276"/>
+            <a:ext cx="1329402" cy="625837"/>
+            <a:chOff x="3304837" y="1536781"/>
+            <a:chExt cx="1329402" cy="625837"/>
           </a:xfrm>
         </p:grpSpPr>
         <p:pic>
@@ -4146,10 +4175,10 @@
             <p:nvPr/>
           </p:nvPicPr>
           <p:blipFill>
-            <a:blip r:embed="rId16">
+            <a:blip r:embed="rId26">
               <a:extLst>
                 <a:ext uri="{96DAC541-7B7A-43D3-8B79-37D633B846F1}">
-                  <asvg:svgBlip xmlns:asvg="http://schemas.microsoft.com/office/drawing/2016/SVG/main" r:embed="rId17"/>
+                  <asvg:svgBlip xmlns:asvg="http://schemas.microsoft.com/office/drawing/2016/SVG/main" r:embed="rId27"/>
                 </a:ext>
               </a:extLst>
             </a:blip>
@@ -4159,7 +4188,7 @@
           <p:spPr bwMode="auto">
             <a:xfrm>
               <a:off x="3770929" y="1536781"/>
-              <a:ext cx="411480" cy="411480"/>
+              <a:ext cx="365760" cy="365760"/>
             </a:xfrm>
             <a:prstGeom prst="rect">
               <a:avLst/>
@@ -4205,8 +4234,8 @@
           </p:nvSpPr>
           <p:spPr bwMode="auto">
             <a:xfrm>
-              <a:off x="3541780" y="1938566"/>
-              <a:ext cx="869778" cy="400110"/>
+              <a:off x="3304837" y="1931786"/>
+              <a:ext cx="1329402" cy="230832"/>
             </a:xfrm>
             <a:prstGeom prst="rect">
               <a:avLst/>
@@ -4340,23 +4369,12 @@
             <a:p>
               <a:pPr algn="ctr" eaLnBrk="1" hangingPunct="1"/>
               <a:r>
-                <a:rPr lang="en-US" altLang="en-US" sz="1000" dirty="0">
+                <a:rPr lang="en-US" altLang="en-US" sz="900" dirty="0">
                   <a:latin typeface="Arial" panose="020B0604020202020204" pitchFamily="34" charset="0"/>
                   <a:ea typeface="Amazon Ember" panose="020B0603020204020204" pitchFamily="34" charset="0"/>
                   <a:cs typeface="Arial" panose="020B0604020202020204" pitchFamily="34" charset="0"/>
                 </a:rPr>
-                <a:t>Amazon</a:t>
-              </a:r>
-            </a:p>
-            <a:p>
-              <a:pPr algn="ctr" eaLnBrk="1" hangingPunct="1"/>
-              <a:r>
-                <a:rPr lang="en-US" altLang="en-US" sz="1000" dirty="0">
-                  <a:latin typeface="Arial" panose="020B0604020202020204" pitchFamily="34" charset="0"/>
-                  <a:ea typeface="Amazon Ember" panose="020B0603020204020204" pitchFamily="34" charset="0"/>
-                  <a:cs typeface="Arial" panose="020B0604020202020204" pitchFamily="34" charset="0"/>
-                </a:rPr>
-                <a:t>DynamoDB</a:t>
+                <a:t>Amazon DynamoDB</a:t>
               </a:r>
             </a:p>
           </p:txBody>
@@ -4376,10 +4394,10 @@
         </p:nvGrpSpPr>
         <p:grpSpPr>
           <a:xfrm>
-            <a:off x="7049654" y="3164640"/>
-            <a:ext cx="1286269" cy="951137"/>
-            <a:chOff x="970128" y="5365416"/>
-            <a:chExt cx="1286269" cy="951137"/>
+            <a:off x="7310997" y="3274896"/>
+            <a:ext cx="1286269" cy="624306"/>
+            <a:chOff x="970382" y="5365416"/>
+            <a:chExt cx="1286269" cy="624306"/>
           </a:xfrm>
         </p:grpSpPr>
         <p:pic>
@@ -4397,10 +4415,10 @@
             <p:nvPr/>
           </p:nvPicPr>
           <p:blipFill>
-            <a:blip r:embed="rId18">
+            <a:blip r:embed="rId28">
               <a:extLst>
                 <a:ext uri="{96DAC541-7B7A-43D3-8B79-37D633B846F1}">
-                  <asvg:svgBlip xmlns:asvg="http://schemas.microsoft.com/office/drawing/2016/SVG/main" r:embed="rId19"/>
+                  <asvg:svgBlip xmlns:asvg="http://schemas.microsoft.com/office/drawing/2016/SVG/main" r:embed="rId29"/>
                 </a:ext>
               </a:extLst>
             </a:blip>
@@ -4410,7 +4428,7 @@
           <p:spPr bwMode="auto">
             <a:xfrm>
               <a:off x="1419122" y="5365416"/>
-              <a:ext cx="411480" cy="411480"/>
+              <a:ext cx="365760" cy="365760"/>
             </a:xfrm>
             <a:prstGeom prst="rect">
               <a:avLst/>
@@ -4456,8 +4474,8 @@
           </p:nvSpPr>
           <p:spPr bwMode="auto">
             <a:xfrm>
-              <a:off x="970128" y="5762555"/>
-              <a:ext cx="1286269" cy="553998"/>
+              <a:off x="970382" y="5758890"/>
+              <a:ext cx="1286269" cy="230832"/>
             </a:xfrm>
             <a:prstGeom prst="rect">
               <a:avLst/>
@@ -4591,34 +4609,12 @@
             <a:p>
               <a:pPr algn="ctr" eaLnBrk="1" hangingPunct="1"/>
               <a:r>
-                <a:rPr lang="en-US" altLang="en-US" sz="1000" dirty="0">
+                <a:rPr lang="en-US" altLang="en-US" sz="900" dirty="0">
                   <a:latin typeface="Arial" panose="020B0604020202020204" pitchFamily="34" charset="0"/>
                   <a:ea typeface="Amazon Ember" panose="020B0603020204020204" pitchFamily="34" charset="0"/>
                   <a:cs typeface="Arial" panose="020B0604020202020204" pitchFamily="34" charset="0"/>
                 </a:rPr>
-                <a:t>Amazon</a:t>
-              </a:r>
-            </a:p>
-            <a:p>
-              <a:pPr algn="ctr" eaLnBrk="1" hangingPunct="1"/>
-              <a:r>
-                <a:rPr lang="en-US" altLang="en-US" sz="1000" dirty="0">
-                  <a:latin typeface="Arial" panose="020B0604020202020204" pitchFamily="34" charset="0"/>
-                  <a:ea typeface="Amazon Ember" panose="020B0603020204020204" pitchFamily="34" charset="0"/>
-                  <a:cs typeface="Arial" panose="020B0604020202020204" pitchFamily="34" charset="0"/>
-                </a:rPr>
-                <a:t>Simple Notification</a:t>
-              </a:r>
-            </a:p>
-            <a:p>
-              <a:pPr algn="ctr" eaLnBrk="1" hangingPunct="1"/>
-              <a:r>
-                <a:rPr lang="en-US" altLang="en-US" sz="1000" dirty="0">
-                  <a:latin typeface="Arial" panose="020B0604020202020204" pitchFamily="34" charset="0"/>
-                  <a:ea typeface="Amazon Ember" panose="020B0603020204020204" pitchFamily="34" charset="0"/>
-                  <a:cs typeface="Arial" panose="020B0604020202020204" pitchFamily="34" charset="0"/>
-                </a:rPr>
-                <a:t>Service</a:t>
+                <a:t>Amazon SNS</a:t>
               </a:r>
             </a:p>
           </p:txBody>
@@ -4638,10 +4634,10 @@
         </p:nvGrpSpPr>
         <p:grpSpPr>
           <a:xfrm>
-            <a:off x="6394855" y="2672009"/>
-            <a:ext cx="1329403" cy="804745"/>
-            <a:chOff x="5862050" y="845117"/>
-            <a:chExt cx="1329403" cy="804745"/>
+            <a:off x="6610909" y="2692635"/>
+            <a:ext cx="1329403" cy="773967"/>
+            <a:chOff x="5875206" y="845117"/>
+            <a:chExt cx="1329403" cy="773967"/>
           </a:xfrm>
         </p:grpSpPr>
         <p:sp>
@@ -4660,8 +4656,8 @@
           </p:nvSpPr>
           <p:spPr bwMode="auto">
             <a:xfrm>
-              <a:off x="5862050" y="1249752"/>
-              <a:ext cx="1329403" cy="400110"/>
+              <a:off x="5875206" y="1249752"/>
+              <a:ext cx="1329403" cy="369332"/>
             </a:xfrm>
             <a:prstGeom prst="rect">
               <a:avLst/>
@@ -4793,20 +4789,20 @@
               </a:lvl9pPr>
             </a:lstStyle>
             <a:p>
-              <a:pPr algn="ctr" eaLnBrk="1" hangingPunct="1"/>
+              <a:pPr algn="ctr"/>
               <a:r>
-                <a:rPr lang="en-US" altLang="en-US" sz="1000" dirty="0">
+                <a:rPr lang="en-US" altLang="en-US" sz="900" dirty="0">
                   <a:latin typeface="Arial" panose="020B0604020202020204" pitchFamily="34" charset="0"/>
                   <a:ea typeface="Amazon Ember" panose="020B0603020204020204" pitchFamily="34" charset="0"/>
                   <a:cs typeface="Arial" panose="020B0604020202020204" pitchFamily="34" charset="0"/>
                 </a:rPr>
-                <a:t>Parameter</a:t>
+                <a:t>AWS Parameter</a:t>
               </a:r>
             </a:p>
             <a:p>
               <a:pPr algn="ctr" eaLnBrk="1" hangingPunct="1"/>
               <a:r>
-                <a:rPr lang="en-US" altLang="en-US" sz="1000" dirty="0">
+                <a:rPr lang="en-US" altLang="en-US" sz="900" dirty="0">
                   <a:latin typeface="Arial" panose="020B0604020202020204" pitchFamily="34" charset="0"/>
                   <a:ea typeface="Amazon Ember" panose="020B0603020204020204" pitchFamily="34" charset="0"/>
                   <a:cs typeface="Arial" panose="020B0604020202020204" pitchFamily="34" charset="0"/>
@@ -4831,10 +4827,10 @@
             <p:nvPr/>
           </p:nvPicPr>
           <p:blipFill>
-            <a:blip r:embed="rId20">
+            <a:blip r:embed="rId30">
               <a:extLst>
                 <a:ext uri="{96DAC541-7B7A-43D3-8B79-37D633B846F1}">
-                  <asvg:svgBlip xmlns:asvg="http://schemas.microsoft.com/office/drawing/2016/SVG/main" r:embed="rId21"/>
+                  <asvg:svgBlip xmlns:asvg="http://schemas.microsoft.com/office/drawing/2016/SVG/main" r:embed="rId31"/>
                 </a:ext>
               </a:extLst>
             </a:blip>
@@ -4867,10 +4863,10 @@
         </p:nvGrpSpPr>
         <p:grpSpPr>
           <a:xfrm>
-            <a:off x="5589822" y="3175710"/>
-            <a:ext cx="1583937" cy="1115523"/>
-            <a:chOff x="6662440" y="1884447"/>
-            <a:chExt cx="1583937" cy="1115523"/>
+            <a:off x="5757330" y="3279324"/>
+            <a:ext cx="1583937" cy="625313"/>
+            <a:chOff x="6649284" y="1884447"/>
+            <a:chExt cx="1583937" cy="625313"/>
           </a:xfrm>
         </p:grpSpPr>
         <p:pic>
@@ -4879,6 +4875,249 @@
               <a:extLst>
                 <a:ext uri="{FF2B5EF4-FFF2-40B4-BE49-F238E27FC236}">
                   <a16:creationId xmlns:a16="http://schemas.microsoft.com/office/drawing/2014/main" id="{90B8F615-3572-4ED3-8BFD-1C749142A109}"/>
+                </a:ext>
+              </a:extLst>
+            </p:cNvPr>
+            <p:cNvPicPr>
+              <a:picLocks noChangeAspect="1" noChangeArrowheads="1"/>
+            </p:cNvPicPr>
+            <p:nvPr/>
+          </p:nvPicPr>
+          <p:blipFill>
+            <a:blip r:embed="rId32">
+              <a:extLst>
+                <a:ext uri="{96DAC541-7B7A-43D3-8B79-37D633B846F1}">
+                  <asvg:svgBlip xmlns:asvg="http://schemas.microsoft.com/office/drawing/2016/SVG/main" r:embed="rId33"/>
+                </a:ext>
+              </a:extLst>
+            </a:blip>
+            <a:srcRect/>
+            <a:stretch/>
+          </p:blipFill>
+          <p:spPr bwMode="auto">
+            <a:xfrm>
+              <a:off x="7248668" y="1884447"/>
+              <a:ext cx="365760" cy="365760"/>
+            </a:xfrm>
+            <a:prstGeom prst="rect">
+              <a:avLst/>
+            </a:prstGeom>
+            <a:noFill/>
+            <a:ln>
+              <a:noFill/>
+            </a:ln>
+            <a:extLst>
+              <a:ext uri="{909E8E84-426E-40DD-AFC4-6F175D3DCCD1}">
+                <a14:hiddenFill xmlns:a14="http://schemas.microsoft.com/office/drawing/2010/main">
+                  <a:solidFill>
+                    <a:srgbClr val="FFFFFF"/>
+                  </a:solidFill>
+                </a14:hiddenFill>
+              </a:ext>
+              <a:ext uri="{91240B29-F687-4F45-9708-019B960494DF}">
+                <a14:hiddenLine xmlns:a14="http://schemas.microsoft.com/office/drawing/2010/main" w="9525">
+                  <a:solidFill>
+                    <a:srgbClr val="000000"/>
+                  </a:solidFill>
+                  <a:miter lim="800000"/>
+                  <a:headEnd/>
+                  <a:tailEnd/>
+                </a14:hiddenLine>
+              </a:ext>
+            </a:extLst>
+          </p:spPr>
+        </p:pic>
+        <p:sp>
+          <p:nvSpPr>
+            <p:cNvPr id="152" name="TextBox 12">
+              <a:extLst>
+                <a:ext uri="{FF2B5EF4-FFF2-40B4-BE49-F238E27FC236}">
+                  <a16:creationId xmlns:a16="http://schemas.microsoft.com/office/drawing/2014/main" id="{C16B1771-27D6-4860-B793-8271CA218EA2}"/>
+                </a:ext>
+              </a:extLst>
+            </p:cNvPr>
+            <p:cNvSpPr txBox="1">
+              <a:spLocks noChangeArrowheads="1"/>
+            </p:cNvSpPr>
+            <p:nvPr/>
+          </p:nvSpPr>
+          <p:spPr bwMode="auto">
+            <a:xfrm>
+              <a:off x="6649284" y="2278928"/>
+              <a:ext cx="1583937" cy="230832"/>
+            </a:xfrm>
+            <a:prstGeom prst="rect">
+              <a:avLst/>
+            </a:prstGeom>
+            <a:noFill/>
+            <a:ln>
+              <a:noFill/>
+            </a:ln>
+            <a:extLst>
+              <a:ext uri="{909E8E84-426E-40DD-AFC4-6F175D3DCCD1}">
+                <a14:hiddenFill xmlns:a14="http://schemas.microsoft.com/office/drawing/2010/main">
+                  <a:solidFill>
+                    <a:srgbClr val="FFFFFF"/>
+                  </a:solidFill>
+                </a14:hiddenFill>
+              </a:ext>
+              <a:ext uri="{91240B29-F687-4F45-9708-019B960494DF}">
+                <a14:hiddenLine xmlns:a14="http://schemas.microsoft.com/office/drawing/2010/main" w="9525">
+                  <a:solidFill>
+                    <a:srgbClr val="000000"/>
+                  </a:solidFill>
+                  <a:miter lim="800000"/>
+                  <a:headEnd/>
+                  <a:tailEnd/>
+                </a14:hiddenLine>
+              </a:ext>
+            </a:extLst>
+          </p:spPr>
+          <p:txBody>
+            <a:bodyPr wrap="square">
+              <a:spAutoFit/>
+            </a:bodyPr>
+            <a:lstStyle>
+              <a:lvl1pPr>
+                <a:defRPr>
+                  <a:solidFill>
+                    <a:schemeClr val="tx1"/>
+                  </a:solidFill>
+                  <a:latin typeface="Calibri" panose="020F0502020204030204" pitchFamily="34" charset="0"/>
+                </a:defRPr>
+              </a:lvl1pPr>
+              <a:lvl2pPr marL="742950" indent="-285750">
+                <a:defRPr>
+                  <a:solidFill>
+                    <a:schemeClr val="tx1"/>
+                  </a:solidFill>
+                  <a:latin typeface="Calibri" panose="020F0502020204030204" pitchFamily="34" charset="0"/>
+                </a:defRPr>
+              </a:lvl2pPr>
+              <a:lvl3pPr marL="1143000" indent="-228600">
+                <a:defRPr>
+                  <a:solidFill>
+                    <a:schemeClr val="tx1"/>
+                  </a:solidFill>
+                  <a:latin typeface="Calibri" panose="020F0502020204030204" pitchFamily="34" charset="0"/>
+                </a:defRPr>
+              </a:lvl3pPr>
+              <a:lvl4pPr marL="1600200" indent="-228600">
+                <a:defRPr>
+                  <a:solidFill>
+                    <a:schemeClr val="tx1"/>
+                  </a:solidFill>
+                  <a:latin typeface="Calibri" panose="020F0502020204030204" pitchFamily="34" charset="0"/>
+                </a:defRPr>
+              </a:lvl4pPr>
+              <a:lvl5pPr marL="2057400" indent="-228600">
+                <a:defRPr>
+                  <a:solidFill>
+                    <a:schemeClr val="tx1"/>
+                  </a:solidFill>
+                  <a:latin typeface="Calibri" panose="020F0502020204030204" pitchFamily="34" charset="0"/>
+                </a:defRPr>
+              </a:lvl5pPr>
+              <a:lvl6pPr marL="2514600" indent="-228600" eaLnBrk="0" fontAlgn="base" hangingPunct="0">
+                <a:spcBef>
+                  <a:spcPct val="0"/>
+                </a:spcBef>
+                <a:spcAft>
+                  <a:spcPct val="0"/>
+                </a:spcAft>
+                <a:defRPr>
+                  <a:solidFill>
+                    <a:schemeClr val="tx1"/>
+                  </a:solidFill>
+                  <a:latin typeface="Calibri" panose="020F0502020204030204" pitchFamily="34" charset="0"/>
+                </a:defRPr>
+              </a:lvl6pPr>
+              <a:lvl7pPr marL="2971800" indent="-228600" eaLnBrk="0" fontAlgn="base" hangingPunct="0">
+                <a:spcBef>
+                  <a:spcPct val="0"/>
+                </a:spcBef>
+                <a:spcAft>
+                  <a:spcPct val="0"/>
+                </a:spcAft>
+                <a:defRPr>
+                  <a:solidFill>
+                    <a:schemeClr val="tx1"/>
+                  </a:solidFill>
+                  <a:latin typeface="Calibri" panose="020F0502020204030204" pitchFamily="34" charset="0"/>
+                </a:defRPr>
+              </a:lvl7pPr>
+              <a:lvl8pPr marL="3429000" indent="-228600" eaLnBrk="0" fontAlgn="base" hangingPunct="0">
+                <a:spcBef>
+                  <a:spcPct val="0"/>
+                </a:spcBef>
+                <a:spcAft>
+                  <a:spcPct val="0"/>
+                </a:spcAft>
+                <a:defRPr>
+                  <a:solidFill>
+                    <a:schemeClr val="tx1"/>
+                  </a:solidFill>
+                  <a:latin typeface="Calibri" panose="020F0502020204030204" pitchFamily="34" charset="0"/>
+                </a:defRPr>
+              </a:lvl8pPr>
+              <a:lvl9pPr marL="3886200" indent="-228600" eaLnBrk="0" fontAlgn="base" hangingPunct="0">
+                <a:spcBef>
+                  <a:spcPct val="0"/>
+                </a:spcBef>
+                <a:spcAft>
+                  <a:spcPct val="0"/>
+                </a:spcAft>
+                <a:defRPr>
+                  <a:solidFill>
+                    <a:schemeClr val="tx1"/>
+                  </a:solidFill>
+                  <a:latin typeface="Calibri" panose="020F0502020204030204" pitchFamily="34" charset="0"/>
+                </a:defRPr>
+              </a:lvl9pPr>
+            </a:lstStyle>
+            <a:p>
+              <a:pPr algn="ctr" eaLnBrk="1" hangingPunct="1"/>
+              <a:r>
+                <a:rPr lang="en-US" altLang="en-US" sz="900" dirty="0">
+                  <a:solidFill>
+                    <a:sysClr val="windowText" lastClr="000000"/>
+                  </a:solidFill>
+                  <a:latin typeface="Arial" panose="020B0604020202020204" pitchFamily="34" charset="0"/>
+                  <a:ea typeface="Amazon Ember" panose="020B0603020204020204" pitchFamily="34" charset="0"/>
+                  <a:cs typeface="Arial" panose="020B0604020202020204" pitchFamily="34" charset="0"/>
+                </a:rPr>
+                <a:t>AWS IAM</a:t>
+              </a:r>
+            </a:p>
+          </p:txBody>
+        </p:sp>
+      </p:grpSp>
+      <p:grpSp>
+        <p:nvGrpSpPr>
+          <p:cNvPr id="158" name="Group 157">
+            <a:extLst>
+              <a:ext uri="{FF2B5EF4-FFF2-40B4-BE49-F238E27FC236}">
+                <a16:creationId xmlns:a16="http://schemas.microsoft.com/office/drawing/2014/main" id="{FA589DE0-74E5-4E0A-A11A-4B3C1E75781E}"/>
+              </a:ext>
+            </a:extLst>
+          </p:cNvPr>
+          <p:cNvGrpSpPr/>
+          <p:nvPr/>
+        </p:nvGrpSpPr>
+        <p:grpSpPr>
+          <a:xfrm>
+            <a:off x="5940474" y="4755831"/>
+            <a:ext cx="1669311" cy="603170"/>
+            <a:chOff x="2569015" y="5117922"/>
+            <a:chExt cx="1669311" cy="603170"/>
+          </a:xfrm>
+        </p:grpSpPr>
+        <p:pic>
+          <p:nvPicPr>
+            <p:cNvPr id="159" name="Graphic 20">
+              <a:extLst>
+                <a:ext uri="{FF2B5EF4-FFF2-40B4-BE49-F238E27FC236}">
+                  <a16:creationId xmlns:a16="http://schemas.microsoft.com/office/drawing/2014/main" id="{418A487F-9F37-4D97-8497-979FC45B8087}"/>
                 </a:ext>
               </a:extLst>
             </p:cNvPr>
@@ -4900,279 +5139,8 @@
           </p:blipFill>
           <p:spPr bwMode="auto">
             <a:xfrm>
-              <a:off x="7248668" y="1884447"/>
-              <a:ext cx="411480" cy="411480"/>
-            </a:xfrm>
-            <a:prstGeom prst="rect">
-              <a:avLst/>
-            </a:prstGeom>
-            <a:noFill/>
-            <a:ln>
-              <a:noFill/>
-            </a:ln>
-            <a:extLst>
-              <a:ext uri="{909E8E84-426E-40DD-AFC4-6F175D3DCCD1}">
-                <a14:hiddenFill xmlns:a14="http://schemas.microsoft.com/office/drawing/2010/main">
-                  <a:solidFill>
-                    <a:srgbClr val="FFFFFF"/>
-                  </a:solidFill>
-                </a14:hiddenFill>
-              </a:ext>
-              <a:ext uri="{91240B29-F687-4F45-9708-019B960494DF}">
-                <a14:hiddenLine xmlns:a14="http://schemas.microsoft.com/office/drawing/2010/main" w="9525">
-                  <a:solidFill>
-                    <a:srgbClr val="000000"/>
-                  </a:solidFill>
-                  <a:miter lim="800000"/>
-                  <a:headEnd/>
-                  <a:tailEnd/>
-                </a14:hiddenLine>
-              </a:ext>
-            </a:extLst>
-          </p:spPr>
-        </p:pic>
-        <p:sp>
-          <p:nvSpPr>
-            <p:cNvPr id="152" name="TextBox 12">
-              <a:extLst>
-                <a:ext uri="{FF2B5EF4-FFF2-40B4-BE49-F238E27FC236}">
-                  <a16:creationId xmlns:a16="http://schemas.microsoft.com/office/drawing/2014/main" id="{C16B1771-27D6-4860-B793-8271CA218EA2}"/>
-                </a:ext>
-              </a:extLst>
-            </p:cNvPr>
-            <p:cNvSpPr txBox="1">
-              <a:spLocks noChangeArrowheads="1"/>
-            </p:cNvSpPr>
-            <p:nvPr/>
-          </p:nvSpPr>
-          <p:spPr bwMode="auto">
-            <a:xfrm>
-              <a:off x="6662440" y="2292084"/>
-              <a:ext cx="1583937" cy="707886"/>
-            </a:xfrm>
-            <a:prstGeom prst="rect">
-              <a:avLst/>
-            </a:prstGeom>
-            <a:noFill/>
-            <a:ln>
-              <a:noFill/>
-            </a:ln>
-            <a:extLst>
-              <a:ext uri="{909E8E84-426E-40DD-AFC4-6F175D3DCCD1}">
-                <a14:hiddenFill xmlns:a14="http://schemas.microsoft.com/office/drawing/2010/main">
-                  <a:solidFill>
-                    <a:srgbClr val="FFFFFF"/>
-                  </a:solidFill>
-                </a14:hiddenFill>
-              </a:ext>
-              <a:ext uri="{91240B29-F687-4F45-9708-019B960494DF}">
-                <a14:hiddenLine xmlns:a14="http://schemas.microsoft.com/office/drawing/2010/main" w="9525">
-                  <a:solidFill>
-                    <a:srgbClr val="000000"/>
-                  </a:solidFill>
-                  <a:miter lim="800000"/>
-                  <a:headEnd/>
-                  <a:tailEnd/>
-                </a14:hiddenLine>
-              </a:ext>
-            </a:extLst>
-          </p:spPr>
-          <p:txBody>
-            <a:bodyPr wrap="square">
-              <a:spAutoFit/>
-            </a:bodyPr>
-            <a:lstStyle>
-              <a:lvl1pPr>
-                <a:defRPr>
-                  <a:solidFill>
-                    <a:schemeClr val="tx1"/>
-                  </a:solidFill>
-                  <a:latin typeface="Calibri" panose="020F0502020204030204" pitchFamily="34" charset="0"/>
-                </a:defRPr>
-              </a:lvl1pPr>
-              <a:lvl2pPr marL="742950" indent="-285750">
-                <a:defRPr>
-                  <a:solidFill>
-                    <a:schemeClr val="tx1"/>
-                  </a:solidFill>
-                  <a:latin typeface="Calibri" panose="020F0502020204030204" pitchFamily="34" charset="0"/>
-                </a:defRPr>
-              </a:lvl2pPr>
-              <a:lvl3pPr marL="1143000" indent="-228600">
-                <a:defRPr>
-                  <a:solidFill>
-                    <a:schemeClr val="tx1"/>
-                  </a:solidFill>
-                  <a:latin typeface="Calibri" panose="020F0502020204030204" pitchFamily="34" charset="0"/>
-                </a:defRPr>
-              </a:lvl3pPr>
-              <a:lvl4pPr marL="1600200" indent="-228600">
-                <a:defRPr>
-                  <a:solidFill>
-                    <a:schemeClr val="tx1"/>
-                  </a:solidFill>
-                  <a:latin typeface="Calibri" panose="020F0502020204030204" pitchFamily="34" charset="0"/>
-                </a:defRPr>
-              </a:lvl4pPr>
-              <a:lvl5pPr marL="2057400" indent="-228600">
-                <a:defRPr>
-                  <a:solidFill>
-                    <a:schemeClr val="tx1"/>
-                  </a:solidFill>
-                  <a:latin typeface="Calibri" panose="020F0502020204030204" pitchFamily="34" charset="0"/>
-                </a:defRPr>
-              </a:lvl5pPr>
-              <a:lvl6pPr marL="2514600" indent="-228600" eaLnBrk="0" fontAlgn="base" hangingPunct="0">
-                <a:spcBef>
-                  <a:spcPct val="0"/>
-                </a:spcBef>
-                <a:spcAft>
-                  <a:spcPct val="0"/>
-                </a:spcAft>
-                <a:defRPr>
-                  <a:solidFill>
-                    <a:schemeClr val="tx1"/>
-                  </a:solidFill>
-                  <a:latin typeface="Calibri" panose="020F0502020204030204" pitchFamily="34" charset="0"/>
-                </a:defRPr>
-              </a:lvl6pPr>
-              <a:lvl7pPr marL="2971800" indent="-228600" eaLnBrk="0" fontAlgn="base" hangingPunct="0">
-                <a:spcBef>
-                  <a:spcPct val="0"/>
-                </a:spcBef>
-                <a:spcAft>
-                  <a:spcPct val="0"/>
-                </a:spcAft>
-                <a:defRPr>
-                  <a:solidFill>
-                    <a:schemeClr val="tx1"/>
-                  </a:solidFill>
-                  <a:latin typeface="Calibri" panose="020F0502020204030204" pitchFamily="34" charset="0"/>
-                </a:defRPr>
-              </a:lvl7pPr>
-              <a:lvl8pPr marL="3429000" indent="-228600" eaLnBrk="0" fontAlgn="base" hangingPunct="0">
-                <a:spcBef>
-                  <a:spcPct val="0"/>
-                </a:spcBef>
-                <a:spcAft>
-                  <a:spcPct val="0"/>
-                </a:spcAft>
-                <a:defRPr>
-                  <a:solidFill>
-                    <a:schemeClr val="tx1"/>
-                  </a:solidFill>
-                  <a:latin typeface="Calibri" panose="020F0502020204030204" pitchFamily="34" charset="0"/>
-                </a:defRPr>
-              </a:lvl8pPr>
-              <a:lvl9pPr marL="3886200" indent="-228600" eaLnBrk="0" fontAlgn="base" hangingPunct="0">
-                <a:spcBef>
-                  <a:spcPct val="0"/>
-                </a:spcBef>
-                <a:spcAft>
-                  <a:spcPct val="0"/>
-                </a:spcAft>
-                <a:defRPr>
-                  <a:solidFill>
-                    <a:schemeClr val="tx1"/>
-                  </a:solidFill>
-                  <a:latin typeface="Calibri" panose="020F0502020204030204" pitchFamily="34" charset="0"/>
-                </a:defRPr>
-              </a:lvl9pPr>
-            </a:lstStyle>
-            <a:p>
-              <a:pPr algn="ctr" eaLnBrk="1" hangingPunct="1"/>
-              <a:r>
-                <a:rPr lang="en-US" altLang="en-US" sz="1000" dirty="0">
-                  <a:solidFill>
-                    <a:sysClr val="windowText" lastClr="000000"/>
-                  </a:solidFill>
-                  <a:latin typeface="Arial" panose="020B0604020202020204" pitchFamily="34" charset="0"/>
-                  <a:ea typeface="Amazon Ember" panose="020B0603020204020204" pitchFamily="34" charset="0"/>
-                  <a:cs typeface="Arial" panose="020B0604020202020204" pitchFamily="34" charset="0"/>
-                </a:rPr>
-                <a:t>AWS</a:t>
-              </a:r>
-            </a:p>
-            <a:p>
-              <a:pPr algn="ctr" eaLnBrk="1" hangingPunct="1"/>
-              <a:r>
-                <a:rPr lang="en-US" altLang="en-US" sz="1000" dirty="0">
-                  <a:solidFill>
-                    <a:sysClr val="windowText" lastClr="000000"/>
-                  </a:solidFill>
-                  <a:latin typeface="Arial" panose="020B0604020202020204" pitchFamily="34" charset="0"/>
-                  <a:ea typeface="Amazon Ember" panose="020B0603020204020204" pitchFamily="34" charset="0"/>
-                  <a:cs typeface="Arial" panose="020B0604020202020204" pitchFamily="34" charset="0"/>
-                </a:rPr>
-                <a:t>Identity and</a:t>
-              </a:r>
-            </a:p>
-            <a:p>
-              <a:pPr algn="ctr" eaLnBrk="1" hangingPunct="1"/>
-              <a:r>
-                <a:rPr lang="en-US" altLang="en-US" sz="1000" dirty="0">
-                  <a:solidFill>
-                    <a:sysClr val="windowText" lastClr="000000"/>
-                  </a:solidFill>
-                  <a:latin typeface="Arial" panose="020B0604020202020204" pitchFamily="34" charset="0"/>
-                  <a:ea typeface="Amazon Ember" panose="020B0603020204020204" pitchFamily="34" charset="0"/>
-                  <a:cs typeface="Arial" panose="020B0604020202020204" pitchFamily="34" charset="0"/>
-                </a:rPr>
-                <a:t>Access Management (IAM)</a:t>
-              </a:r>
-            </a:p>
-          </p:txBody>
-        </p:sp>
-      </p:grpSp>
-      <p:grpSp>
-        <p:nvGrpSpPr>
-          <p:cNvPr id="158" name="Group 157">
-            <a:extLst>
-              <a:ext uri="{FF2B5EF4-FFF2-40B4-BE49-F238E27FC236}">
-                <a16:creationId xmlns:a16="http://schemas.microsoft.com/office/drawing/2014/main" id="{FA589DE0-74E5-4E0A-A11A-4B3C1E75781E}"/>
-              </a:ext>
-            </a:extLst>
-          </p:cNvPr>
-          <p:cNvGrpSpPr/>
-          <p:nvPr/>
-        </p:nvGrpSpPr>
-        <p:grpSpPr>
-          <a:xfrm>
-            <a:off x="5789281" y="4729519"/>
-            <a:ext cx="1669311" cy="798357"/>
-            <a:chOff x="2621740" y="5117922"/>
-            <a:chExt cx="1669311" cy="798357"/>
-          </a:xfrm>
-        </p:grpSpPr>
-        <p:pic>
-          <p:nvPicPr>
-            <p:cNvPr id="159" name="Graphic 20">
-              <a:extLst>
-                <a:ext uri="{FF2B5EF4-FFF2-40B4-BE49-F238E27FC236}">
-                  <a16:creationId xmlns:a16="http://schemas.microsoft.com/office/drawing/2014/main" id="{418A487F-9F37-4D97-8497-979FC45B8087}"/>
-                </a:ext>
-              </a:extLst>
-            </p:cNvPr>
-            <p:cNvPicPr>
-              <a:picLocks noChangeAspect="1" noChangeArrowheads="1"/>
-            </p:cNvPicPr>
-            <p:nvPr/>
-          </p:nvPicPr>
-          <p:blipFill>
-            <a:blip r:embed="rId12">
-              <a:extLst>
-                <a:ext uri="{96DAC541-7B7A-43D3-8B79-37D633B846F1}">
-                  <asvg:svgBlip xmlns:asvg="http://schemas.microsoft.com/office/drawing/2016/SVG/main" r:embed="rId13"/>
-                </a:ext>
-              </a:extLst>
-            </a:blip>
-            <a:srcRect/>
-            <a:stretch/>
-          </p:blipFill>
-          <p:spPr bwMode="auto">
-            <a:xfrm>
               <a:off x="3215336" y="5117922"/>
-              <a:ext cx="411480" cy="411480"/>
+              <a:ext cx="365760" cy="365760"/>
             </a:xfrm>
             <a:prstGeom prst="rect">
               <a:avLst/>
@@ -5218,8 +5186,8 @@
           </p:nvSpPr>
           <p:spPr bwMode="auto">
             <a:xfrm>
-              <a:off x="2621740" y="5516169"/>
-              <a:ext cx="1669311" cy="400110"/>
+              <a:off x="2569015" y="5490260"/>
+              <a:ext cx="1669311" cy="230832"/>
             </a:xfrm>
             <a:prstGeom prst="rect">
               <a:avLst/>
@@ -5353,23 +5321,12 @@
             <a:p>
               <a:pPr algn="ctr" eaLnBrk="1" hangingPunct="1"/>
               <a:r>
-                <a:rPr lang="en-US" altLang="en-US" sz="1000" dirty="0">
+                <a:rPr lang="en-US" altLang="en-US" sz="900" dirty="0">
                   <a:latin typeface="Arial" panose="020B0604020202020204" pitchFamily="34" charset="0"/>
                   <a:ea typeface="Amazon Ember" panose="020B0603020204020204" pitchFamily="34" charset="0"/>
                   <a:cs typeface="Arial" panose="020B0604020202020204" pitchFamily="34" charset="0"/>
                 </a:rPr>
-                <a:t>Amazon</a:t>
-              </a:r>
-            </a:p>
-            <a:p>
-              <a:pPr algn="ctr" eaLnBrk="1" hangingPunct="1"/>
-              <a:r>
-                <a:rPr lang="en-US" altLang="en-US" sz="1000" dirty="0">
-                  <a:latin typeface="Arial" panose="020B0604020202020204" pitchFamily="34" charset="0"/>
-                  <a:ea typeface="Amazon Ember" panose="020B0603020204020204" pitchFamily="34" charset="0"/>
-                  <a:cs typeface="Arial" panose="020B0604020202020204" pitchFamily="34" charset="0"/>
-                </a:rPr>
-                <a:t>Elastic Container Registry</a:t>
+                <a:t>Amazon ECR</a:t>
               </a:r>
             </a:p>
           </p:txBody>
@@ -5386,18 +5343,22 @@
           </p:cNvPr>
           <p:cNvCxnSpPr>
             <a:cxnSpLocks/>
+            <a:stCxn id="117" idx="1"/>
+            <a:endCxn id="756" idx="3"/>
           </p:cNvCxnSpPr>
           <p:nvPr/>
         </p:nvCxnSpPr>
         <p:spPr>
           <a:xfrm rot="10800000">
-            <a:off x="2919225" y="3713319"/>
-            <a:ext cx="523417" cy="1273490"/>
+            <a:off x="2745015" y="3714214"/>
+            <a:ext cx="821302" cy="1321559"/>
           </a:xfrm>
-          <a:prstGeom prst="bentConnector2">
-            <a:avLst/>
+          <a:prstGeom prst="bentConnector3">
+            <a:avLst>
+              <a:gd name="adj1" fmla="val 50000"/>
+            </a:avLst>
           </a:prstGeom>
-          <a:ln w="19050">
+          <a:ln w="15875">
             <a:solidFill>
               <a:schemeClr val="tx1"/>
             </a:solidFill>
@@ -5436,7 +5397,7 @@
         </p:nvSpPr>
         <p:spPr bwMode="auto">
           <a:xfrm>
-            <a:off x="3344980" y="2308922"/>
+            <a:off x="3238259" y="3019229"/>
             <a:ext cx="274320" cy="274320"/>
           </a:xfrm>
           <a:prstGeom prst="ellipse">
@@ -5507,7 +5468,7 @@
         </p:nvSpPr>
         <p:spPr bwMode="auto">
           <a:xfrm>
-            <a:off x="3344980" y="4414087"/>
+            <a:off x="3228613" y="4498834"/>
             <a:ext cx="274320" cy="274320"/>
           </a:xfrm>
           <a:prstGeom prst="ellipse">
@@ -5605,11 +5566,325 @@
                 <a:ea typeface="Amazon Ember" panose="020B0603020204020204" pitchFamily="34" charset="0"/>
                 <a:cs typeface="Arial" panose="020B0604020202020204" pitchFamily="34" charset="0"/>
               </a:rPr>
-              <a:t>This event-driven, serverless Reference architecture enables the generation of realistic 3D content through cutting-edge, open-source rendering techniques.</a:t>
+              <a:t>This Reference architecture shows automated deployment of guidance event-driven, serverless architecture to user accounts </a:t>
             </a:r>
           </a:p>
         </p:txBody>
       </p:sp>
+      <p:cxnSp>
+        <p:nvCxnSpPr>
+          <p:cNvPr id="4" name="Straight Arrow Connector 3">
+            <a:extLst>
+              <a:ext uri="{FF2B5EF4-FFF2-40B4-BE49-F238E27FC236}">
+                <a16:creationId xmlns:a16="http://schemas.microsoft.com/office/drawing/2014/main" id="{73EDBB03-FC5F-7A6F-A316-B4CFE67A8217}"/>
+              </a:ext>
+            </a:extLst>
+          </p:cNvPr>
+          <p:cNvCxnSpPr>
+            <a:cxnSpLocks/>
+          </p:cNvCxnSpPr>
+          <p:nvPr/>
+        </p:nvCxnSpPr>
+        <p:spPr>
+          <a:xfrm>
+            <a:off x="593017" y="3654552"/>
+            <a:ext cx="534192" cy="13818"/>
+          </a:xfrm>
+          <a:prstGeom prst="straightConnector1">
+            <a:avLst/>
+          </a:prstGeom>
+          <a:ln w="15875">
+            <a:solidFill>
+              <a:schemeClr val="bg1">
+                <a:lumMod val="10000"/>
+              </a:schemeClr>
+            </a:solidFill>
+            <a:headEnd type="triangle"/>
+            <a:tailEnd type="triangle"/>
+          </a:ln>
+        </p:spPr>
+        <p:style>
+          <a:lnRef idx="1">
+            <a:schemeClr val="accent1"/>
+          </a:lnRef>
+          <a:fillRef idx="0">
+            <a:schemeClr val="accent1"/>
+          </a:fillRef>
+          <a:effectRef idx="0">
+            <a:schemeClr val="accent1"/>
+          </a:effectRef>
+          <a:fontRef idx="minor">
+            <a:schemeClr val="tx1"/>
+          </a:fontRef>
+        </p:style>
+      </p:cxnSp>
+      <p:pic>
+        <p:nvPicPr>
+          <p:cNvPr id="56" name="Graphic 55">
+            <a:extLst>
+              <a:ext uri="{FF2B5EF4-FFF2-40B4-BE49-F238E27FC236}">
+                <a16:creationId xmlns:a16="http://schemas.microsoft.com/office/drawing/2014/main" id="{DA3C8B1D-2A92-480F-A1AF-9F6D44E20979}"/>
+              </a:ext>
+            </a:extLst>
+          </p:cNvPr>
+          <p:cNvPicPr>
+            <a:picLocks noChangeAspect="1"/>
+          </p:cNvPicPr>
+          <p:nvPr/>
+        </p:nvPicPr>
+        <p:blipFill>
+          <a:blip r:embed="rId34">
+            <a:extLst>
+              <a:ext uri="{96DAC541-7B7A-43D3-8B79-37D633B846F1}">
+                <asvg:svgBlip xmlns:asvg="http://schemas.microsoft.com/office/drawing/2016/SVG/main" r:embed="rId35"/>
+              </a:ext>
+            </a:extLst>
+          </a:blip>
+          <a:srcRect/>
+          <a:stretch/>
+        </p:blipFill>
+        <p:spPr>
+          <a:xfrm>
+            <a:off x="3045849" y="1419798"/>
+            <a:ext cx="274320" cy="274320"/>
+          </a:xfrm>
+          <a:prstGeom prst="rect">
+            <a:avLst/>
+          </a:prstGeom>
+        </p:spPr>
+      </p:pic>
+      <p:grpSp>
+        <p:nvGrpSpPr>
+          <p:cNvPr id="57" name="Group 56">
+            <a:extLst>
+              <a:ext uri="{FF2B5EF4-FFF2-40B4-BE49-F238E27FC236}">
+                <a16:creationId xmlns:a16="http://schemas.microsoft.com/office/drawing/2014/main" id="{C5279589-619E-458A-B776-8DA2605E5100}"/>
+              </a:ext>
+            </a:extLst>
+          </p:cNvPr>
+          <p:cNvGrpSpPr/>
+          <p:nvPr/>
+        </p:nvGrpSpPr>
+        <p:grpSpPr>
+          <a:xfrm>
+            <a:off x="5324110" y="4747203"/>
+            <a:ext cx="1119506" cy="619749"/>
+            <a:chOff x="2045147" y="1546153"/>
+            <a:chExt cx="1119506" cy="619749"/>
+          </a:xfrm>
+        </p:grpSpPr>
+        <p:sp>
+          <p:nvSpPr>
+            <p:cNvPr id="60" name="TextBox 13">
+              <a:extLst>
+                <a:ext uri="{FF2B5EF4-FFF2-40B4-BE49-F238E27FC236}">
+                  <a16:creationId xmlns:a16="http://schemas.microsoft.com/office/drawing/2014/main" id="{30CAA5E4-2830-4B56-A2E0-BE241F54FE47}"/>
+                </a:ext>
+              </a:extLst>
+            </p:cNvPr>
+            <p:cNvSpPr txBox="1">
+              <a:spLocks noChangeArrowheads="1"/>
+            </p:cNvSpPr>
+            <p:nvPr/>
+          </p:nvSpPr>
+          <p:spPr bwMode="auto">
+            <a:xfrm>
+              <a:off x="2045147" y="1935070"/>
+              <a:ext cx="1119506" cy="230832"/>
+            </a:xfrm>
+            <a:prstGeom prst="rect">
+              <a:avLst/>
+            </a:prstGeom>
+            <a:noFill/>
+            <a:ln w="9525">
+              <a:noFill/>
+              <a:miter lim="800000"/>
+              <a:headEnd/>
+              <a:tailEnd/>
+            </a:ln>
+            <a:extLst>
+              <a:ext uri="{909E8E84-426E-40DD-AFC4-6F175D3DCCD1}">
+                <a14:hiddenFill xmlns:a14="http://schemas.microsoft.com/office/drawing/2010/main">
+                  <a:solidFill>
+                    <a:srgbClr val="FFFFFF"/>
+                  </a:solidFill>
+                </a14:hiddenFill>
+              </a:ext>
+            </a:extLst>
+          </p:spPr>
+          <p:txBody>
+            <a:bodyPr wrap="square">
+              <a:spAutoFit/>
+            </a:bodyPr>
+            <a:lstStyle>
+              <a:lvl1pPr>
+                <a:defRPr>
+                  <a:solidFill>
+                    <a:schemeClr val="tx1"/>
+                  </a:solidFill>
+                  <a:latin typeface="Calibri" panose="020F0502020204030204" pitchFamily="34" charset="0"/>
+                </a:defRPr>
+              </a:lvl1pPr>
+              <a:lvl2pPr marL="742950" indent="-285750">
+                <a:defRPr>
+                  <a:solidFill>
+                    <a:schemeClr val="tx1"/>
+                  </a:solidFill>
+                  <a:latin typeface="Calibri" panose="020F0502020204030204" pitchFamily="34" charset="0"/>
+                </a:defRPr>
+              </a:lvl2pPr>
+              <a:lvl3pPr marL="1143000" indent="-228600">
+                <a:defRPr>
+                  <a:solidFill>
+                    <a:schemeClr val="tx1"/>
+                  </a:solidFill>
+                  <a:latin typeface="Calibri" panose="020F0502020204030204" pitchFamily="34" charset="0"/>
+                </a:defRPr>
+              </a:lvl3pPr>
+              <a:lvl4pPr marL="1600200" indent="-228600">
+                <a:defRPr>
+                  <a:solidFill>
+                    <a:schemeClr val="tx1"/>
+                  </a:solidFill>
+                  <a:latin typeface="Calibri" panose="020F0502020204030204" pitchFamily="34" charset="0"/>
+                </a:defRPr>
+              </a:lvl4pPr>
+              <a:lvl5pPr marL="2057400" indent="-228600">
+                <a:defRPr>
+                  <a:solidFill>
+                    <a:schemeClr val="tx1"/>
+                  </a:solidFill>
+                  <a:latin typeface="Calibri" panose="020F0502020204030204" pitchFamily="34" charset="0"/>
+                </a:defRPr>
+              </a:lvl5pPr>
+              <a:lvl6pPr marL="2514600" indent="-228600" eaLnBrk="0" fontAlgn="base" hangingPunct="0">
+                <a:spcBef>
+                  <a:spcPct val="0"/>
+                </a:spcBef>
+                <a:spcAft>
+                  <a:spcPct val="0"/>
+                </a:spcAft>
+                <a:defRPr>
+                  <a:solidFill>
+                    <a:schemeClr val="tx1"/>
+                  </a:solidFill>
+                  <a:latin typeface="Calibri" panose="020F0502020204030204" pitchFamily="34" charset="0"/>
+                </a:defRPr>
+              </a:lvl6pPr>
+              <a:lvl7pPr marL="2971800" indent="-228600" eaLnBrk="0" fontAlgn="base" hangingPunct="0">
+                <a:spcBef>
+                  <a:spcPct val="0"/>
+                </a:spcBef>
+                <a:spcAft>
+                  <a:spcPct val="0"/>
+                </a:spcAft>
+                <a:defRPr>
+                  <a:solidFill>
+                    <a:schemeClr val="tx1"/>
+                  </a:solidFill>
+                  <a:latin typeface="Calibri" panose="020F0502020204030204" pitchFamily="34" charset="0"/>
+                </a:defRPr>
+              </a:lvl7pPr>
+              <a:lvl8pPr marL="3429000" indent="-228600" eaLnBrk="0" fontAlgn="base" hangingPunct="0">
+                <a:spcBef>
+                  <a:spcPct val="0"/>
+                </a:spcBef>
+                <a:spcAft>
+                  <a:spcPct val="0"/>
+                </a:spcAft>
+                <a:defRPr>
+                  <a:solidFill>
+                    <a:schemeClr val="tx1"/>
+                  </a:solidFill>
+                  <a:latin typeface="Calibri" panose="020F0502020204030204" pitchFamily="34" charset="0"/>
+                </a:defRPr>
+              </a:lvl8pPr>
+              <a:lvl9pPr marL="3886200" indent="-228600" eaLnBrk="0" fontAlgn="base" hangingPunct="0">
+                <a:spcBef>
+                  <a:spcPct val="0"/>
+                </a:spcBef>
+                <a:spcAft>
+                  <a:spcPct val="0"/>
+                </a:spcAft>
+                <a:defRPr>
+                  <a:solidFill>
+                    <a:schemeClr val="tx1"/>
+                  </a:solidFill>
+                  <a:latin typeface="Calibri" panose="020F0502020204030204" pitchFamily="34" charset="0"/>
+                </a:defRPr>
+              </a:lvl9pPr>
+            </a:lstStyle>
+            <a:p>
+              <a:pPr algn="ctr" eaLnBrk="1" hangingPunct="1"/>
+              <a:r>
+                <a:rPr lang="en-US" altLang="en-US" sz="900" dirty="0">
+                  <a:latin typeface="Arial" panose="020B0604020202020204" pitchFamily="34" charset="0"/>
+                  <a:cs typeface="Arial" panose="020B0604020202020204" pitchFamily="34" charset="0"/>
+                </a:rPr>
+                <a:t>AWS Lambda</a:t>
+              </a:r>
+            </a:p>
+          </p:txBody>
+        </p:sp>
+        <p:pic>
+          <p:nvPicPr>
+            <p:cNvPr id="61" name="Graphic 10">
+              <a:extLst>
+                <a:ext uri="{FF2B5EF4-FFF2-40B4-BE49-F238E27FC236}">
+                  <a16:creationId xmlns:a16="http://schemas.microsoft.com/office/drawing/2014/main" id="{B40C0D01-F129-45A9-8A25-F9F25E8962E8}"/>
+                </a:ext>
+              </a:extLst>
+            </p:cNvPr>
+            <p:cNvPicPr>
+              <a:picLocks noChangeAspect="1" noChangeArrowheads="1"/>
+            </p:cNvPicPr>
+            <p:nvPr/>
+          </p:nvPicPr>
+          <p:blipFill>
+            <a:blip r:embed="rId24">
+              <a:extLst>
+                <a:ext uri="{96DAC541-7B7A-43D3-8B79-37D633B846F1}">
+                  <asvg:svgBlip xmlns:asvg="http://schemas.microsoft.com/office/drawing/2016/SVG/main" r:embed="rId25"/>
+                </a:ext>
+              </a:extLst>
+            </a:blip>
+            <a:srcRect/>
+            <a:stretch/>
+          </p:blipFill>
+          <p:spPr bwMode="auto">
+            <a:xfrm>
+              <a:off x="2416252" y="1546153"/>
+              <a:ext cx="365760" cy="365760"/>
+            </a:xfrm>
+            <a:prstGeom prst="rect">
+              <a:avLst/>
+            </a:prstGeom>
+            <a:noFill/>
+            <a:ln>
+              <a:noFill/>
+            </a:ln>
+            <a:extLst>
+              <a:ext uri="{909E8E84-426E-40DD-AFC4-6F175D3DCCD1}">
+                <a14:hiddenFill xmlns:a14="http://schemas.microsoft.com/office/drawing/2010/main">
+                  <a:solidFill>
+                    <a:srgbClr val="FFFFFF"/>
+                  </a:solidFill>
+                </a14:hiddenFill>
+              </a:ext>
+              <a:ext uri="{91240B29-F687-4F45-9708-019B960494DF}">
+                <a14:hiddenLine xmlns:a14="http://schemas.microsoft.com/office/drawing/2010/main" w="9525">
+                  <a:solidFill>
+                    <a:srgbClr val="000000"/>
+                  </a:solidFill>
+                  <a:miter lim="800000"/>
+                  <a:headEnd/>
+                  <a:tailEnd/>
+                </a14:hiddenLine>
+              </a:ext>
+            </a:extLst>
+          </p:spPr>
+        </p:pic>
+      </p:grpSp>
     </p:spTree>
     <p:extLst>
       <p:ext uri="{BB962C8B-B14F-4D97-AF65-F5344CB8AC3E}">
@@ -5697,7 +5972,7 @@
         </p:nvSpPr>
         <p:spPr>
           <a:xfrm>
-            <a:off x="8856776" y="-1011"/>
+            <a:off x="8856776" y="13485"/>
             <a:ext cx="3327294" cy="6859011"/>
           </a:xfrm>
           <a:prstGeom prst="rect">
@@ -5801,7 +6076,7 @@
         <p:spPr>
           <a:xfrm>
             <a:off x="9186315" y="86206"/>
-            <a:ext cx="3073724" cy="6694140"/>
+            <a:ext cx="3073724" cy="6832640"/>
           </a:xfrm>
           <a:prstGeom prst="rect">
             <a:avLst/>
@@ -5832,7 +6107,6 @@
                 <a:latin typeface="Arial" panose="020B0604020202020204" pitchFamily="34" charset="0"/>
                 <a:ea typeface="Amazon Ember" panose="020B0603020204020204" pitchFamily="34" charset="0"/>
                 <a:cs typeface="Arial" panose="020B0604020202020204" pitchFamily="34" charset="0"/>
-                <a:hlinkClick r:id="rId3"/>
               </a:rPr>
               <a:t>AWS Identity and Access Management (IAM)</a:t>
             </a:r>
@@ -5864,7 +6138,6 @@
                 <a:latin typeface="Arial" panose="020B0604020202020204" pitchFamily="34" charset="0"/>
                 <a:ea typeface="Amazon Ember" panose="020B0603020204020204" pitchFamily="34" charset="0"/>
                 <a:cs typeface="Arial" panose="020B0604020202020204" pitchFamily="34" charset="0"/>
-                <a:hlinkClick r:id="rId4"/>
               </a:rPr>
               <a:t>Amazon Simple Storage Service (S3) </a:t>
             </a:r>
@@ -5905,7 +6178,7 @@
                 <a:ea typeface="Amazon Ember" panose="020B0603020204020204" pitchFamily="34" charset="0"/>
                 <a:cs typeface="Arial" panose="020B0604020202020204" pitchFamily="34" charset="0"/>
               </a:rPr>
-              <a:t>Optionally, the solution supports external job submission by uploading a ‘.JSON’ job configuration file and media into a designated S3 job bucket location. </a:t>
+              <a:t>Optionally, the solution supports external job submission by uploading a ‘.JSON’ job configuration file and media files into a designated S3 job bucket location. </a:t>
             </a:r>
           </a:p>
           <a:p>
@@ -5927,7 +6200,6 @@
                 <a:latin typeface="Arial" panose="020B0604020202020204" pitchFamily="34" charset="0"/>
                 <a:ea typeface="Amazon Ember" panose="020B0603020204020204" pitchFamily="34" charset="0"/>
                 <a:cs typeface="Arial" panose="020B0604020202020204" pitchFamily="34" charset="0"/>
-                <a:hlinkClick r:id="rId5"/>
               </a:rPr>
               <a:t>Amazon Simple Notification Service (SNS) </a:t>
             </a:r>
@@ -5937,14 +6209,21 @@
                 <a:ea typeface="Amazon Ember" panose="020B0603020204020204" pitchFamily="34" charset="0"/>
                 <a:cs typeface="Arial" panose="020B0604020202020204" pitchFamily="34" charset="0"/>
               </a:rPr>
-              <a:t>message that will invoke an initialization </a:t>
+              <a:t>message that will invoke the initialization </a:t>
+            </a:r>
+            <a:r>
+              <a:rPr lang="en-US" sz="900" b="1" i="1" dirty="0">
+                <a:latin typeface="Arial" panose="020B0604020202020204" pitchFamily="34" charset="0"/>
+                <a:ea typeface="Amazon Ember" panose="020B0603020204020204" pitchFamily="34" charset="0"/>
+                <a:cs typeface="Arial" panose="020B0604020202020204" pitchFamily="34" charset="0"/>
+              </a:rPr>
+              <a:t>Job trigger </a:t>
             </a:r>
             <a:r>
               <a:rPr lang="en-US" sz="900" b="1" dirty="0">
                 <a:latin typeface="Arial" panose="020B0604020202020204" pitchFamily="34" charset="0"/>
                 <a:ea typeface="Amazon Ember" panose="020B0603020204020204" pitchFamily="34" charset="0"/>
                 <a:cs typeface="Arial" panose="020B0604020202020204" pitchFamily="34" charset="0"/>
-                <a:hlinkClick r:id="rId6"/>
               </a:rPr>
               <a:t>AWS Lambda </a:t>
             </a:r>
@@ -5969,7 +6248,15 @@
                 <a:ea typeface="Amazon Ember" panose="020B0603020204020204" pitchFamily="34" charset="0"/>
                 <a:cs typeface="Arial" panose="020B0604020202020204" pitchFamily="34" charset="0"/>
               </a:rPr>
-              <a:t>The job trigger </a:t>
+              <a:t>The </a:t>
+            </a:r>
+            <a:r>
+              <a:rPr lang="en-US" sz="900" b="1" i="1" dirty="0">
+                <a:latin typeface="Arial" panose="020B0604020202020204" pitchFamily="34" charset="0"/>
+                <a:ea typeface="Amazon Ember" panose="020B0603020204020204" pitchFamily="34" charset="0"/>
+                <a:cs typeface="Arial" panose="020B0604020202020204" pitchFamily="34" charset="0"/>
+              </a:rPr>
+              <a:t>Job trigger </a:t>
             </a:r>
             <a:r>
               <a:rPr lang="en-US" sz="900" b="1" dirty="0">
@@ -5992,7 +6279,6 @@
                 <a:latin typeface="Arial" panose="020B0604020202020204" pitchFamily="34" charset="0"/>
                 <a:ea typeface="Amazon Ember" panose="020B0603020204020204" pitchFamily="34" charset="0"/>
                 <a:cs typeface="Arial" panose="020B0604020202020204" pitchFamily="34" charset="0"/>
-                <a:hlinkClick r:id="rId7"/>
               </a:rPr>
               <a:t>AWS Step Function State Machine</a:t>
             </a:r>
@@ -6024,7 +6310,6 @@
                 <a:latin typeface="Arial" panose="020B0604020202020204" pitchFamily="34" charset="0"/>
                 <a:ea typeface="Amazon Ember" panose="020B0603020204020204" pitchFamily="34" charset="0"/>
                 <a:cs typeface="Arial" panose="020B0604020202020204" pitchFamily="34" charset="0"/>
-                <a:hlinkClick r:id="rId8"/>
               </a:rPr>
               <a:t>Amazon DynamoDB</a:t>
             </a:r>
@@ -6103,27 +6388,8 @@
                 <a:latin typeface="Arial" panose="020B0604020202020204" pitchFamily="34" charset="0"/>
                 <a:ea typeface="Amazon Ember" panose="020B0603020204020204" pitchFamily="34" charset="0"/>
                 <a:cs typeface="Arial" panose="020B0604020202020204" pitchFamily="34" charset="0"/>
-                <a:hlinkClick r:id="rId9"/>
-              </a:rPr>
-              <a:t>Amazon </a:t>
-            </a:r>
-            <a:r>
-              <a:rPr lang="en-US" sz="900" b="1" dirty="0" err="1">
-                <a:latin typeface="Arial" panose="020B0604020202020204" pitchFamily="34" charset="0"/>
-                <a:ea typeface="Amazon Ember" panose="020B0603020204020204" pitchFamily="34" charset="0"/>
-                <a:cs typeface="Arial" panose="020B0604020202020204" pitchFamily="34" charset="0"/>
-                <a:hlinkClick r:id="rId9"/>
-              </a:rPr>
-              <a:t>SageMaker</a:t>
-            </a:r>
-            <a:r>
-              <a:rPr lang="en-US" sz="900" b="1" dirty="0">
-                <a:latin typeface="Arial" panose="020B0604020202020204" pitchFamily="34" charset="0"/>
-                <a:ea typeface="Amazon Ember" panose="020B0603020204020204" pitchFamily="34" charset="0"/>
-                <a:cs typeface="Arial" panose="020B0604020202020204" pitchFamily="34" charset="0"/>
-                <a:hlinkClick r:id="rId9"/>
-              </a:rPr>
-              <a:t> </a:t>
+              </a:rPr>
+              <a:t>Amazon SageMaker </a:t>
             </a:r>
             <a:r>
               <a:rPr lang="en-US" sz="900" dirty="0">
@@ -6153,9 +6419,17 @@
                 <a:latin typeface="Arial" panose="020B0604020202020204" pitchFamily="34" charset="0"/>
                 <a:ea typeface="Amazon Ember" panose="020B0603020204020204" pitchFamily="34" charset="0"/>
                 <a:cs typeface="Arial" panose="020B0604020202020204" pitchFamily="34" charset="0"/>
-                <a:hlinkClick r:id="rId10"/>
-              </a:rPr>
-              <a:t>Amazon Elastic Container Registry (ECR) </a:t>
+              </a:rPr>
+              <a:t>Amazon Elastic Container Registry (ECR)</a:t>
+            </a:r>
+            <a:r>
+              <a:rPr lang="en-US" sz="900" b="1" dirty="0">
+                <a:latin typeface="Arial" panose="020B0604020202020204" pitchFamily="34" charset="0"/>
+                <a:ea typeface="Amazon Ember" panose="020B0603020204020204" pitchFamily="34" charset="0"/>
+                <a:cs typeface="Arial" panose="020B0604020202020204" pitchFamily="34" charset="0"/>
+                <a:hlinkClick r:id="rId3"/>
+              </a:rPr>
+              <a:t> </a:t>
             </a:r>
             <a:r>
               <a:rPr lang="en-US" sz="900" dirty="0">
@@ -6163,7 +6437,23 @@
                 <a:ea typeface="Amazon Ember" panose="020B0603020204020204" pitchFamily="34" charset="0"/>
                 <a:cs typeface="Arial" panose="020B0604020202020204" pitchFamily="34" charset="0"/>
               </a:rPr>
-              <a:t>container image and S3 job bucket model artifacts will be used to spin up a new Graphics Processing Unit (GPU) container. The compute node instance type is determined by the job JSON configuration.</a:t>
+              <a:t>container image and S3 job bucket model artifacts will be used to </a:t>
+            </a:r>
+            <a:r>
+              <a:rPr lang="en-US" sz="900" i="1" dirty="0">
+                <a:latin typeface="Arial" panose="020B0604020202020204" pitchFamily="34" charset="0"/>
+                <a:ea typeface="Amazon Ember" panose="020B0603020204020204" pitchFamily="34" charset="0"/>
+                <a:cs typeface="Arial" panose="020B0604020202020204" pitchFamily="34" charset="0"/>
+              </a:rPr>
+              <a:t>deploy a new container on a Graphics Processing Unit (GPU) based compute node</a:t>
+            </a:r>
+            <a:r>
+              <a:rPr lang="en-US" sz="900" dirty="0">
+                <a:latin typeface="Arial" panose="020B0604020202020204" pitchFamily="34" charset="0"/>
+                <a:ea typeface="Amazon Ember" panose="020B0603020204020204" pitchFamily="34" charset="0"/>
+                <a:cs typeface="Arial" panose="020B0604020202020204" pitchFamily="34" charset="0"/>
+              </a:rPr>
+              <a:t>. The compute node instance type is determined by the job JSON configuration.</a:t>
             </a:r>
           </a:p>
           <a:p>
@@ -6178,7 +6468,7 @@
                 <a:ea typeface="Amazon Ember" panose="020B0603020204020204" pitchFamily="34" charset="0"/>
                 <a:cs typeface="Arial" panose="020B0604020202020204" pitchFamily="34" charset="0"/>
               </a:rPr>
-              <a:t>The GPU container will run the entire pipeline as an </a:t>
+              <a:t>The container will run the entire pipeline as an </a:t>
             </a:r>
             <a:r>
               <a:rPr lang="en-US" sz="900" b="1" dirty="0">
@@ -6186,15 +6476,23 @@
                 <a:ea typeface="Amazon Ember" panose="020B0603020204020204" pitchFamily="34" charset="0"/>
                 <a:cs typeface="Arial" panose="020B0604020202020204" pitchFamily="34" charset="0"/>
               </a:rPr>
-              <a:t>Amazon </a:t>
-            </a:r>
-            <a:r>
-              <a:rPr lang="en-US" sz="900" b="1" dirty="0" err="1">
+              <a:t>Amazon SageMaker</a:t>
+            </a:r>
+            <a:r>
+              <a:rPr lang="en-US" sz="900" dirty="0">
                 <a:latin typeface="Arial" panose="020B0604020202020204" pitchFamily="34" charset="0"/>
                 <a:ea typeface="Amazon Ember" panose="020B0603020204020204" pitchFamily="34" charset="0"/>
                 <a:cs typeface="Arial" panose="020B0604020202020204" pitchFamily="34" charset="0"/>
               </a:rPr>
-              <a:t>SageMaker</a:t>
+              <a:t> training job </a:t>
+            </a:r>
+            <a:r>
+              <a:rPr lang="en-US" sz="900" i="1" dirty="0">
+                <a:latin typeface="Arial" panose="020B0604020202020204" pitchFamily="34" charset="0"/>
+                <a:ea typeface="Amazon Ember" panose="020B0603020204020204" pitchFamily="34" charset="0"/>
+                <a:cs typeface="Arial" panose="020B0604020202020204" pitchFamily="34" charset="0"/>
+              </a:rPr>
+              <a:t>on a GPU compute node</a:t>
             </a:r>
             <a:r>
               <a:rPr lang="en-US" sz="900" dirty="0">
@@ -6202,7 +6500,7 @@
                 <a:ea typeface="Amazon Ember" panose="020B0603020204020204" pitchFamily="34" charset="0"/>
                 <a:cs typeface="Arial" panose="020B0604020202020204" pitchFamily="34" charset="0"/>
               </a:rPr>
-              <a:t> training job.</a:t>
+              <a:t>.</a:t>
             </a:r>
           </a:p>
           <a:p>
@@ -6217,7 +6515,15 @@
                 <a:ea typeface="Amazon Ember" panose="020B0603020204020204" pitchFamily="34" charset="0"/>
                 <a:cs typeface="Arial" panose="020B0604020202020204" pitchFamily="34" charset="0"/>
               </a:rPr>
-              <a:t>The job completion </a:t>
+              <a:t>The </a:t>
+            </a:r>
+            <a:r>
+              <a:rPr lang="en-US" sz="900" b="1" i="1" dirty="0">
+                <a:latin typeface="Arial" panose="020B0604020202020204" pitchFamily="34" charset="0"/>
+                <a:ea typeface="Amazon Ember" panose="020B0603020204020204" pitchFamily="34" charset="0"/>
+                <a:cs typeface="Arial" panose="020B0604020202020204" pitchFamily="34" charset="0"/>
+              </a:rPr>
+              <a:t>Job completion </a:t>
             </a:r>
             <a:r>
               <a:rPr lang="en-US" sz="900" b="1" dirty="0">
@@ -6287,9 +6593,17 @@
                 <a:latin typeface="Arial" panose="020B0604020202020204" pitchFamily="34" charset="0"/>
                 <a:ea typeface="Amazon Ember" panose="020B0603020204020204" pitchFamily="34" charset="0"/>
                 <a:cs typeface="Arial" panose="020B0604020202020204" pitchFamily="34" charset="0"/>
-                <a:hlinkClick r:id="rId11"/>
-              </a:rPr>
-              <a:t>AWS System Manager Parameter Store </a:t>
+              </a:rPr>
+              <a:t>AWS System Manager Parameter Store</a:t>
+            </a:r>
+            <a:r>
+              <a:rPr lang="en-US" sz="900" b="1" dirty="0">
+                <a:latin typeface="Arial" panose="020B0604020202020204" pitchFamily="34" charset="0"/>
+                <a:ea typeface="Amazon Ember" panose="020B0603020204020204" pitchFamily="34" charset="0"/>
+                <a:cs typeface="Arial" panose="020B0604020202020204" pitchFamily="34" charset="0"/>
+                <a:hlinkClick r:id="rId4"/>
+              </a:rPr>
+              <a:t> </a:t>
             </a:r>
             <a:r>
               <a:rPr lang="en-US" sz="900" dirty="0">
@@ -6297,7 +6611,15 @@
                 <a:ea typeface="Amazon Ember" panose="020B0603020204020204" pitchFamily="34" charset="0"/>
                 <a:cs typeface="Arial" panose="020B0604020202020204" pitchFamily="34" charset="0"/>
               </a:rPr>
-              <a:t>during guidance deployment to decouple the job trigger </a:t>
+              <a:t>during guidance deployment to decouple the </a:t>
+            </a:r>
+            <a:r>
+              <a:rPr lang="en-US" sz="900" b="1" i="1" dirty="0">
+                <a:latin typeface="Arial" panose="020B0604020202020204" pitchFamily="34" charset="0"/>
+                <a:ea typeface="Amazon Ember" panose="020B0603020204020204" pitchFamily="34" charset="0"/>
+                <a:cs typeface="Arial" panose="020B0604020202020204" pitchFamily="34" charset="0"/>
+              </a:rPr>
+              <a:t>Job trigger </a:t>
             </a:r>
             <a:r>
               <a:rPr lang="en-US" sz="900" b="1" dirty="0">
@@ -6351,7 +6673,7 @@
                 <a:latin typeface="Arial" panose="020B0604020202020204" pitchFamily="34" charset="0"/>
                 <a:ea typeface="Amazon Ember" panose="020B0603020204020204" pitchFamily="34" charset="0"/>
                 <a:cs typeface="Arial" panose="020B0604020202020204" pitchFamily="34" charset="0"/>
-                <a:hlinkClick r:id="rId12"/>
+                <a:hlinkClick r:id="rId5"/>
               </a:rPr>
               <a:t>Amazon CloudWatch </a:t>
             </a:r>
@@ -6361,7 +6683,23 @@
                 <a:ea typeface="Amazon Ember" panose="020B0603020204020204" pitchFamily="34" charset="0"/>
                 <a:cs typeface="Arial" panose="020B0604020202020204" pitchFamily="34" charset="0"/>
               </a:rPr>
-              <a:t>is used to monitor the training logs, surfacing errors to the user.</a:t>
+              <a:t> is used to log and monitor the training jobs, surfacing </a:t>
+            </a:r>
+            <a:r>
+              <a:rPr lang="en-US" sz="900" i="1" dirty="0">
+                <a:latin typeface="Arial" panose="020B0604020202020204" pitchFamily="34" charset="0"/>
+                <a:ea typeface="Amazon Ember" panose="020B0603020204020204" pitchFamily="34" charset="0"/>
+                <a:cs typeface="Arial" panose="020B0604020202020204" pitchFamily="34" charset="0"/>
+              </a:rPr>
+              <a:t>possible</a:t>
+            </a:r>
+            <a:r>
+              <a:rPr lang="en-US" sz="900" dirty="0">
+                <a:latin typeface="Arial" panose="020B0604020202020204" pitchFamily="34" charset="0"/>
+                <a:ea typeface="Amazon Ember" panose="020B0603020204020204" pitchFamily="34" charset="0"/>
+                <a:cs typeface="Arial" panose="020B0604020202020204" pitchFamily="34" charset="0"/>
+              </a:rPr>
+              <a:t> errors to the user.</a:t>
             </a:r>
           </a:p>
         </p:txBody>
@@ -7062,7 +7400,7 @@
               <a:defRPr/>
             </a:pPr>
             <a:r>
-              <a:rPr lang="en-US" sz="1100" dirty="0">
+              <a:rPr lang="en-US" sz="900" dirty="0">
                 <a:solidFill>
                   <a:schemeClr val="tx1"/>
                 </a:solidFill>
@@ -7088,10 +7426,10 @@
         </p:nvGrpSpPr>
         <p:grpSpPr>
           <a:xfrm>
-            <a:off x="838169" y="3508020"/>
-            <a:ext cx="1287216" cy="938376"/>
+            <a:off x="857903" y="3508020"/>
+            <a:ext cx="1287216" cy="918521"/>
             <a:chOff x="857419" y="2878458"/>
-            <a:chExt cx="1276790" cy="938376"/>
+            <a:chExt cx="1276790" cy="918521"/>
           </a:xfrm>
         </p:grpSpPr>
         <p:sp>
@@ -7110,8 +7448,8 @@
           </p:nvSpPr>
           <p:spPr bwMode="auto">
             <a:xfrm>
-              <a:off x="857419" y="3262836"/>
-              <a:ext cx="1276790" cy="553998"/>
+              <a:off x="857419" y="3289148"/>
+              <a:ext cx="1276790" cy="507831"/>
             </a:xfrm>
             <a:prstGeom prst="rect">
               <a:avLst/>
@@ -7245,7 +7583,7 @@
             <a:p>
               <a:pPr algn="ctr" eaLnBrk="1" hangingPunct="1"/>
               <a:r>
-                <a:rPr lang="en-US" altLang="en-US" sz="1000" dirty="0">
+                <a:rPr lang="en-US" altLang="en-US" sz="900" dirty="0">
                   <a:solidFill>
                     <a:sysClr val="windowText" lastClr="000000"/>
                   </a:solidFill>
@@ -7255,7 +7593,7 @@
                 <a:t>Media</a:t>
               </a:r>
               <a:br>
-                <a:rPr lang="en-US" altLang="en-US" sz="1000" dirty="0">
+                <a:rPr lang="en-US" altLang="en-US" sz="900" dirty="0">
                   <a:solidFill>
                     <a:sysClr val="windowText" lastClr="000000"/>
                   </a:solidFill>
@@ -7264,7 +7602,7 @@
                 </a:rPr>
               </a:br>
               <a:r>
-                <a:rPr lang="en-US" altLang="en-US" sz="1000" dirty="0">
+                <a:rPr lang="en-US" altLang="en-US" sz="900" dirty="0">
                   <a:solidFill>
                     <a:sysClr val="windowText" lastClr="000000"/>
                   </a:solidFill>
@@ -7277,7 +7615,7 @@
             <a:p>
               <a:pPr algn="ctr" eaLnBrk="1" hangingPunct="1"/>
               <a:r>
-                <a:rPr lang="en-US" altLang="en-US" sz="1000" dirty="0">
+                <a:rPr lang="en-US" altLang="en-US" sz="900" dirty="0">
                   <a:solidFill>
                     <a:sysClr val="windowText" lastClr="000000"/>
                   </a:solidFill>
@@ -7304,10 +7642,10 @@
             <p:nvPr/>
           </p:nvPicPr>
           <p:blipFill>
-            <a:blip r:embed="rId13">
+            <a:blip r:embed="rId6">
               <a:extLst>
                 <a:ext uri="{96DAC541-7B7A-43D3-8B79-37D633B846F1}">
-                  <asvg:svgBlip xmlns:asvg="http://schemas.microsoft.com/office/drawing/2016/SVG/main" r:embed="rId14"/>
+                  <asvg:svgBlip xmlns:asvg="http://schemas.microsoft.com/office/drawing/2016/SVG/main" r:embed="rId7"/>
                 </a:ext>
               </a:extLst>
             </a:blip>
@@ -7340,9 +7678,9 @@
         <p:grpSpPr>
           <a:xfrm>
             <a:off x="972913" y="4743885"/>
-            <a:ext cx="1081913" cy="797487"/>
+            <a:ext cx="1081913" cy="786443"/>
             <a:chOff x="959239" y="4033316"/>
-            <a:chExt cx="1073150" cy="797487"/>
+            <a:chExt cx="1073150" cy="786443"/>
           </a:xfrm>
         </p:grpSpPr>
         <p:pic>
@@ -7360,10 +7698,10 @@
             <p:nvPr/>
           </p:nvPicPr>
           <p:blipFill>
-            <a:blip r:embed="rId15">
+            <a:blip r:embed="rId8">
               <a:extLst>
                 <a:ext uri="{96DAC541-7B7A-43D3-8B79-37D633B846F1}">
-                  <asvg:svgBlip xmlns:asvg="http://schemas.microsoft.com/office/drawing/2016/SVG/main" r:embed="rId16"/>
+                  <asvg:svgBlip xmlns:asvg="http://schemas.microsoft.com/office/drawing/2016/SVG/main" r:embed="rId9"/>
                 </a:ext>
               </a:extLst>
             </a:blip>
@@ -7419,8 +7757,8 @@
           </p:nvSpPr>
           <p:spPr bwMode="auto">
             <a:xfrm>
-              <a:off x="959239" y="4430693"/>
-              <a:ext cx="1073150" cy="400110"/>
+              <a:off x="959239" y="4450427"/>
+              <a:ext cx="1073150" cy="369332"/>
             </a:xfrm>
             <a:prstGeom prst="rect">
               <a:avLst/>
@@ -7554,7 +7892,7 @@
             <a:p>
               <a:pPr algn="ctr" eaLnBrk="1" hangingPunct="1"/>
               <a:r>
-                <a:rPr lang="en-US" altLang="en-US" sz="1000" dirty="0">
+                <a:rPr lang="en-US" altLang="en-US" sz="900" dirty="0">
                   <a:solidFill>
                     <a:sysClr val="windowText" lastClr="000000"/>
                   </a:solidFill>
@@ -7582,13 +7920,13 @@
           <p:nvPr/>
         </p:nvPicPr>
         <p:blipFill>
-          <a:blip r:embed="rId17" cstate="print">
+          <a:blip r:embed="rId10" cstate="print">
             <a:extLst>
               <a:ext uri="{28A0092B-C50C-407E-A947-70E740481C1C}">
                 <a14:useLocalDpi xmlns:a14="http://schemas.microsoft.com/office/drawing/2010/main" val="0"/>
               </a:ext>
               <a:ext uri="{96DAC541-7B7A-43D3-8B79-37D633B846F1}">
-                <asvg:svgBlip xmlns:asvg="http://schemas.microsoft.com/office/drawing/2016/SVG/main" r:embed="rId18"/>
+                <asvg:svgBlip xmlns:asvg="http://schemas.microsoft.com/office/drawing/2016/SVG/main" r:embed="rId11"/>
               </a:ext>
             </a:extLst>
           </a:blip>
@@ -7621,10 +7959,10 @@
           <p:nvPr/>
         </p:nvPicPr>
         <p:blipFill>
-          <a:blip r:embed="rId19">
+          <a:blip r:embed="rId12">
             <a:extLst>
               <a:ext uri="{96DAC541-7B7A-43D3-8B79-37D633B846F1}">
-                <asvg:svgBlip xmlns:asvg="http://schemas.microsoft.com/office/drawing/2016/SVG/main" r:embed="rId20"/>
+                <asvg:svgBlip xmlns:asvg="http://schemas.microsoft.com/office/drawing/2016/SVG/main" r:embed="rId13"/>
               </a:ext>
             </a:extLst>
           </a:blip>
@@ -7633,8 +7971,8 @@
         </p:blipFill>
         <p:spPr bwMode="auto">
           <a:xfrm>
-            <a:off x="4620361" y="1570017"/>
-            <a:ext cx="414840" cy="411480"/>
+            <a:off x="4620362" y="1570017"/>
+            <a:ext cx="368747" cy="365760"/>
           </a:xfrm>
           <a:prstGeom prst="rect">
             <a:avLst/>
@@ -7680,8 +8018,8 @@
         </p:nvSpPr>
         <p:spPr bwMode="auto">
           <a:xfrm>
-            <a:off x="4236842" y="1986893"/>
-            <a:ext cx="1165094" cy="400110"/>
+            <a:off x="4236842" y="1954003"/>
+            <a:ext cx="1165094" cy="369332"/>
           </a:xfrm>
           <a:prstGeom prst="rect">
             <a:avLst/>
@@ -7815,7 +8153,7 @@
           <a:p>
             <a:pPr algn="ctr" eaLnBrk="1" hangingPunct="1"/>
             <a:r>
-              <a:rPr lang="en-US" altLang="en-US" sz="1000" dirty="0">
+              <a:rPr lang="en-US" altLang="en-US" sz="900" dirty="0">
                 <a:latin typeface="Arial" panose="020B0604020202020204" pitchFamily="34" charset="0"/>
                 <a:ea typeface="Amazon Ember" panose="020B0603020204020204" pitchFamily="34" charset="0"/>
                 <a:cs typeface="Arial" panose="020B0604020202020204" pitchFamily="34" charset="0"/>
@@ -7826,7 +8164,7 @@
           <a:p>
             <a:pPr algn="ctr" eaLnBrk="1" hangingPunct="1"/>
             <a:r>
-              <a:rPr lang="en-US" altLang="en-US" sz="1000" i="1" dirty="0">
+              <a:rPr lang="en-US" altLang="en-US" sz="900" i="1" dirty="0">
                 <a:latin typeface="Arial" panose="020B0604020202020204" pitchFamily="34" charset="0"/>
                 <a:ea typeface="Amazon Ember" panose="020B0603020204020204" pitchFamily="34" charset="0"/>
                 <a:cs typeface="Arial" panose="020B0604020202020204" pitchFamily="34" charset="0"/>
@@ -7852,8 +8190,8 @@
         </p:nvSpPr>
         <p:spPr bwMode="auto">
           <a:xfrm>
-            <a:off x="5563963" y="1985845"/>
-            <a:ext cx="1306999" cy="400110"/>
+            <a:off x="5563963" y="1959533"/>
+            <a:ext cx="1306999" cy="369332"/>
           </a:xfrm>
           <a:prstGeom prst="rect">
             <a:avLst/>
@@ -7980,27 +8318,27 @@
           <a:p>
             <a:pPr algn="ctr" eaLnBrk="1" hangingPunct="1"/>
             <a:r>
-              <a:rPr lang="en-US" altLang="en-US" sz="1000" dirty="0">
+              <a:rPr lang="en-US" altLang="en-US" sz="900" dirty="0">
                 <a:latin typeface="Arial" panose="020B0604020202020204" pitchFamily="34" charset="0"/>
                 <a:cs typeface="Arial" panose="020B0604020202020204" pitchFamily="34" charset="0"/>
               </a:rPr>
               <a:t>AWS Lambda</a:t>
             </a:r>
             <a:br>
-              <a:rPr lang="en-US" altLang="en-US" sz="1000" i="1" dirty="0">
+              <a:rPr lang="en-US" altLang="en-US" sz="900" i="1" dirty="0">
                 <a:latin typeface="Arial" panose="020B0604020202020204" pitchFamily="34" charset="0"/>
                 <a:cs typeface="Arial" panose="020B0604020202020204" pitchFamily="34" charset="0"/>
               </a:rPr>
             </a:br>
             <a:r>
-              <a:rPr lang="en-US" altLang="en-US" sz="1000" i="1" dirty="0">
+              <a:rPr lang="en-US" altLang="en-US" sz="900" i="1" dirty="0">
                 <a:latin typeface="Arial" panose="020B0604020202020204" pitchFamily="34" charset="0"/>
                 <a:cs typeface="Arial" panose="020B0604020202020204" pitchFamily="34" charset="0"/>
               </a:rPr>
               <a:t>Job </a:t>
             </a:r>
             <a:r>
-              <a:rPr lang="en-US" altLang="en-US" sz="1000" i="1" dirty="0">
+              <a:rPr lang="en-US" altLang="en-US" sz="900" i="1" dirty="0">
                 <a:latin typeface="Arial" panose="020B0604020202020204" pitchFamily="34" charset="0"/>
                 <a:ea typeface="Amazon Ember" panose="020B0603020204020204" pitchFamily="34" charset="0"/>
                 <a:cs typeface="Arial" panose="020B0604020202020204" pitchFamily="34" charset="0"/>
@@ -8008,14 +8346,14 @@
               <a:t>T</a:t>
             </a:r>
             <a:r>
-              <a:rPr lang="en-US" sz="1000" i="1" dirty="0">
+              <a:rPr lang="en-US" sz="900" i="1" dirty="0">
                 <a:latin typeface="Arial" panose="020B0604020202020204" pitchFamily="34" charset="0"/>
                 <a:ea typeface="Amazon Ember" panose="020B0603020204020204" pitchFamily="34" charset="0"/>
                 <a:cs typeface="Arial" panose="020B0604020202020204" pitchFamily="34" charset="0"/>
               </a:rPr>
               <a:t>rigger</a:t>
             </a:r>
-            <a:endParaRPr lang="en-US" altLang="en-US" sz="1000" i="1" dirty="0">
+            <a:endParaRPr lang="en-US" altLang="en-US" sz="900" i="1" dirty="0">
               <a:latin typeface="Arial" panose="020B0604020202020204" pitchFamily="34" charset="0"/>
               <a:cs typeface="Arial" panose="020B0604020202020204" pitchFamily="34" charset="0"/>
             </a:endParaRPr>
@@ -8037,10 +8375,10 @@
           <p:nvPr/>
         </p:nvPicPr>
         <p:blipFill>
-          <a:blip r:embed="rId21">
+          <a:blip r:embed="rId14">
             <a:extLst>
               <a:ext uri="{96DAC541-7B7A-43D3-8B79-37D633B846F1}">
-                <asvg:svgBlip xmlns:asvg="http://schemas.microsoft.com/office/drawing/2016/SVG/main" r:embed="rId22"/>
+                <asvg:svgBlip xmlns:asvg="http://schemas.microsoft.com/office/drawing/2016/SVG/main" r:embed="rId15"/>
               </a:ext>
             </a:extLst>
           </a:blip>
@@ -8049,8 +8387,8 @@
         </p:blipFill>
         <p:spPr bwMode="auto">
           <a:xfrm>
-            <a:off x="6010656" y="1576595"/>
-            <a:ext cx="414840" cy="411480"/>
+            <a:off x="6010657" y="1576595"/>
+            <a:ext cx="368747" cy="365760"/>
           </a:xfrm>
           <a:prstGeom prst="rect">
             <a:avLst/>
@@ -8095,10 +8433,10 @@
           <p:nvPr/>
         </p:nvPicPr>
         <p:blipFill>
-          <a:blip r:embed="rId23">
+          <a:blip r:embed="rId16">
             <a:extLst>
               <a:ext uri="{96DAC541-7B7A-43D3-8B79-37D633B846F1}">
-                <asvg:svgBlip xmlns:asvg="http://schemas.microsoft.com/office/drawing/2016/SVG/main" r:embed="rId24"/>
+                <asvg:svgBlip xmlns:asvg="http://schemas.microsoft.com/office/drawing/2016/SVG/main" r:embed="rId17"/>
               </a:ext>
             </a:extLst>
           </a:blip>
@@ -8107,7 +8445,7 @@
         </p:blipFill>
         <p:spPr>
           <a:xfrm>
-            <a:off x="4421945" y="2656906"/>
+            <a:off x="4382538" y="2656937"/>
             <a:ext cx="276560" cy="274320"/>
           </a:xfrm>
           <a:prstGeom prst="rect">
@@ -8130,10 +8468,10 @@
           <p:nvPr/>
         </p:nvPicPr>
         <p:blipFill>
-          <a:blip r:embed="rId25">
+          <a:blip r:embed="rId18">
             <a:extLst>
               <a:ext uri="{96DAC541-7B7A-43D3-8B79-37D633B846F1}">
-                <asvg:svgBlip xmlns:asvg="http://schemas.microsoft.com/office/drawing/2016/SVG/main" r:embed="rId26"/>
+                <asvg:svgBlip xmlns:asvg="http://schemas.microsoft.com/office/drawing/2016/SVG/main" r:embed="rId19"/>
               </a:ext>
             </a:extLst>
           </a:blip>
@@ -8142,8 +8480,8 @@
         </p:blipFill>
         <p:spPr bwMode="auto">
           <a:xfrm>
-            <a:off x="7625839" y="1571802"/>
-            <a:ext cx="414840" cy="411480"/>
+            <a:off x="7625840" y="1561292"/>
+            <a:ext cx="368747" cy="365760"/>
           </a:xfrm>
           <a:prstGeom prst="rect">
             <a:avLst/>
@@ -8189,8 +8527,8 @@
         </p:nvSpPr>
         <p:spPr bwMode="auto">
           <a:xfrm>
-            <a:off x="7385709" y="1988308"/>
-            <a:ext cx="876880" cy="400110"/>
+            <a:off x="7163664" y="1948840"/>
+            <a:ext cx="1306999" cy="230832"/>
           </a:xfrm>
           <a:prstGeom prst="rect">
             <a:avLst/>
@@ -8324,23 +8662,12 @@
           <a:p>
             <a:pPr algn="ctr" eaLnBrk="1" hangingPunct="1"/>
             <a:r>
-              <a:rPr lang="en-US" altLang="en-US" sz="1000" dirty="0">
+              <a:rPr lang="en-US" altLang="en-US" sz="900" dirty="0">
                 <a:latin typeface="Arial" panose="020B0604020202020204" pitchFamily="34" charset="0"/>
                 <a:ea typeface="Amazon Ember" panose="020B0603020204020204" pitchFamily="34" charset="0"/>
                 <a:cs typeface="Arial" panose="020B0604020202020204" pitchFamily="34" charset="0"/>
               </a:rPr>
-              <a:t>Amazon</a:t>
-            </a:r>
-          </a:p>
-          <a:p>
-            <a:pPr algn="ctr" eaLnBrk="1" hangingPunct="1"/>
-            <a:r>
-              <a:rPr lang="en-US" altLang="en-US" sz="1000" dirty="0">
-                <a:latin typeface="Arial" panose="020B0604020202020204" pitchFamily="34" charset="0"/>
-                <a:ea typeface="Amazon Ember" panose="020B0603020204020204" pitchFamily="34" charset="0"/>
-                <a:cs typeface="Arial" panose="020B0604020202020204" pitchFamily="34" charset="0"/>
-              </a:rPr>
-              <a:t>DynamoDB</a:t>
+              <a:t>Amazon DynamoDB</a:t>
             </a:r>
           </a:p>
         </p:txBody>
@@ -8360,10 +8687,10 @@
           <p:nvPr/>
         </p:nvPicPr>
         <p:blipFill>
-          <a:blip r:embed="rId27">
+          <a:blip r:embed="rId20">
             <a:extLst>
               <a:ext uri="{96DAC541-7B7A-43D3-8B79-37D633B846F1}">
-                <asvg:svgBlip xmlns:asvg="http://schemas.microsoft.com/office/drawing/2016/SVG/main" r:embed="rId28"/>
+                <asvg:svgBlip xmlns:asvg="http://schemas.microsoft.com/office/drawing/2016/SVG/main" r:embed="rId21"/>
               </a:ext>
             </a:extLst>
           </a:blip>
@@ -8372,8 +8699,8 @@
         </p:blipFill>
         <p:spPr bwMode="auto">
           <a:xfrm>
-            <a:off x="5003750" y="3373719"/>
-            <a:ext cx="414840" cy="411480"/>
+            <a:off x="5062952" y="3373719"/>
+            <a:ext cx="365760" cy="362798"/>
           </a:xfrm>
           <a:prstGeom prst="rect">
             <a:avLst/>
@@ -8419,8 +8746,8 @@
         </p:nvSpPr>
         <p:spPr bwMode="auto">
           <a:xfrm>
-            <a:off x="4637658" y="3767053"/>
-            <a:ext cx="1194997" cy="553998"/>
+            <a:off x="4530924" y="3747319"/>
+            <a:ext cx="1468230" cy="369332"/>
           </a:xfrm>
           <a:prstGeom prst="rect">
             <a:avLst/>
@@ -8554,25 +8881,22 @@
           <a:p>
             <a:pPr algn="ctr" eaLnBrk="1" hangingPunct="1"/>
             <a:r>
-              <a:rPr lang="en-US" altLang="en-US" sz="1000" dirty="0">
+              <a:rPr lang="en-US" altLang="en-US" sz="900" dirty="0">
                 <a:latin typeface="Arial" panose="020B0604020202020204" pitchFamily="34" charset="0"/>
                 <a:ea typeface="Amazon Ember" panose="020B0603020204020204" pitchFamily="34" charset="0"/>
                 <a:cs typeface="Arial" panose="020B0604020202020204" pitchFamily="34" charset="0"/>
               </a:rPr>
-              <a:t>Amazon</a:t>
-            </a:r>
-          </a:p>
-          <a:p>
-            <a:pPr algn="ctr" eaLnBrk="1" hangingPunct="1"/>
-            <a:r>
-              <a:rPr lang="en-US" altLang="en-US" sz="1000" dirty="0" err="1">
+              <a:t>Amazon </a:t>
+            </a:r>
+            <a:r>
+              <a:rPr lang="en-US" altLang="en-US" sz="900" dirty="0" err="1">
                 <a:latin typeface="Arial" panose="020B0604020202020204" pitchFamily="34" charset="0"/>
                 <a:ea typeface="Amazon Ember" panose="020B0603020204020204" pitchFamily="34" charset="0"/>
                 <a:cs typeface="Arial" panose="020B0604020202020204" pitchFamily="34" charset="0"/>
               </a:rPr>
               <a:t>SageMaker</a:t>
             </a:r>
-            <a:endParaRPr lang="en-US" altLang="en-US" sz="1000" dirty="0">
+            <a:endParaRPr lang="en-US" altLang="en-US" sz="900" dirty="0">
               <a:latin typeface="Arial" panose="020B0604020202020204" pitchFamily="34" charset="0"/>
               <a:ea typeface="Amazon Ember" panose="020B0603020204020204" pitchFamily="34" charset="0"/>
               <a:cs typeface="Arial" panose="020B0604020202020204" pitchFamily="34" charset="0"/>
@@ -8581,7 +8905,7 @@
           <a:p>
             <a:pPr algn="ctr" eaLnBrk="1" hangingPunct="1"/>
             <a:r>
-              <a:rPr lang="en-US" altLang="en-US" sz="1000" dirty="0">
+              <a:rPr lang="en-US" altLang="en-US" sz="900" dirty="0">
                 <a:latin typeface="Arial" panose="020B0604020202020204" pitchFamily="34" charset="0"/>
                 <a:ea typeface="Amazon Ember" panose="020B0603020204020204" pitchFamily="34" charset="0"/>
                 <a:cs typeface="Arial" panose="020B0604020202020204" pitchFamily="34" charset="0"/>
@@ -8607,8 +8931,8 @@
         </p:nvSpPr>
         <p:spPr bwMode="auto">
           <a:xfrm>
-            <a:off x="7477474" y="3687366"/>
-            <a:ext cx="1059508" cy="400110"/>
+            <a:off x="7436527" y="3666109"/>
+            <a:ext cx="1059508" cy="507831"/>
           </a:xfrm>
           <a:prstGeom prst="rect">
             <a:avLst/>
@@ -8742,25 +9066,36 @@
           <a:p>
             <a:pPr algn="ctr" eaLnBrk="1" hangingPunct="1"/>
             <a:r>
-              <a:rPr lang="en-US" altLang="en-US" sz="1000" dirty="0">
+              <a:rPr lang="en-US" altLang="en-US" sz="900" dirty="0">
                 <a:latin typeface="Arial" panose="020B0604020202020204" pitchFamily="34" charset="0"/>
                 <a:ea typeface="Amazon Ember" panose="020B0603020204020204" pitchFamily="34" charset="0"/>
                 <a:cs typeface="Arial" panose="020B0604020202020204" pitchFamily="34" charset="0"/>
               </a:rPr>
-              <a:t>GPU</a:t>
+              <a:t>AWS SageMaker</a:t>
             </a:r>
           </a:p>
           <a:p>
             <a:pPr algn="ctr" eaLnBrk="1" hangingPunct="1"/>
             <a:r>
-              <a:rPr lang="en-US" altLang="en-US" sz="1000" dirty="0">
+              <a:rPr lang="en-US" altLang="en-US" sz="900" dirty="0">
                 <a:latin typeface="Arial" panose="020B0604020202020204" pitchFamily="34" charset="0"/>
                 <a:ea typeface="Amazon Ember" panose="020B0603020204020204" pitchFamily="34" charset="0"/>
                 <a:cs typeface="Arial" panose="020B0604020202020204" pitchFamily="34" charset="0"/>
               </a:rPr>
-              <a:t>Container</a:t>
-            </a:r>
-            <a:endParaRPr lang="en-US" altLang="en-US" sz="1100" dirty="0">
+              <a:t>Compute Node</a:t>
+            </a:r>
+          </a:p>
+          <a:p>
+            <a:pPr algn="ctr" eaLnBrk="1" hangingPunct="1"/>
+            <a:r>
+              <a:rPr lang="en-US" altLang="en-US" sz="900" dirty="0">
+                <a:latin typeface="Arial" panose="020B0604020202020204" pitchFamily="34" charset="0"/>
+                <a:ea typeface="Amazon Ember" panose="020B0603020204020204" pitchFamily="34" charset="0"/>
+                <a:cs typeface="Arial" panose="020B0604020202020204" pitchFamily="34" charset="0"/>
+              </a:rPr>
+              <a:t>(GPU)</a:t>
+            </a:r>
+            <a:endParaRPr lang="en-US" altLang="en-US" sz="1050" dirty="0">
               <a:latin typeface="Arial" panose="020B0604020202020204" pitchFamily="34" charset="0"/>
               <a:ea typeface="Amazon Ember" panose="020B0603020204020204" pitchFamily="34" charset="0"/>
               <a:cs typeface="Arial" panose="020B0604020202020204" pitchFamily="34" charset="0"/>
@@ -8783,10 +9118,10 @@
           <p:nvPr/>
         </p:nvPicPr>
         <p:blipFill>
-          <a:blip r:embed="rId29">
+          <a:blip r:embed="rId22">
             <a:extLst>
               <a:ext uri="{96DAC541-7B7A-43D3-8B79-37D633B846F1}">
-                <asvg:svgBlip xmlns:asvg="http://schemas.microsoft.com/office/drawing/2016/SVG/main" r:embed="rId30"/>
+                <asvg:svgBlip xmlns:asvg="http://schemas.microsoft.com/office/drawing/2016/SVG/main" r:embed="rId23"/>
               </a:ext>
             </a:extLst>
           </a:blip>
@@ -8797,7 +9132,7 @@
         <p:spPr>
           <a:xfrm>
             <a:off x="7779098" y="3341510"/>
-            <a:ext cx="460933" cy="457200"/>
+            <a:ext cx="368746" cy="365760"/>
           </a:xfrm>
           <a:prstGeom prst="rect">
             <a:avLst/>
@@ -8819,10 +9154,10 @@
           <p:nvPr/>
         </p:nvPicPr>
         <p:blipFill>
-          <a:blip r:embed="rId31">
+          <a:blip r:embed="rId24">
             <a:extLst>
               <a:ext uri="{96DAC541-7B7A-43D3-8B79-37D633B846F1}">
-                <asvg:svgBlip xmlns:asvg="http://schemas.microsoft.com/office/drawing/2016/SVG/main" r:embed="rId32"/>
+                <asvg:svgBlip xmlns:asvg="http://schemas.microsoft.com/office/drawing/2016/SVG/main" r:embed="rId25"/>
               </a:ext>
             </a:extLst>
           </a:blip>
@@ -8831,8 +9166,8 @@
         </p:blipFill>
         <p:spPr bwMode="auto">
           <a:xfrm>
-            <a:off x="6349373" y="5455053"/>
-            <a:ext cx="414840" cy="411480"/>
+            <a:off x="6401998" y="5455053"/>
+            <a:ext cx="368747" cy="365760"/>
           </a:xfrm>
           <a:prstGeom prst="rect">
             <a:avLst/>
@@ -8878,8 +9213,8 @@
         </p:nvSpPr>
         <p:spPr bwMode="auto">
           <a:xfrm>
-            <a:off x="5442885" y="5852192"/>
-            <a:ext cx="2287061" cy="400110"/>
+            <a:off x="5442885" y="5845614"/>
+            <a:ext cx="2287061" cy="230832"/>
           </a:xfrm>
           <a:prstGeom prst="rect">
             <a:avLst/>
@@ -9013,23 +9348,12 @@
           <a:p>
             <a:pPr algn="ctr" eaLnBrk="1" hangingPunct="1"/>
             <a:r>
-              <a:rPr lang="en-US" altLang="en-US" sz="1000" dirty="0">
+              <a:rPr lang="en-US" altLang="en-US" sz="900" dirty="0">
                 <a:latin typeface="Arial" panose="020B0604020202020204" pitchFamily="34" charset="0"/>
                 <a:ea typeface="Amazon Ember" panose="020B0603020204020204" pitchFamily="34" charset="0"/>
                 <a:cs typeface="Arial" panose="020B0604020202020204" pitchFamily="34" charset="0"/>
               </a:rPr>
-              <a:t>Amazon</a:t>
-            </a:r>
-          </a:p>
-          <a:p>
-            <a:pPr algn="ctr" eaLnBrk="1" hangingPunct="1"/>
-            <a:r>
-              <a:rPr lang="en-US" altLang="en-US" sz="1000" dirty="0">
-                <a:latin typeface="Arial" panose="020B0604020202020204" pitchFamily="34" charset="0"/>
-                <a:ea typeface="Amazon Ember" panose="020B0603020204020204" pitchFamily="34" charset="0"/>
-                <a:cs typeface="Arial" panose="020B0604020202020204" pitchFamily="34" charset="0"/>
-              </a:rPr>
-              <a:t>Simple Notification Service</a:t>
+              <a:t>Amazon SNS</a:t>
             </a:r>
           </a:p>
         </p:txBody>
@@ -9084,7 +9408,7 @@
           <a:p>
             <a:pPr algn="ctr"/>
             <a:r>
-              <a:rPr lang="en-US" sz="1200" dirty="0">
+              <a:rPr lang="en-US" sz="900" dirty="0">
                 <a:solidFill>
                   <a:schemeClr val="tx1"/>
                 </a:solidFill>
@@ -9097,7 +9421,7 @@
           <a:p>
             <a:pPr algn="ctr"/>
             <a:r>
-              <a:rPr lang="en-US" sz="1200" dirty="0">
+              <a:rPr lang="en-US" sz="900" dirty="0">
                 <a:solidFill>
                   <a:schemeClr val="tx1"/>
                 </a:solidFill>
@@ -9124,10 +9448,10 @@
           <p:nvPr/>
         </p:nvPicPr>
         <p:blipFill>
-          <a:blip r:embed="rId33">
+          <a:blip r:embed="rId26">
             <a:extLst>
               <a:ext uri="{96DAC541-7B7A-43D3-8B79-37D633B846F1}">
-                <asvg:svgBlip xmlns:asvg="http://schemas.microsoft.com/office/drawing/2016/SVG/main" r:embed="rId34"/>
+                <asvg:svgBlip xmlns:asvg="http://schemas.microsoft.com/office/drawing/2016/SVG/main" r:embed="rId27"/>
               </a:ext>
             </a:extLst>
           </a:blip>
@@ -9136,8 +9460,8 @@
         </p:blipFill>
         <p:spPr bwMode="auto">
           <a:xfrm>
-            <a:off x="1299040" y="1566501"/>
-            <a:ext cx="414840" cy="411480"/>
+            <a:off x="1299041" y="1570311"/>
+            <a:ext cx="368747" cy="365760"/>
           </a:xfrm>
           <a:prstGeom prst="rect">
             <a:avLst/>
@@ -9183,8 +9507,8 @@
         </p:nvSpPr>
         <p:spPr bwMode="auto">
           <a:xfrm>
-            <a:off x="898356" y="1945909"/>
-            <a:ext cx="1220611" cy="400110"/>
+            <a:off x="885200" y="1952487"/>
+            <a:ext cx="1220611" cy="369332"/>
           </a:xfrm>
           <a:prstGeom prst="rect">
             <a:avLst/>
@@ -9318,7 +9642,7 @@
           <a:p>
             <a:pPr algn="ctr" eaLnBrk="1" hangingPunct="1"/>
             <a:r>
-              <a:rPr lang="en-US" altLang="en-US" sz="1000" dirty="0">
+              <a:rPr lang="en-US" altLang="en-US" sz="900" dirty="0">
                 <a:solidFill>
                   <a:sysClr val="windowText" lastClr="000000"/>
                 </a:solidFill>
@@ -9326,21 +9650,7 @@
                 <a:ea typeface="Amazon Ember" panose="020B0603020204020204" pitchFamily="34" charset="0"/>
                 <a:cs typeface="Arial" panose="020B0604020202020204" pitchFamily="34" charset="0"/>
               </a:rPr>
-              <a:t>AWS</a:t>
-            </a:r>
-          </a:p>
-          <a:p>
-            <a:pPr algn="ctr" eaLnBrk="1" hangingPunct="1"/>
-            <a:r>
-              <a:rPr lang="en-US" altLang="en-US" sz="1000" dirty="0">
-                <a:solidFill>
-                  <a:sysClr val="windowText" lastClr="000000"/>
-                </a:solidFill>
-                <a:latin typeface="Arial" panose="020B0604020202020204" pitchFamily="34" charset="0"/>
-                <a:ea typeface="Amazon Ember" panose="020B0603020204020204" pitchFamily="34" charset="0"/>
-                <a:cs typeface="Arial" panose="020B0604020202020204" pitchFamily="34" charset="0"/>
-              </a:rPr>
-              <a:t>Tools and SDKs</a:t>
+              <a:t>AWS Tools and SDKs</a:t>
             </a:r>
           </a:p>
         </p:txBody>
@@ -9360,10 +9670,10 @@
           <p:nvPr/>
         </p:nvPicPr>
         <p:blipFill>
-          <a:blip r:embed="rId19">
+          <a:blip r:embed="rId12">
             <a:extLst>
               <a:ext uri="{96DAC541-7B7A-43D3-8B79-37D633B846F1}">
-                <asvg:svgBlip xmlns:asvg="http://schemas.microsoft.com/office/drawing/2016/SVG/main" r:embed="rId20"/>
+                <asvg:svgBlip xmlns:asvg="http://schemas.microsoft.com/office/drawing/2016/SVG/main" r:embed="rId13"/>
               </a:ext>
             </a:extLst>
           </a:blip>
@@ -9372,8 +9682,8 @@
         </p:blipFill>
         <p:spPr bwMode="auto">
           <a:xfrm>
-            <a:off x="6348241" y="3769142"/>
-            <a:ext cx="414840" cy="411480"/>
+            <a:off x="6375686" y="3822334"/>
+            <a:ext cx="368747" cy="365760"/>
           </a:xfrm>
           <a:prstGeom prst="rect">
             <a:avLst/>
@@ -9419,8 +9729,8 @@
         </p:nvSpPr>
         <p:spPr bwMode="auto">
           <a:xfrm>
-            <a:off x="5800446" y="4165791"/>
-            <a:ext cx="1565184" cy="400110"/>
+            <a:off x="5787290" y="4205259"/>
+            <a:ext cx="1565184" cy="369332"/>
           </a:xfrm>
           <a:prstGeom prst="rect">
             <a:avLst/>
@@ -9554,7 +9864,7 @@
           <a:p>
             <a:pPr algn="ctr" eaLnBrk="1" hangingPunct="1"/>
             <a:r>
-              <a:rPr lang="en-US" altLang="en-US" sz="1000" dirty="0">
+              <a:rPr lang="en-US" altLang="en-US" sz="900" dirty="0">
                 <a:latin typeface="Arial" panose="020B0604020202020204" pitchFamily="34" charset="0"/>
                 <a:ea typeface="Amazon Ember" panose="020B0603020204020204" pitchFamily="34" charset="0"/>
                 <a:cs typeface="Arial" panose="020B0604020202020204" pitchFamily="34" charset="0"/>
@@ -9565,7 +9875,7 @@
           <a:p>
             <a:pPr algn="ctr" eaLnBrk="1" hangingPunct="1"/>
             <a:r>
-              <a:rPr lang="en-US" altLang="en-US" sz="1000" i="1" dirty="0">
+              <a:rPr lang="en-US" altLang="en-US" sz="900" i="1" dirty="0">
                 <a:latin typeface="Arial" panose="020B0604020202020204" pitchFamily="34" charset="0"/>
                 <a:ea typeface="Amazon Ember" panose="020B0603020204020204" pitchFamily="34" charset="0"/>
                 <a:cs typeface="Arial" panose="020B0604020202020204" pitchFamily="34" charset="0"/>
@@ -9590,10 +9900,10 @@
           <p:nvPr/>
         </p:nvPicPr>
         <p:blipFill>
-          <a:blip r:embed="rId25">
+          <a:blip r:embed="rId18">
             <a:extLst>
               <a:ext uri="{96DAC541-7B7A-43D3-8B79-37D633B846F1}">
-                <asvg:svgBlip xmlns:asvg="http://schemas.microsoft.com/office/drawing/2016/SVG/main" r:embed="rId26"/>
+                <asvg:svgBlip xmlns:asvg="http://schemas.microsoft.com/office/drawing/2016/SVG/main" r:embed="rId19"/>
               </a:ext>
             </a:extLst>
           </a:blip>
@@ -9602,8 +9912,8 @@
         </p:blipFill>
         <p:spPr bwMode="auto">
           <a:xfrm>
-            <a:off x="6342912" y="4618433"/>
-            <a:ext cx="414840" cy="411480"/>
+            <a:off x="6395537" y="4618433"/>
+            <a:ext cx="368747" cy="365760"/>
           </a:xfrm>
           <a:prstGeom prst="rect">
             <a:avLst/>
@@ -9650,7 +9960,7 @@
         <p:spPr bwMode="auto">
           <a:xfrm>
             <a:off x="5437327" y="5008508"/>
-            <a:ext cx="2298265" cy="400110"/>
+            <a:ext cx="2298265" cy="230832"/>
           </a:xfrm>
           <a:prstGeom prst="rect">
             <a:avLst/>
@@ -9784,23 +10094,12 @@
           <a:p>
             <a:pPr algn="ctr" eaLnBrk="1" hangingPunct="1"/>
             <a:r>
-              <a:rPr lang="en-US" altLang="en-US" sz="1000" dirty="0">
+              <a:rPr lang="en-US" altLang="en-US" sz="900" dirty="0">
                 <a:latin typeface="Arial" panose="020B0604020202020204" pitchFamily="34" charset="0"/>
                 <a:ea typeface="Amazon Ember" panose="020B0603020204020204" pitchFamily="34" charset="0"/>
                 <a:cs typeface="Arial" panose="020B0604020202020204" pitchFamily="34" charset="0"/>
               </a:rPr>
-              <a:t>Amazon</a:t>
-            </a:r>
-          </a:p>
-          <a:p>
-            <a:pPr algn="ctr" eaLnBrk="1" hangingPunct="1"/>
-            <a:r>
-              <a:rPr lang="en-US" altLang="en-US" sz="1000" dirty="0">
-                <a:latin typeface="Arial" panose="020B0604020202020204" pitchFamily="34" charset="0"/>
-                <a:ea typeface="Amazon Ember" panose="020B0603020204020204" pitchFamily="34" charset="0"/>
-                <a:cs typeface="Arial" panose="020B0604020202020204" pitchFamily="34" charset="0"/>
-              </a:rPr>
-              <a:t>DynamoDB</a:t>
+              <a:t>Amazon DynamoDB</a:t>
             </a:r>
           </a:p>
         </p:txBody>
@@ -9820,10 +10119,10 @@
           <p:nvPr/>
         </p:nvPicPr>
         <p:blipFill>
-          <a:blip r:embed="rId35">
+          <a:blip r:embed="rId28">
             <a:extLst>
               <a:ext uri="{96DAC541-7B7A-43D3-8B79-37D633B846F1}">
-                <asvg:svgBlip xmlns:asvg="http://schemas.microsoft.com/office/drawing/2016/SVG/main" r:embed="rId36"/>
+                <asvg:svgBlip xmlns:asvg="http://schemas.microsoft.com/office/drawing/2016/SVG/main" r:embed="rId29"/>
               </a:ext>
             </a:extLst>
           </a:blip>
@@ -9832,8 +10131,8 @@
         </p:blipFill>
         <p:spPr bwMode="auto">
           <a:xfrm>
-            <a:off x="6329866" y="2918735"/>
-            <a:ext cx="414840" cy="411480"/>
+            <a:off x="6375913" y="2918735"/>
+            <a:ext cx="368747" cy="365760"/>
           </a:xfrm>
           <a:prstGeom prst="rect">
             <a:avLst/>
@@ -9879,8 +10178,8 @@
         </p:nvSpPr>
         <p:spPr bwMode="auto">
           <a:xfrm>
-            <a:off x="5736270" y="3292598"/>
-            <a:ext cx="1682942" cy="400110"/>
+            <a:off x="5729692" y="3299176"/>
+            <a:ext cx="1682942" cy="230832"/>
           </a:xfrm>
           <a:prstGeom prst="rect">
             <a:avLst/>
@@ -10014,23 +10313,12 @@
           <a:p>
             <a:pPr algn="ctr" eaLnBrk="1" hangingPunct="1"/>
             <a:r>
-              <a:rPr lang="en-US" altLang="en-US" sz="1000" dirty="0">
+              <a:rPr lang="en-US" altLang="en-US" sz="900" dirty="0">
                 <a:latin typeface="Arial" panose="020B0604020202020204" pitchFamily="34" charset="0"/>
                 <a:ea typeface="Amazon Ember" panose="020B0603020204020204" pitchFamily="34" charset="0"/>
                 <a:cs typeface="Arial" panose="020B0604020202020204" pitchFamily="34" charset="0"/>
               </a:rPr>
-              <a:t>Amazon</a:t>
-            </a:r>
-          </a:p>
-          <a:p>
-            <a:pPr algn="ctr" eaLnBrk="1" hangingPunct="1"/>
-            <a:r>
-              <a:rPr lang="en-US" altLang="en-US" sz="1000" dirty="0">
-                <a:latin typeface="Arial" panose="020B0604020202020204" pitchFamily="34" charset="0"/>
-                <a:ea typeface="Amazon Ember" panose="020B0603020204020204" pitchFamily="34" charset="0"/>
-                <a:cs typeface="Arial" panose="020B0604020202020204" pitchFamily="34" charset="0"/>
-              </a:rPr>
-              <a:t>Elastic Container Registry</a:t>
+              <a:t>Amazon ECR</a:t>
             </a:r>
           </a:p>
         </p:txBody>
@@ -10051,8 +10339,8 @@
         </p:nvSpPr>
         <p:spPr bwMode="auto">
           <a:xfrm>
-            <a:off x="4679492" y="5426946"/>
-            <a:ext cx="1143733" cy="400110"/>
+            <a:off x="4725538" y="5413790"/>
+            <a:ext cx="1143733" cy="369332"/>
           </a:xfrm>
           <a:prstGeom prst="rect">
             <a:avLst/>
@@ -10179,20 +10467,20 @@
           <a:p>
             <a:pPr algn="ctr" eaLnBrk="1" hangingPunct="1"/>
             <a:r>
-              <a:rPr lang="en-US" altLang="en-US" sz="1000" dirty="0">
+              <a:rPr lang="en-US" altLang="en-US" sz="900" dirty="0">
                 <a:latin typeface="Arial" panose="020B0604020202020204" pitchFamily="34" charset="0"/>
                 <a:cs typeface="Arial" panose="020B0604020202020204" pitchFamily="34" charset="0"/>
               </a:rPr>
               <a:t>AWS Lambda</a:t>
             </a:r>
             <a:br>
-              <a:rPr lang="en-US" altLang="en-US" sz="1000" dirty="0">
+              <a:rPr lang="en-US" altLang="en-US" sz="900" dirty="0">
                 <a:latin typeface="Arial" panose="020B0604020202020204" pitchFamily="34" charset="0"/>
                 <a:cs typeface="Arial" panose="020B0604020202020204" pitchFamily="34" charset="0"/>
               </a:rPr>
             </a:br>
             <a:r>
-              <a:rPr lang="en-US" altLang="en-US" sz="1000" i="1" dirty="0">
+              <a:rPr lang="en-US" altLang="en-US" sz="900" i="1" dirty="0">
                 <a:latin typeface="Arial" panose="020B0604020202020204" pitchFamily="34" charset="0"/>
                 <a:cs typeface="Arial" panose="020B0604020202020204" pitchFamily="34" charset="0"/>
               </a:rPr>
@@ -10216,10 +10504,10 @@
           <p:nvPr/>
         </p:nvPicPr>
         <p:blipFill>
-          <a:blip r:embed="rId21">
+          <a:blip r:embed="rId14">
             <a:extLst>
               <a:ext uri="{96DAC541-7B7A-43D3-8B79-37D633B846F1}">
-                <asvg:svgBlip xmlns:asvg="http://schemas.microsoft.com/office/drawing/2016/SVG/main" r:embed="rId22"/>
+                <asvg:svgBlip xmlns:asvg="http://schemas.microsoft.com/office/drawing/2016/SVG/main" r:embed="rId15"/>
               </a:ext>
             </a:extLst>
           </a:blip>
@@ -10228,8 +10516,8 @@
         </p:blipFill>
         <p:spPr bwMode="auto">
           <a:xfrm>
-            <a:off x="5034977" y="5022539"/>
-            <a:ext cx="414840" cy="411480"/>
+            <a:off x="5094180" y="5022539"/>
+            <a:ext cx="368747" cy="365760"/>
           </a:xfrm>
           <a:prstGeom prst="rect">
             <a:avLst/>
@@ -10275,13 +10563,13 @@
         </p:nvCxnSpPr>
         <p:spPr>
           <a:xfrm>
-            <a:off x="5236907" y="4281753"/>
-            <a:ext cx="0" cy="726755"/>
+            <a:off x="5296109" y="4103454"/>
+            <a:ext cx="0" cy="905054"/>
           </a:xfrm>
           <a:prstGeom prst="straightConnector1">
             <a:avLst/>
           </a:prstGeom>
-          <a:ln w="19050">
+          <a:ln w="15875">
             <a:solidFill>
               <a:schemeClr val="tx1"/>
             </a:solidFill>
@@ -10327,184 +10615,6 @@
             <a:avLst/>
           </a:prstGeom>
           <a:ln w="15875">
-            <a:solidFill>
-              <a:schemeClr val="tx1"/>
-            </a:solidFill>
-          </a:ln>
-        </p:spPr>
-        <p:style>
-          <a:lnRef idx="1">
-            <a:schemeClr val="accent1"/>
-          </a:lnRef>
-          <a:fillRef idx="0">
-            <a:schemeClr val="accent1"/>
-          </a:fillRef>
-          <a:effectRef idx="0">
-            <a:schemeClr val="accent1"/>
-          </a:effectRef>
-          <a:fontRef idx="minor">
-            <a:schemeClr val="tx1"/>
-          </a:fontRef>
-        </p:style>
-      </p:cxnSp>
-      <p:cxnSp>
-        <p:nvCxnSpPr>
-          <p:cNvPr id="776" name="Straight Connector 775">
-            <a:extLst>
-              <a:ext uri="{FF2B5EF4-FFF2-40B4-BE49-F238E27FC236}">
-                <a16:creationId xmlns:a16="http://schemas.microsoft.com/office/drawing/2014/main" id="{F0529D3D-A043-4395-92D6-3A4730A5F146}"/>
-              </a:ext>
-            </a:extLst>
-          </p:cNvPr>
-          <p:cNvCxnSpPr>
-            <a:cxnSpLocks/>
-            <a:stCxn id="763" idx="3"/>
-          </p:cNvCxnSpPr>
-          <p:nvPr/>
-        </p:nvCxnSpPr>
-        <p:spPr>
-          <a:xfrm>
-            <a:off x="6744706" y="3124475"/>
-            <a:ext cx="660875" cy="0"/>
-          </a:xfrm>
-          <a:prstGeom prst="line">
-            <a:avLst/>
-          </a:prstGeom>
-          <a:ln w="19050">
-            <a:solidFill>
-              <a:schemeClr val="tx1"/>
-            </a:solidFill>
-          </a:ln>
-        </p:spPr>
-        <p:style>
-          <a:lnRef idx="1">
-            <a:schemeClr val="accent1"/>
-          </a:lnRef>
-          <a:fillRef idx="0">
-            <a:schemeClr val="accent1"/>
-          </a:fillRef>
-          <a:effectRef idx="0">
-            <a:schemeClr val="accent1"/>
-          </a:effectRef>
-          <a:fontRef idx="minor">
-            <a:schemeClr val="tx1"/>
-          </a:fontRef>
-        </p:style>
-      </p:cxnSp>
-      <p:cxnSp>
-        <p:nvCxnSpPr>
-          <p:cNvPr id="777" name="Straight Connector 776">
-            <a:extLst>
-              <a:ext uri="{FF2B5EF4-FFF2-40B4-BE49-F238E27FC236}">
-                <a16:creationId xmlns:a16="http://schemas.microsoft.com/office/drawing/2014/main" id="{AAE279D1-A96D-428E-A365-337399F7A111}"/>
-              </a:ext>
-            </a:extLst>
-          </p:cNvPr>
-          <p:cNvCxnSpPr>
-            <a:cxnSpLocks/>
-            <a:stCxn id="759" idx="3"/>
-          </p:cNvCxnSpPr>
-          <p:nvPr/>
-        </p:nvCxnSpPr>
-        <p:spPr>
-          <a:xfrm>
-            <a:off x="6763081" y="3974882"/>
-            <a:ext cx="652779" cy="0"/>
-          </a:xfrm>
-          <a:prstGeom prst="line">
-            <a:avLst/>
-          </a:prstGeom>
-          <a:ln w="19050">
-            <a:solidFill>
-              <a:schemeClr val="tx1"/>
-            </a:solidFill>
-            <a:headEnd type="triangle" w="med" len="med"/>
-            <a:tailEnd type="none" w="med" len="med"/>
-          </a:ln>
-        </p:spPr>
-        <p:style>
-          <a:lnRef idx="1">
-            <a:schemeClr val="accent1"/>
-          </a:lnRef>
-          <a:fillRef idx="0">
-            <a:schemeClr val="accent1"/>
-          </a:fillRef>
-          <a:effectRef idx="0">
-            <a:schemeClr val="accent1"/>
-          </a:effectRef>
-          <a:fontRef idx="minor">
-            <a:schemeClr val="tx1"/>
-          </a:fontRef>
-        </p:style>
-      </p:cxnSp>
-      <p:cxnSp>
-        <p:nvCxnSpPr>
-          <p:cNvPr id="778" name="Straight Arrow Connector 777">
-            <a:extLst>
-              <a:ext uri="{FF2B5EF4-FFF2-40B4-BE49-F238E27FC236}">
-                <a16:creationId xmlns:a16="http://schemas.microsoft.com/office/drawing/2014/main" id="{5CEF26AB-85BC-4F78-B504-21DB90076BE1}"/>
-              </a:ext>
-            </a:extLst>
-          </p:cNvPr>
-          <p:cNvCxnSpPr>
-            <a:cxnSpLocks/>
-          </p:cNvCxnSpPr>
-          <p:nvPr/>
-        </p:nvCxnSpPr>
-        <p:spPr>
-          <a:xfrm>
-            <a:off x="7409362" y="3607787"/>
-            <a:ext cx="372671" cy="0"/>
-          </a:xfrm>
-          <a:prstGeom prst="straightConnector1">
-            <a:avLst/>
-          </a:prstGeom>
-          <a:ln w="19050">
-            <a:solidFill>
-              <a:schemeClr val="tx1"/>
-            </a:solidFill>
-            <a:headEnd type="none" w="med" len="sm"/>
-            <a:tailEnd type="triangle"/>
-          </a:ln>
-        </p:spPr>
-        <p:style>
-          <a:lnRef idx="1">
-            <a:schemeClr val="accent1"/>
-          </a:lnRef>
-          <a:fillRef idx="0">
-            <a:schemeClr val="accent1"/>
-          </a:fillRef>
-          <a:effectRef idx="0">
-            <a:schemeClr val="accent1"/>
-          </a:effectRef>
-          <a:fontRef idx="minor">
-            <a:schemeClr val="tx1"/>
-          </a:fontRef>
-        </p:style>
-      </p:cxnSp>
-      <p:cxnSp>
-        <p:nvCxnSpPr>
-          <p:cNvPr id="779" name="Straight Connector 778">
-            <a:extLst>
-              <a:ext uri="{FF2B5EF4-FFF2-40B4-BE49-F238E27FC236}">
-                <a16:creationId xmlns:a16="http://schemas.microsoft.com/office/drawing/2014/main" id="{419D65ED-FD3A-457E-AA34-094B36FB2D3E}"/>
-              </a:ext>
-            </a:extLst>
-          </p:cNvPr>
-          <p:cNvCxnSpPr>
-            <a:cxnSpLocks/>
-          </p:cNvCxnSpPr>
-          <p:nvPr/>
-        </p:nvCxnSpPr>
-        <p:spPr>
-          <a:xfrm>
-            <a:off x="7405581" y="3124475"/>
-            <a:ext cx="7951" cy="857800"/>
-          </a:xfrm>
-          <a:prstGeom prst="line">
-            <a:avLst/>
-          </a:prstGeom>
-          <a:ln w="19050">
             <a:solidFill>
               <a:schemeClr val="tx1"/>
             </a:solidFill>
@@ -10583,7 +10693,7 @@
               <a:defRPr/>
             </a:pPr>
             <a:r>
-              <a:rPr lang="en-US" sz="1100" dirty="0">
+              <a:rPr lang="en-US" sz="900" dirty="0">
                 <a:solidFill>
                   <a:schemeClr val="tx1"/>
                 </a:solidFill>
@@ -10592,13 +10702,6 @@
               </a:rPr>
               <a:t>AWS Region</a:t>
             </a:r>
-            <a:endParaRPr lang="en-US" sz="1200" dirty="0">
-              <a:solidFill>
-                <a:schemeClr val="tx1"/>
-              </a:solidFill>
-              <a:latin typeface="Arial" panose="020B0604020202020204" pitchFamily="34" charset="0"/>
-              <a:cs typeface="Arial" panose="020B0604020202020204" pitchFamily="34" charset="0"/>
-            </a:endParaRPr>
           </a:p>
         </p:txBody>
       </p:sp>
@@ -10617,10 +10720,10 @@
           <p:nvPr/>
         </p:nvPicPr>
         <p:blipFill>
-          <a:blip r:embed="rId37">
+          <a:blip r:embed="rId30">
             <a:extLst>
               <a:ext uri="{96DAC541-7B7A-43D3-8B79-37D633B846F1}">
-                <asvg:svgBlip xmlns:asvg="http://schemas.microsoft.com/office/drawing/2016/SVG/main" r:embed="rId38"/>
+                <asvg:svgBlip xmlns:asvg="http://schemas.microsoft.com/office/drawing/2016/SVG/main" r:embed="rId31"/>
               </a:ext>
             </a:extLst>
           </a:blip>
@@ -10724,7 +10827,7 @@
         </p:nvSpPr>
         <p:spPr bwMode="auto">
           <a:xfrm>
-            <a:off x="4046474" y="1457010"/>
+            <a:off x="4046474" y="1435990"/>
             <a:ext cx="276560" cy="274320"/>
           </a:xfrm>
           <a:prstGeom prst="ellipse">
@@ -10866,7 +10969,7 @@
         </p:nvSpPr>
         <p:spPr bwMode="auto">
           <a:xfrm>
-            <a:off x="6893266" y="1457157"/>
+            <a:off x="6893266" y="1436137"/>
             <a:ext cx="276560" cy="274320"/>
           </a:xfrm>
           <a:prstGeom prst="ellipse">
@@ -11008,7 +11111,7 @@
         </p:nvSpPr>
         <p:spPr bwMode="auto">
           <a:xfrm>
-            <a:off x="7037083" y="3205159"/>
+            <a:off x="7034543" y="3136579"/>
             <a:ext cx="276560" cy="274320"/>
           </a:xfrm>
           <a:prstGeom prst="ellipse">
@@ -11079,7 +11182,7 @@
         </p:nvSpPr>
         <p:spPr bwMode="auto">
           <a:xfrm>
-            <a:off x="7460332" y="3657123"/>
+            <a:off x="7471107" y="3218779"/>
             <a:ext cx="276560" cy="274320"/>
           </a:xfrm>
           <a:prstGeom prst="ellipse">
@@ -11219,10 +11322,10 @@
         </p:nvGrpSpPr>
         <p:grpSpPr>
           <a:xfrm>
-            <a:off x="2656321" y="4331264"/>
-            <a:ext cx="1340259" cy="825242"/>
+            <a:off x="2675095" y="4212541"/>
+            <a:ext cx="1340259" cy="948353"/>
             <a:chOff x="5862050" y="670731"/>
-            <a:chExt cx="1329403" cy="825242"/>
+            <a:chExt cx="1329403" cy="948353"/>
           </a:xfrm>
         </p:grpSpPr>
         <p:sp>
@@ -11242,7 +11345,7 @@
           <p:spPr bwMode="auto">
             <a:xfrm>
               <a:off x="5862050" y="1249752"/>
-              <a:ext cx="1329403" cy="246221"/>
+              <a:ext cx="1329403" cy="369332"/>
             </a:xfrm>
             <a:prstGeom prst="rect">
               <a:avLst/>
@@ -11376,12 +11479,12 @@
             <a:p>
               <a:pPr algn="ctr" eaLnBrk="1" hangingPunct="1"/>
               <a:r>
-                <a:rPr lang="en-US" altLang="en-US" sz="1000" dirty="0">
+                <a:rPr lang="en-US" altLang="en-US" sz="900" dirty="0">
                   <a:latin typeface="Arial" panose="020B0604020202020204" pitchFamily="34" charset="0"/>
                   <a:ea typeface="Amazon Ember" panose="020B0603020204020204" pitchFamily="34" charset="0"/>
                   <a:cs typeface="Arial" panose="020B0604020202020204" pitchFamily="34" charset="0"/>
                 </a:rPr>
-                <a:t>Parameter Store</a:t>
+                <a:t>AWS System Manager Parameter Store</a:t>
               </a:r>
             </a:p>
           </p:txBody>
@@ -11401,10 +11504,10 @@
             <p:nvPr/>
           </p:nvPicPr>
           <p:blipFill>
-            <a:blip r:embed="rId39">
+            <a:blip r:embed="rId32">
               <a:extLst>
                 <a:ext uri="{96DAC541-7B7A-43D3-8B79-37D633B846F1}">
-                  <asvg:svgBlip xmlns:asvg="http://schemas.microsoft.com/office/drawing/2016/SVG/main" r:embed="rId40"/>
+                  <asvg:svgBlip xmlns:asvg="http://schemas.microsoft.com/office/drawing/2016/SVG/main" r:embed="rId33"/>
                 </a:ext>
               </a:extLst>
             </a:blip>
@@ -11415,7 +11518,7 @@
           <p:spPr>
             <a:xfrm>
               <a:off x="6357354" y="845117"/>
-              <a:ext cx="411480" cy="411480"/>
+              <a:ext cx="362797" cy="362798"/>
             </a:xfrm>
             <a:prstGeom prst="rect">
               <a:avLst/>
@@ -11438,7 +11541,7 @@
           </p:nvSpPr>
           <p:spPr bwMode="auto">
             <a:xfrm>
-              <a:off x="5984889" y="670731"/>
+              <a:off x="5932765" y="670731"/>
               <a:ext cx="274320" cy="274320"/>
             </a:xfrm>
             <a:prstGeom prst="ellipse">
@@ -11508,10 +11611,10 @@
         </p:nvGrpSpPr>
         <p:grpSpPr>
           <a:xfrm>
-            <a:off x="2747964" y="5386473"/>
-            <a:ext cx="1072327" cy="844386"/>
-            <a:chOff x="6795180" y="801412"/>
-            <a:chExt cx="1063642" cy="844386"/>
+            <a:off x="2674125" y="5386473"/>
+            <a:ext cx="1340258" cy="643927"/>
+            <a:chOff x="6721934" y="801412"/>
+            <a:chExt cx="1329402" cy="643927"/>
           </a:xfrm>
         </p:grpSpPr>
         <p:pic>
@@ -11529,10 +11632,10 @@
             <p:nvPr/>
           </p:nvPicPr>
           <p:blipFill>
-            <a:blip r:embed="rId41">
+            <a:blip r:embed="rId34">
               <a:extLst>
                 <a:ext uri="{96DAC541-7B7A-43D3-8B79-37D633B846F1}">
-                  <asvg:svgBlip xmlns:asvg="http://schemas.microsoft.com/office/drawing/2016/SVG/main" r:embed="rId42"/>
+                  <asvg:svgBlip xmlns:asvg="http://schemas.microsoft.com/office/drawing/2016/SVG/main" r:embed="rId35"/>
                 </a:ext>
               </a:extLst>
             </a:blip>
@@ -11541,8 +11644,8 @@
           </p:blipFill>
           <p:spPr bwMode="auto">
             <a:xfrm>
-              <a:off x="7189466" y="825744"/>
-              <a:ext cx="411480" cy="411480"/>
+              <a:off x="7189467" y="825744"/>
+              <a:ext cx="365760" cy="365760"/>
             </a:xfrm>
             <a:prstGeom prst="rect">
               <a:avLst/>
@@ -11588,8 +11691,8 @@
           </p:nvSpPr>
           <p:spPr bwMode="auto">
             <a:xfrm>
-              <a:off x="6931591" y="1245688"/>
-              <a:ext cx="927231" cy="400110"/>
+              <a:off x="6721934" y="1214507"/>
+              <a:ext cx="1329402" cy="230832"/>
             </a:xfrm>
             <a:prstGeom prst="rect">
               <a:avLst/>
@@ -11723,27 +11826,12 @@
             <a:p>
               <a:pPr algn="ctr" eaLnBrk="1" hangingPunct="1"/>
               <a:r>
-                <a:rPr lang="en-US" altLang="en-US" sz="1000" dirty="0">
+                <a:rPr lang="en-US" altLang="en-US" sz="900" dirty="0">
                   <a:latin typeface="Arial" panose="020B0604020202020204" pitchFamily="34" charset="0"/>
                   <a:ea typeface="Amazon Ember" panose="020B0603020204020204" pitchFamily="34" charset="0"/>
                   <a:cs typeface="Arial" panose="020B0604020202020204" pitchFamily="34" charset="0"/>
                 </a:rPr>
-                <a:t>Amazon</a:t>
-              </a:r>
-              <a:br>
-                <a:rPr lang="en-US" altLang="en-US" sz="1000" dirty="0">
-                  <a:latin typeface="Arial" panose="020B0604020202020204" pitchFamily="34" charset="0"/>
-                  <a:ea typeface="Amazon Ember" panose="020B0603020204020204" pitchFamily="34" charset="0"/>
-                  <a:cs typeface="Arial" panose="020B0604020202020204" pitchFamily="34" charset="0"/>
-                </a:rPr>
-              </a:br>
-              <a:r>
-                <a:rPr lang="en-US" altLang="en-US" sz="1000" dirty="0">
-                  <a:latin typeface="Arial" panose="020B0604020202020204" pitchFamily="34" charset="0"/>
-                  <a:ea typeface="Amazon Ember" panose="020B0603020204020204" pitchFamily="34" charset="0"/>
-                  <a:cs typeface="Arial" panose="020B0604020202020204" pitchFamily="34" charset="0"/>
-                </a:rPr>
-                <a:t>CloudWatch</a:t>
+                <a:t>Amazon CloudWatch</a:t>
               </a:r>
             </a:p>
           </p:txBody>
@@ -11838,13 +11926,13 @@
         </p:nvCxnSpPr>
         <p:spPr>
           <a:xfrm>
-            <a:off x="5035201" y="1775757"/>
-            <a:ext cx="975455" cy="6578"/>
+            <a:off x="4989109" y="1752897"/>
+            <a:ext cx="1021548" cy="6578"/>
           </a:xfrm>
           <a:prstGeom prst="straightConnector1">
             <a:avLst/>
           </a:prstGeom>
-          <a:ln w="19050">
+          <a:ln w="15875">
             <a:solidFill>
               <a:schemeClr val="tx1"/>
             </a:solidFill>
@@ -11882,10 +11970,10 @@
           <p:nvPr/>
         </p:nvPicPr>
         <p:blipFill>
-          <a:blip r:embed="rId43">
+          <a:blip r:embed="rId36">
             <a:extLst>
               <a:ext uri="{96DAC541-7B7A-43D3-8B79-37D633B846F1}">
-                <asvg:svgBlip xmlns:asvg="http://schemas.microsoft.com/office/drawing/2016/SVG/main" r:embed="rId44"/>
+                <asvg:svgBlip xmlns:asvg="http://schemas.microsoft.com/office/drawing/2016/SVG/main" r:embed="rId37"/>
               </a:ext>
             </a:extLst>
           </a:blip>
@@ -11975,27 +12063,14 @@
           <a:p>
             <a:pPr algn="ctr"/>
             <a:r>
-              <a:rPr lang="en-US" sz="950" dirty="0">
+              <a:rPr lang="en-US" sz="900" dirty="0">
                 <a:solidFill>
                   <a:schemeClr val="tx1"/>
                 </a:solidFill>
                 <a:latin typeface="Arial" panose="020B0604020202020204" pitchFamily="34" charset="0"/>
                 <a:cs typeface="Arial" panose="020B0604020202020204" pitchFamily="34" charset="0"/>
               </a:rPr>
-              <a:t>AWS</a:t>
-            </a:r>
-          </a:p>
-          <a:p>
-            <a:pPr algn="ctr"/>
-            <a:r>
-              <a:rPr lang="en-US" sz="950" dirty="0">
-                <a:solidFill>
-                  <a:schemeClr val="tx1"/>
-                </a:solidFill>
-                <a:latin typeface="Arial" panose="020B0604020202020204" pitchFamily="34" charset="0"/>
-                <a:cs typeface="Arial" panose="020B0604020202020204" pitchFamily="34" charset="0"/>
-              </a:rPr>
-              <a:t>Management Console</a:t>
+              <a:t>AWS Management Console</a:t>
             </a:r>
           </a:p>
         </p:txBody>
@@ -12086,7 +12161,7 @@
         <p:spPr>
           <a:xfrm>
             <a:off x="2456447" y="3872622"/>
-            <a:ext cx="1813826" cy="246221"/>
+            <a:ext cx="1813826" cy="230832"/>
           </a:xfrm>
           <a:prstGeom prst="rect">
             <a:avLst/>
@@ -12101,7 +12176,7 @@
           <a:p>
             <a:pPr algn="ctr"/>
             <a:r>
-              <a:rPr lang="en-US" sz="1000" i="1" dirty="0">
+              <a:rPr lang="en-US" sz="900" i="1" dirty="0">
                 <a:latin typeface="Arial" panose="020B0604020202020204" pitchFamily="34" charset="0"/>
                 <a:cs typeface="Arial" panose="020B0604020202020204" pitchFamily="34" charset="0"/>
               </a:rPr>
@@ -12127,16 +12202,16 @@
           <p:nvPr/>
         </p:nvCxnSpPr>
         <p:spPr>
-          <a:xfrm rot="10800000">
-            <a:off x="1713881" y="1772241"/>
-            <a:ext cx="2906481" cy="3516"/>
+          <a:xfrm rot="10800000" flipV="1">
+            <a:off x="1667788" y="1752897"/>
+            <a:ext cx="2952574" cy="294"/>
           </a:xfrm>
           <a:prstGeom prst="bentConnector3">
             <a:avLst>
               <a:gd name="adj1" fmla="val 50000"/>
             </a:avLst>
           </a:prstGeom>
-          <a:ln w="19050">
+          <a:ln w="15875">
             <a:solidFill>
               <a:schemeClr val="tx1"/>
             </a:solidFill>
@@ -12176,15 +12251,15 @@
         </p:nvCxnSpPr>
         <p:spPr>
           <a:xfrm rot="10800000">
-            <a:off x="1713880" y="1891972"/>
-            <a:ext cx="1480254" cy="327099"/>
+            <a:off x="1667788" y="1892272"/>
+            <a:ext cx="1526346" cy="337659"/>
           </a:xfrm>
           <a:prstGeom prst="bentConnector3">
             <a:avLst>
               <a:gd name="adj1" fmla="val 50000"/>
             </a:avLst>
           </a:prstGeom>
-          <a:ln w="19050">
+          <a:ln w="15875">
             <a:solidFill>
               <a:schemeClr val="tx1"/>
             </a:solidFill>
@@ -12223,14 +12298,14 @@
           <p:nvPr/>
         </p:nvCxnSpPr>
         <p:spPr>
-          <a:xfrm>
-            <a:off x="6425496" y="1782335"/>
-            <a:ext cx="1199065" cy="0"/>
+          <a:xfrm flipV="1">
+            <a:off x="6379404" y="1753947"/>
+            <a:ext cx="1246436" cy="5528"/>
           </a:xfrm>
           <a:prstGeom prst="straightConnector1">
             <a:avLst/>
           </a:prstGeom>
-          <a:ln w="19050">
+          <a:ln w="15875">
             <a:solidFill>
               <a:schemeClr val="tx1"/>
             </a:solidFill>
@@ -12267,10 +12342,10 @@
         </p:nvGrpSpPr>
         <p:grpSpPr>
           <a:xfrm>
-            <a:off x="2679728" y="2047050"/>
-            <a:ext cx="1389880" cy="894825"/>
-            <a:chOff x="6662440" y="1884447"/>
-            <a:chExt cx="1583937" cy="1070233"/>
+            <a:off x="2692884" y="2047050"/>
+            <a:ext cx="1389880" cy="611126"/>
+            <a:chOff x="6677432" y="1884447"/>
+            <a:chExt cx="1583937" cy="730922"/>
           </a:xfrm>
         </p:grpSpPr>
         <p:pic>
@@ -12283,15 +12358,15 @@
               </a:extLst>
             </p:cNvPr>
             <p:cNvPicPr>
-              <a:picLocks noChangeAspect="1" noChangeArrowheads="1"/>
+              <a:picLocks noChangeArrowheads="1"/>
             </p:cNvPicPr>
             <p:nvPr/>
           </p:nvPicPr>
           <p:blipFill>
-            <a:blip r:embed="rId45">
+            <a:blip r:embed="rId38">
               <a:extLst>
                 <a:ext uri="{96DAC541-7B7A-43D3-8B79-37D633B846F1}">
-                  <asvg:svgBlip xmlns:asvg="http://schemas.microsoft.com/office/drawing/2016/SVG/main" r:embed="rId46"/>
+                  <asvg:svgBlip xmlns:asvg="http://schemas.microsoft.com/office/drawing/2016/SVG/main" r:embed="rId39"/>
                 </a:ext>
               </a:extLst>
             </a:blip>
@@ -12300,8 +12375,8 @@
           </p:blipFill>
           <p:spPr bwMode="auto">
             <a:xfrm>
-              <a:off x="7248668" y="1884447"/>
-              <a:ext cx="411480" cy="411480"/>
+              <a:off x="7248667" y="1884447"/>
+              <a:ext cx="416828" cy="437458"/>
             </a:xfrm>
             <a:prstGeom prst="rect">
               <a:avLst/>
@@ -12347,8 +12422,8 @@
           </p:nvSpPr>
           <p:spPr bwMode="auto">
             <a:xfrm>
-              <a:off x="6662440" y="2292085"/>
-              <a:ext cx="1583937" cy="662595"/>
+              <a:off x="6677432" y="2339288"/>
+              <a:ext cx="1583937" cy="276081"/>
             </a:xfrm>
             <a:prstGeom prst="rect">
               <a:avLst/>
@@ -12482,7 +12557,7 @@
             <a:p>
               <a:pPr algn="ctr" eaLnBrk="1" hangingPunct="1"/>
               <a:r>
-                <a:rPr lang="en-US" altLang="en-US" sz="1000" dirty="0">
+                <a:rPr lang="en-US" altLang="en-US" sz="900" dirty="0">
                   <a:solidFill>
                     <a:sysClr val="windowText" lastClr="000000"/>
                   </a:solidFill>
@@ -12490,21 +12565,7 @@
                   <a:ea typeface="Amazon Ember" panose="020B0603020204020204" pitchFamily="34" charset="0"/>
                   <a:cs typeface="Arial" panose="020B0604020202020204" pitchFamily="34" charset="0"/>
                 </a:rPr>
-                <a:t>AWS</a:t>
-              </a:r>
-            </a:p>
-            <a:p>
-              <a:pPr algn="ctr" eaLnBrk="1" hangingPunct="1"/>
-              <a:r>
-                <a:rPr lang="en-US" altLang="en-US" sz="1000" dirty="0">
-                  <a:solidFill>
-                    <a:sysClr val="windowText" lastClr="000000"/>
-                  </a:solidFill>
-                  <a:latin typeface="Arial" panose="020B0604020202020204" pitchFamily="34" charset="0"/>
-                  <a:ea typeface="Amazon Ember" panose="020B0603020204020204" pitchFamily="34" charset="0"/>
-                  <a:cs typeface="Arial" panose="020B0604020202020204" pitchFamily="34" charset="0"/>
-                </a:rPr>
-                <a:t>Identity and Access Management (IAM)</a:t>
+                <a:t>AWS IAM</a:t>
               </a:r>
             </a:p>
           </p:txBody>
@@ -12524,8 +12585,8 @@
         </p:nvSpPr>
         <p:spPr>
           <a:xfrm>
-            <a:off x="4432151" y="2660275"/>
-            <a:ext cx="4129698" cy="3570584"/>
+            <a:off x="4382538" y="2656906"/>
+            <a:ext cx="4179311" cy="3573953"/>
           </a:xfrm>
           <a:prstGeom prst="rect">
             <a:avLst/>
@@ -12734,7 +12795,7 @@
         </p:nvSpPr>
         <p:spPr bwMode="auto">
           <a:xfrm>
-            <a:off x="8917153" y="5140069"/>
+            <a:off x="8883266" y="5349173"/>
             <a:ext cx="276560" cy="274320"/>
           </a:xfrm>
           <a:prstGeom prst="ellipse">
@@ -12805,7 +12866,7 @@
         </p:nvSpPr>
         <p:spPr bwMode="auto">
           <a:xfrm>
-            <a:off x="8917153" y="5808952"/>
+            <a:off x="8917153" y="5975342"/>
             <a:ext cx="276560" cy="274320"/>
           </a:xfrm>
           <a:prstGeom prst="ellipse">
@@ -12876,7 +12937,7 @@
         </p:nvSpPr>
         <p:spPr bwMode="auto">
           <a:xfrm>
-            <a:off x="8917153" y="6423492"/>
+            <a:off x="8917153" y="6486552"/>
             <a:ext cx="276560" cy="274320"/>
           </a:xfrm>
           <a:prstGeom prst="ellipse">
@@ -13017,7 +13078,7 @@
         <p:spPr>
           <a:xfrm>
             <a:off x="4657647" y="2635690"/>
-            <a:ext cx="1486304" cy="261610"/>
+            <a:ext cx="1249060" cy="230832"/>
           </a:xfrm>
           <a:prstGeom prst="rect">
             <a:avLst/>
@@ -13033,7 +13094,7 @@
               <a:defRPr/>
             </a:pPr>
             <a:r>
-              <a:rPr lang="en-US" sz="1100" dirty="0">
+              <a:rPr lang="en-US" sz="900" dirty="0">
                 <a:latin typeface="Arial" panose="020B0604020202020204" pitchFamily="34" charset="0"/>
                 <a:cs typeface="Arial" panose="020B0604020202020204" pitchFamily="34" charset="0"/>
               </a:rPr>
@@ -13060,15 +13121,15 @@
         </p:nvCxnSpPr>
         <p:spPr>
           <a:xfrm>
-            <a:off x="5449817" y="5228279"/>
-            <a:ext cx="899556" cy="432514"/>
+            <a:off x="5462927" y="5205419"/>
+            <a:ext cx="939071" cy="432514"/>
           </a:xfrm>
           <a:prstGeom prst="bentConnector3">
             <a:avLst>
-              <a:gd name="adj1" fmla="val 48645"/>
+              <a:gd name="adj1" fmla="val 50000"/>
             </a:avLst>
           </a:prstGeom>
-          <a:ln w="19050">
+          <a:ln w="15875">
             <a:solidFill>
               <a:schemeClr val="bg1">
                 <a:lumMod val="10000"/>
@@ -13103,20 +13164,21 @@
           </p:cNvPr>
           <p:cNvCxnSpPr>
             <a:cxnSpLocks/>
+            <a:stCxn id="766" idx="3"/>
           </p:cNvCxnSpPr>
           <p:nvPr/>
         </p:nvCxnSpPr>
         <p:spPr>
-          <a:xfrm rot="10800000" flipH="1">
-            <a:off x="5437326" y="4850485"/>
-            <a:ext cx="905585" cy="384390"/>
+          <a:xfrm flipV="1">
+            <a:off x="5462927" y="4850485"/>
+            <a:ext cx="939185" cy="354934"/>
           </a:xfrm>
           <a:prstGeom prst="bentConnector3">
             <a:avLst>
-              <a:gd name="adj1" fmla="val 49579"/>
+              <a:gd name="adj1" fmla="val 50000"/>
             </a:avLst>
           </a:prstGeom>
-          <a:ln w="19050">
+          <a:ln w="15875">
             <a:solidFill>
               <a:schemeClr val="bg1">
                 <a:lumMod val="10000"/>
@@ -13157,15 +13219,15 @@
         </p:nvCxnSpPr>
         <p:spPr>
           <a:xfrm flipV="1">
-            <a:off x="5418590" y="3124475"/>
-            <a:ext cx="911276" cy="454984"/>
+            <a:off x="5428712" y="3101615"/>
+            <a:ext cx="947201" cy="453503"/>
           </a:xfrm>
           <a:prstGeom prst="bentConnector3">
             <a:avLst>
-              <a:gd name="adj1" fmla="val 40635"/>
+              <a:gd name="adj1" fmla="val 50000"/>
             </a:avLst>
           </a:prstGeom>
-          <a:ln w="19050">
+          <a:ln w="15875">
             <a:solidFill>
               <a:schemeClr val="bg1">
                 <a:lumMod val="10000"/>
@@ -13207,15 +13269,15 @@
         </p:nvCxnSpPr>
         <p:spPr>
           <a:xfrm>
-            <a:off x="5418590" y="3579459"/>
-            <a:ext cx="929651" cy="395423"/>
+            <a:off x="5428712" y="3555118"/>
+            <a:ext cx="946974" cy="450096"/>
           </a:xfrm>
           <a:prstGeom prst="bentConnector3">
             <a:avLst>
-              <a:gd name="adj1" fmla="val 40093"/>
+              <a:gd name="adj1" fmla="val 50000"/>
             </a:avLst>
           </a:prstGeom>
-          <a:ln w="19050">
+          <a:ln w="15875">
             <a:solidFill>
               <a:schemeClr val="bg1">
                 <a:lumMod val="10000"/>
@@ -13257,15 +13319,15 @@
         </p:nvCxnSpPr>
         <p:spPr>
           <a:xfrm rot="5400000">
-            <a:off x="5220435" y="2376691"/>
-            <a:ext cx="987764" cy="1006293"/>
+            <a:off x="5209221" y="2365477"/>
+            <a:ext cx="1044854" cy="971631"/>
           </a:xfrm>
           <a:prstGeom prst="bentConnector3">
             <a:avLst>
-              <a:gd name="adj1" fmla="val 61322"/>
+              <a:gd name="adj1" fmla="val 51459"/>
             </a:avLst>
           </a:prstGeom>
-          <a:ln w="19050">
+          <a:ln w="15875">
             <a:solidFill>
               <a:schemeClr val="bg1">
                 <a:lumMod val="10000"/>
@@ -13310,10 +13372,10 @@
           </a:xfrm>
           <a:prstGeom prst="bentConnector3">
             <a:avLst>
-              <a:gd name="adj1" fmla="val 50000"/>
+              <a:gd name="adj1" fmla="val 39025"/>
             </a:avLst>
           </a:prstGeom>
-          <a:ln w="19050">
+          <a:ln w="15875">
             <a:solidFill>
               <a:schemeClr val="tx1"/>
             </a:solidFill>
@@ -13349,8 +13411,8 @@
         </p:nvSpPr>
         <p:spPr>
           <a:xfrm>
-            <a:off x="4699932" y="2892852"/>
-            <a:ext cx="3726047" cy="1658002"/>
+            <a:off x="4711418" y="2898681"/>
+            <a:ext cx="3744904" cy="1693504"/>
           </a:xfrm>
           <a:prstGeom prst="rect">
             <a:avLst/>
@@ -13358,7 +13420,7 @@
           <a:noFill/>
           <a:ln w="19050">
             <a:solidFill>
-              <a:srgbClr val="00B0F0"/>
+              <a:schemeClr val="tx1"/>
             </a:solidFill>
             <a:prstDash val="sysDash"/>
           </a:ln>
@@ -13408,8 +13470,8 @@
         </p:nvSpPr>
         <p:spPr>
           <a:xfrm>
-            <a:off x="6994068" y="2867468"/>
-            <a:ext cx="1462260" cy="430887"/>
+            <a:off x="7226504" y="2867468"/>
+            <a:ext cx="1229824" cy="369332"/>
           </a:xfrm>
           <a:prstGeom prst="rect">
             <a:avLst/>
@@ -13425,29 +13487,20 @@
               <a:defRPr/>
             </a:pPr>
             <a:r>
-              <a:rPr lang="en-US" sz="1050" dirty="0">
-                <a:solidFill>
-                  <a:srgbClr val="00B0F0"/>
-                </a:solidFill>
+              <a:rPr lang="en-US" sz="900" dirty="0">
                 <a:latin typeface="Arial" panose="020B0604020202020204" pitchFamily="34" charset="0"/>
                 <a:cs typeface="Arial" panose="020B0604020202020204" pitchFamily="34" charset="0"/>
               </a:rPr>
               <a:t>Amazon </a:t>
             </a:r>
             <a:r>
-              <a:rPr lang="en-US" sz="1050" dirty="0" err="1">
-                <a:solidFill>
-                  <a:srgbClr val="00B0F0"/>
-                </a:solidFill>
+              <a:rPr lang="en-US" sz="900" dirty="0" err="1">
                 <a:latin typeface="Arial" panose="020B0604020202020204" pitchFamily="34" charset="0"/>
                 <a:cs typeface="Arial" panose="020B0604020202020204" pitchFamily="34" charset="0"/>
               </a:rPr>
               <a:t>SageMaker</a:t>
             </a:r>
-            <a:endParaRPr lang="en-US" sz="1050" dirty="0">
-              <a:solidFill>
-                <a:srgbClr val="00B0F0"/>
-              </a:solidFill>
+            <a:endParaRPr lang="en-US" sz="900" dirty="0">
               <a:latin typeface="Arial" panose="020B0604020202020204" pitchFamily="34" charset="0"/>
               <a:cs typeface="Arial" panose="020B0604020202020204" pitchFamily="34" charset="0"/>
             </a:endParaRPr>
@@ -13457,10 +13510,7 @@
               <a:defRPr/>
             </a:pPr>
             <a:r>
-              <a:rPr lang="en-US" sz="1050" dirty="0">
-                <a:solidFill>
-                  <a:srgbClr val="00B0F0"/>
-                </a:solidFill>
+              <a:rPr lang="en-US" sz="900" dirty="0">
                 <a:latin typeface="Arial" panose="020B0604020202020204" pitchFamily="34" charset="0"/>
                 <a:cs typeface="Arial" panose="020B0604020202020204" pitchFamily="34" charset="0"/>
               </a:rPr>
@@ -13484,10 +13534,10 @@
           <p:nvPr/>
         </p:nvPicPr>
         <p:blipFill>
-          <a:blip r:embed="rId47">
+          <a:blip r:embed="rId40">
             <a:extLst>
               <a:ext uri="{96DAC541-7B7A-43D3-8B79-37D633B846F1}">
-                <asvg:svgBlip xmlns:asvg="http://schemas.microsoft.com/office/drawing/2016/SVG/main" r:embed="rId48"/>
+                <asvg:svgBlip xmlns:asvg="http://schemas.microsoft.com/office/drawing/2016/SVG/main" r:embed="rId41"/>
               </a:ext>
             </a:extLst>
           </a:blip>
@@ -13526,7 +13576,7 @@
           <a:prstGeom prst="straightConnector1">
             <a:avLst/>
           </a:prstGeom>
-          <a:ln w="19050">
+          <a:ln w="15875">
             <a:solidFill>
               <a:schemeClr val="bg1">
                 <a:lumMod val="10000"/>
@@ -13586,10 +13636,10 @@
             <p:nvPr/>
           </p:nvPicPr>
           <p:blipFill>
-            <a:blip r:embed="rId49">
+            <a:blip r:embed="rId42">
               <a:extLst>
                 <a:ext uri="{96DAC541-7B7A-43D3-8B79-37D633B846F1}">
-                  <asvg:svgBlip xmlns:asvg="http://schemas.microsoft.com/office/drawing/2016/SVG/main" r:embed="rId50"/>
+                  <asvg:svgBlip xmlns:asvg="http://schemas.microsoft.com/office/drawing/2016/SVG/main" r:embed="rId43"/>
                 </a:ext>
               </a:extLst>
             </a:blip>
@@ -13781,9 +13831,9 @@
               <a:pPr algn="ctr" eaLnBrk="1" hangingPunct="1"/>
               <a:r>
                 <a:rPr lang="en-US" altLang="en-US" sz="900" dirty="0">
-                  <a:latin typeface="Amazon Ember" panose="020B0603020204020204" pitchFamily="34" charset="0"/>
+                  <a:latin typeface="Arial" panose="020B0604020202020204" pitchFamily="34" charset="0"/>
                   <a:ea typeface="Amazon Ember" panose="020B0603020204020204" pitchFamily="34" charset="0"/>
-                  <a:cs typeface="Amazon Ember" panose="020B0603020204020204" pitchFamily="34" charset="0"/>
+                  <a:cs typeface="Arial" panose="020B0604020202020204" pitchFamily="34" charset="0"/>
                 </a:rPr>
                 <a:t>User</a:t>
               </a:r>
@@ -13791,6 +13841,105 @@
           </p:txBody>
         </p:sp>
       </p:grpSp>
+      <p:cxnSp>
+        <p:nvCxnSpPr>
+          <p:cNvPr id="3" name="Connector: Elbow 2">
+            <a:extLst>
+              <a:ext uri="{FF2B5EF4-FFF2-40B4-BE49-F238E27FC236}">
+                <a16:creationId xmlns:a16="http://schemas.microsoft.com/office/drawing/2014/main" id="{05DE54C5-F840-474A-9F83-C7586F96FB4A}"/>
+              </a:ext>
+            </a:extLst>
+          </p:cNvPr>
+          <p:cNvCxnSpPr>
+            <a:cxnSpLocks/>
+          </p:cNvCxnSpPr>
+          <p:nvPr/>
+        </p:nvCxnSpPr>
+        <p:spPr>
+          <a:xfrm>
+            <a:off x="6744660" y="3112125"/>
+            <a:ext cx="1034438" cy="422775"/>
+          </a:xfrm>
+          <a:prstGeom prst="bentConnector3">
+            <a:avLst>
+              <a:gd name="adj1" fmla="val 58267"/>
+            </a:avLst>
+          </a:prstGeom>
+          <a:ln w="15875">
+            <a:solidFill>
+              <a:schemeClr val="bg1">
+                <a:lumMod val="10000"/>
+              </a:schemeClr>
+            </a:solidFill>
+            <a:tailEnd type="triangle"/>
+          </a:ln>
+        </p:spPr>
+        <p:style>
+          <a:lnRef idx="1">
+            <a:schemeClr val="accent1"/>
+          </a:lnRef>
+          <a:fillRef idx="0">
+            <a:schemeClr val="accent1"/>
+          </a:fillRef>
+          <a:effectRef idx="0">
+            <a:schemeClr val="accent1"/>
+          </a:effectRef>
+          <a:fontRef idx="minor">
+            <a:schemeClr val="tx1"/>
+          </a:fontRef>
+        </p:style>
+      </p:cxnSp>
+      <p:cxnSp>
+        <p:nvCxnSpPr>
+          <p:cNvPr id="9" name="Connector: Elbow 8">
+            <a:extLst>
+              <a:ext uri="{FF2B5EF4-FFF2-40B4-BE49-F238E27FC236}">
+                <a16:creationId xmlns:a16="http://schemas.microsoft.com/office/drawing/2014/main" id="{4FAE25F9-621D-4D09-BA7A-5ABDCA529276}"/>
+              </a:ext>
+            </a:extLst>
+          </p:cNvPr>
+          <p:cNvCxnSpPr>
+            <a:cxnSpLocks/>
+            <a:stCxn id="759" idx="3"/>
+            <a:endCxn id="753" idx="1"/>
+          </p:cNvCxnSpPr>
+          <p:nvPr/>
+        </p:nvCxnSpPr>
+        <p:spPr>
+          <a:xfrm flipV="1">
+            <a:off x="6744433" y="3524390"/>
+            <a:ext cx="1034665" cy="480824"/>
+          </a:xfrm>
+          <a:prstGeom prst="bentConnector3">
+            <a:avLst>
+              <a:gd name="adj1" fmla="val 58101"/>
+            </a:avLst>
+          </a:prstGeom>
+          <a:ln w="15875">
+            <a:solidFill>
+              <a:schemeClr val="bg1">
+                <a:lumMod val="10000"/>
+              </a:schemeClr>
+            </a:solidFill>
+            <a:headEnd type="triangle"/>
+            <a:tailEnd type="triangle"/>
+          </a:ln>
+        </p:spPr>
+        <p:style>
+          <a:lnRef idx="1">
+            <a:schemeClr val="accent1"/>
+          </a:lnRef>
+          <a:fillRef idx="0">
+            <a:schemeClr val="accent1"/>
+          </a:fillRef>
+          <a:effectRef idx="0">
+            <a:schemeClr val="accent1"/>
+          </a:effectRef>
+          <a:fontRef idx="minor">
+            <a:schemeClr val="tx1"/>
+          </a:fontRef>
+        </p:style>
+      </p:cxnSp>
     </p:spTree>
     <p:extLst>
       <p:ext uri="{BB962C8B-B14F-4D97-AF65-F5344CB8AC3E}">

</xml_diff>